<commit_message>
Mise à jour de base de données
</commit_message>
<xml_diff>
--- a/downloads/gi-2/s7/projet_biblio/Presentation_1_Computer_Vision.pptx
+++ b/downloads/gi-2/s7/projet_biblio/Presentation_1_Computer_Vision.pptx
@@ -118,6 +118,11 @@
       </a:defRPr>
     </a:lvl9pPr>
   </p:defaultTextStyle>
+  <p:extLst>
+    <p:ext uri="{EFAFB233-063F-42B5-8137-9DF3F51BA10A}">
+      <p15:sldGuideLst xmlns:p15="http://schemas.microsoft.com/office/powerpoint/2012/main"/>
+    </p:ext>
+  </p:extLst>
 </p:presentation>
 </file>
 
@@ -30713,7 +30718,7 @@
             <a:fld id="{B61BEF0D-F0BB-DE4B-95CE-6DB70DBA9567}" type="datetimeFigureOut">
               <a:rPr lang="en-US" dirty="0"/>
               <a:pPr/>
-              <a:t>11/13/18</a:t>
+              <a:t>11/15/18</a:t>
             </a:fld>
             <a:endParaRPr lang="en-US" dirty="0"/>
           </a:p>
@@ -30799,13 +30804,13 @@
   <p:clrMapOvr>
     <a:masterClrMapping/>
   </p:clrMapOvr>
-  <mc:AlternateContent xmlns:mc="http://schemas.openxmlformats.org/markup-compatibility/2006">
-    <mc:Choice xmlns:p14="http://schemas.microsoft.com/office/powerpoint/2010/main" Requires="p14">
+  <mc:AlternateContent xmlns:mc="http://schemas.openxmlformats.org/markup-compatibility/2006" xmlns:p14="http://schemas.microsoft.com/office/powerpoint/2010/main">
+    <mc:Choice Requires="p14">
       <p:transition spd="slow" p14:dur="1400">
         <p14:doors dir="vert"/>
       </p:transition>
     </mc:Choice>
-    <mc:Fallback>
+    <mc:Fallback xmlns="">
       <p:transition spd="slow">
         <p:fade/>
       </p:transition>
@@ -30984,7 +30989,7 @@
             <a:fld id="{B61BEF0D-F0BB-DE4B-95CE-6DB70DBA9567}" type="datetimeFigureOut">
               <a:rPr lang="en-US" dirty="0"/>
               <a:pPr/>
-              <a:t>11/13/18</a:t>
+              <a:t>11/15/18</a:t>
             </a:fld>
             <a:endParaRPr lang="en-US" dirty="0"/>
           </a:p>
@@ -31038,13 +31043,13 @@
   <p:clrMapOvr>
     <a:masterClrMapping/>
   </p:clrMapOvr>
-  <mc:AlternateContent xmlns:mc="http://schemas.openxmlformats.org/markup-compatibility/2006">
-    <mc:Choice xmlns:p14="http://schemas.microsoft.com/office/powerpoint/2010/main" Requires="p14">
+  <mc:AlternateContent xmlns:mc="http://schemas.openxmlformats.org/markup-compatibility/2006" xmlns:p14="http://schemas.microsoft.com/office/powerpoint/2010/main">
+    <mc:Choice Requires="p14">
       <p:transition spd="slow" p14:dur="1400">
         <p14:doors dir="vert"/>
       </p:transition>
     </mc:Choice>
-    <mc:Fallback>
+    <mc:Fallback xmlns="">
       <p:transition spd="slow">
         <p:fade/>
       </p:transition>
@@ -31228,7 +31233,7 @@
             <a:fld id="{B61BEF0D-F0BB-DE4B-95CE-6DB70DBA9567}" type="datetimeFigureOut">
               <a:rPr lang="en-US" dirty="0"/>
               <a:pPr/>
-              <a:t>11/13/18</a:t>
+              <a:t>11/15/18</a:t>
             </a:fld>
             <a:endParaRPr lang="en-US" dirty="0"/>
           </a:p>
@@ -31303,13 +31308,13 @@
   <p:clrMapOvr>
     <a:masterClrMapping/>
   </p:clrMapOvr>
-  <mc:AlternateContent xmlns:mc="http://schemas.openxmlformats.org/markup-compatibility/2006">
-    <mc:Choice xmlns:p14="http://schemas.microsoft.com/office/powerpoint/2010/main" Requires="p14">
+  <mc:AlternateContent xmlns:mc="http://schemas.openxmlformats.org/markup-compatibility/2006" xmlns:p14="http://schemas.microsoft.com/office/powerpoint/2010/main">
+    <mc:Choice Requires="p14">
       <p:transition spd="slow" p14:dur="1400">
         <p14:doors dir="vert"/>
       </p:transition>
     </mc:Choice>
-    <mc:Fallback>
+    <mc:Fallback xmlns="">
       <p:transition spd="slow">
         <p:fade/>
       </p:transition>
@@ -31477,7 +31482,7 @@
             <a:fld id="{B61BEF0D-F0BB-DE4B-95CE-6DB70DBA9567}" type="datetimeFigureOut">
               <a:rPr lang="en-US" dirty="0"/>
               <a:pPr/>
-              <a:t>11/13/18</a:t>
+              <a:t>11/15/18</a:t>
             </a:fld>
             <a:endParaRPr lang="en-US" dirty="0"/>
           </a:p>
@@ -31536,13 +31541,13 @@
   <p:clrMapOvr>
     <a:masterClrMapping/>
   </p:clrMapOvr>
-  <mc:AlternateContent xmlns:mc="http://schemas.openxmlformats.org/markup-compatibility/2006">
-    <mc:Choice xmlns:p14="http://schemas.microsoft.com/office/powerpoint/2010/main" Requires="p14">
+  <mc:AlternateContent xmlns:mc="http://schemas.openxmlformats.org/markup-compatibility/2006" xmlns:p14="http://schemas.microsoft.com/office/powerpoint/2010/main">
+    <mc:Choice Requires="p14">
       <p:transition spd="slow" p14:dur="1400">
         <p14:doors dir="vert"/>
       </p:transition>
     </mc:Choice>
-    <mc:Fallback>
+    <mc:Fallback xmlns="">
       <p:transition spd="slow">
         <p:fade/>
       </p:transition>
@@ -31793,7 +31798,7 @@
             <a:fld id="{B61BEF0D-F0BB-DE4B-95CE-6DB70DBA9567}" type="datetimeFigureOut">
               <a:rPr lang="en-US" dirty="0"/>
               <a:pPr/>
-              <a:t>11/13/18</a:t>
+              <a:t>11/15/18</a:t>
             </a:fld>
             <a:endParaRPr lang="en-US" dirty="0"/>
           </a:p>
@@ -31869,13 +31874,13 @@
   <p:clrMapOvr>
     <a:masterClrMapping/>
   </p:clrMapOvr>
-  <mc:AlternateContent xmlns:mc="http://schemas.openxmlformats.org/markup-compatibility/2006">
-    <mc:Choice xmlns:p14="http://schemas.microsoft.com/office/powerpoint/2010/main" Requires="p14">
+  <mc:AlternateContent xmlns:mc="http://schemas.openxmlformats.org/markup-compatibility/2006" xmlns:p14="http://schemas.microsoft.com/office/powerpoint/2010/main">
+    <mc:Choice Requires="p14">
       <p:transition spd="slow" p14:dur="1400">
         <p14:doors dir="vert"/>
       </p:transition>
     </mc:Choice>
-    <mc:Fallback>
+    <mc:Fallback xmlns="">
       <p:transition spd="slow">
         <p:fade/>
       </p:transition>
@@ -32104,7 +32109,7 @@
             <a:fld id="{B61BEF0D-F0BB-DE4B-95CE-6DB70DBA9567}" type="datetimeFigureOut">
               <a:rPr lang="en-US" dirty="0"/>
               <a:pPr/>
-              <a:t>11/13/18</a:t>
+              <a:t>11/15/18</a:t>
             </a:fld>
             <a:endParaRPr lang="en-US" dirty="0"/>
           </a:p>
@@ -32158,13 +32163,13 @@
   <p:clrMapOvr>
     <a:masterClrMapping/>
   </p:clrMapOvr>
-  <mc:AlternateContent xmlns:mc="http://schemas.openxmlformats.org/markup-compatibility/2006">
-    <mc:Choice xmlns:p14="http://schemas.microsoft.com/office/powerpoint/2010/main" Requires="p14">
+  <mc:AlternateContent xmlns:mc="http://schemas.openxmlformats.org/markup-compatibility/2006" xmlns:p14="http://schemas.microsoft.com/office/powerpoint/2010/main">
+    <mc:Choice Requires="p14">
       <p:transition spd="slow" p14:dur="1400">
         <p14:doors dir="vert"/>
       </p:transition>
     </mc:Choice>
-    <mc:Fallback>
+    <mc:Fallback xmlns="">
       <p:transition spd="slow">
         <p:fade/>
       </p:transition>
@@ -32535,7 +32540,7 @@
             <a:fld id="{B61BEF0D-F0BB-DE4B-95CE-6DB70DBA9567}" type="datetimeFigureOut">
               <a:rPr lang="en-US" dirty="0"/>
               <a:pPr/>
-              <a:t>11/13/18</a:t>
+              <a:t>11/15/18</a:t>
             </a:fld>
             <a:endParaRPr lang="en-US" dirty="0"/>
           </a:p>
@@ -32589,13 +32594,13 @@
   <p:clrMapOvr>
     <a:masterClrMapping/>
   </p:clrMapOvr>
-  <mc:AlternateContent xmlns:mc="http://schemas.openxmlformats.org/markup-compatibility/2006">
-    <mc:Choice xmlns:p14="http://schemas.microsoft.com/office/powerpoint/2010/main" Requires="p14">
+  <mc:AlternateContent xmlns:mc="http://schemas.openxmlformats.org/markup-compatibility/2006" xmlns:p14="http://schemas.microsoft.com/office/powerpoint/2010/main">
+    <mc:Choice Requires="p14">
       <p:transition spd="slow" p14:dur="1400">
         <p14:doors dir="vert"/>
       </p:transition>
     </mc:Choice>
-    <mc:Fallback>
+    <mc:Fallback xmlns="">
       <p:transition spd="slow">
         <p:fade/>
       </p:transition>
@@ -32706,7 +32711,7 @@
             <a:fld id="{B61BEF0D-F0BB-DE4B-95CE-6DB70DBA9567}" type="datetimeFigureOut">
               <a:rPr lang="en-US" dirty="0"/>
               <a:pPr/>
-              <a:t>11/13/18</a:t>
+              <a:t>11/15/18</a:t>
             </a:fld>
             <a:endParaRPr lang="en-US" dirty="0"/>
           </a:p>
@@ -32760,13 +32765,13 @@
   <p:clrMapOvr>
     <a:masterClrMapping/>
   </p:clrMapOvr>
-  <mc:AlternateContent xmlns:mc="http://schemas.openxmlformats.org/markup-compatibility/2006">
-    <mc:Choice xmlns:p14="http://schemas.microsoft.com/office/powerpoint/2010/main" Requires="p14">
+  <mc:AlternateContent xmlns:mc="http://schemas.openxmlformats.org/markup-compatibility/2006" xmlns:p14="http://schemas.microsoft.com/office/powerpoint/2010/main">
+    <mc:Choice Requires="p14">
       <p:transition spd="slow" p14:dur="1400">
         <p14:doors dir="vert"/>
       </p:transition>
     </mc:Choice>
-    <mc:Fallback>
+    <mc:Fallback xmlns="">
       <p:transition spd="slow">
         <p:fade/>
       </p:transition>
@@ -32810,7 +32815,7 @@
             <a:fld id="{B61BEF0D-F0BB-DE4B-95CE-6DB70DBA9567}" type="datetimeFigureOut">
               <a:rPr lang="en-US" dirty="0"/>
               <a:pPr/>
-              <a:t>11/13/18</a:t>
+              <a:t>11/15/18</a:t>
             </a:fld>
             <a:endParaRPr lang="en-US" dirty="0"/>
           </a:p>
@@ -32864,13 +32869,13 @@
   <p:clrMapOvr>
     <a:masterClrMapping/>
   </p:clrMapOvr>
-  <mc:AlternateContent xmlns:mc="http://schemas.openxmlformats.org/markup-compatibility/2006">
-    <mc:Choice xmlns:p14="http://schemas.microsoft.com/office/powerpoint/2010/main" Requires="p14">
+  <mc:AlternateContent xmlns:mc="http://schemas.openxmlformats.org/markup-compatibility/2006" xmlns:p14="http://schemas.microsoft.com/office/powerpoint/2010/main">
+    <mc:Choice Requires="p14">
       <p:transition spd="slow" p14:dur="1400">
         <p14:doors dir="vert"/>
       </p:transition>
     </mc:Choice>
-    <mc:Fallback>
+    <mc:Fallback xmlns="">
       <p:transition spd="slow">
         <p:fade/>
       </p:transition>
@@ -33197,7 +33202,7 @@
             <a:fld id="{B61BEF0D-F0BB-DE4B-95CE-6DB70DBA9567}" type="datetimeFigureOut">
               <a:rPr lang="en-US" dirty="0"/>
               <a:pPr/>
-              <a:t>11/13/18</a:t>
+              <a:t>11/15/18</a:t>
             </a:fld>
             <a:endParaRPr lang="en-US" dirty="0"/>
           </a:p>
@@ -33273,13 +33278,13 @@
   <p:clrMapOvr>
     <a:masterClrMapping/>
   </p:clrMapOvr>
-  <mc:AlternateContent xmlns:mc="http://schemas.openxmlformats.org/markup-compatibility/2006">
-    <mc:Choice xmlns:p14="http://schemas.microsoft.com/office/powerpoint/2010/main" Requires="p14">
+  <mc:AlternateContent xmlns:mc="http://schemas.openxmlformats.org/markup-compatibility/2006" xmlns:p14="http://schemas.microsoft.com/office/powerpoint/2010/main">
+    <mc:Choice Requires="p14">
       <p:transition spd="slow" p14:dur="1400">
         <p14:doors dir="vert"/>
       </p:transition>
     </mc:Choice>
-    <mc:Fallback>
+    <mc:Fallback xmlns="">
       <p:transition spd="slow">
         <p:fade/>
       </p:transition>
@@ -33495,7 +33500,7 @@
             <a:fld id="{B61BEF0D-F0BB-DE4B-95CE-6DB70DBA9567}" type="datetimeFigureOut">
               <a:rPr lang="en-US" dirty="0"/>
               <a:pPr/>
-              <a:t>11/13/18</a:t>
+              <a:t>11/15/18</a:t>
             </a:fld>
             <a:endParaRPr lang="en-US" dirty="0"/>
           </a:p>
@@ -33549,13 +33554,13 @@
   <p:clrMapOvr>
     <a:masterClrMapping/>
   </p:clrMapOvr>
-  <mc:AlternateContent xmlns:mc="http://schemas.openxmlformats.org/markup-compatibility/2006">
-    <mc:Choice xmlns:p14="http://schemas.microsoft.com/office/powerpoint/2010/main" Requires="p14">
+  <mc:AlternateContent xmlns:mc="http://schemas.openxmlformats.org/markup-compatibility/2006" xmlns:p14="http://schemas.microsoft.com/office/powerpoint/2010/main">
+    <mc:Choice Requires="p14">
       <p:transition spd="slow" p14:dur="1400">
         <p14:doors dir="vert"/>
       </p:transition>
     </mc:Choice>
-    <mc:Fallback>
+    <mc:Fallback xmlns="">
       <p:transition spd="slow">
         <p:fade/>
       </p:transition>
@@ -33715,7 +33720,7 @@
             <a:fld id="{B61BEF0D-F0BB-DE4B-95CE-6DB70DBA9567}" type="datetimeFigureOut">
               <a:rPr lang="en-US" dirty="0"/>
               <a:pPr/>
-              <a:t>11/13/18</a:t>
+              <a:t>11/15/18</a:t>
             </a:fld>
             <a:endParaRPr lang="en-US" dirty="0"/>
           </a:p>
@@ -33923,13 +33928,13 @@
     <p:sldLayoutId id="2147483658" r:id="rId10"/>
     <p:sldLayoutId id="2147483659" r:id="rId11"/>
   </p:sldLayoutIdLst>
-  <mc:AlternateContent xmlns:mc="http://schemas.openxmlformats.org/markup-compatibility/2006">
-    <mc:Choice xmlns:p14="http://schemas.microsoft.com/office/powerpoint/2010/main" Requires="p14">
+  <mc:AlternateContent xmlns:mc="http://schemas.openxmlformats.org/markup-compatibility/2006" xmlns:p14="http://schemas.microsoft.com/office/powerpoint/2010/main">
+    <mc:Choice Requires="p14">
       <p:transition spd="slow" p14:dur="1400">
         <p14:doors dir="vert"/>
       </p:transition>
     </mc:Choice>
-    <mc:Fallback>
+    <mc:Fallback xmlns="">
       <p:transition spd="slow">
         <p:fade/>
       </p:transition>
@@ -34649,13 +34654,13 @@
   <p:clrMapOvr>
     <a:masterClrMapping/>
   </p:clrMapOvr>
-  <mc:AlternateContent xmlns:mc="http://schemas.openxmlformats.org/markup-compatibility/2006">
-    <mc:Choice xmlns:p14="http://schemas.microsoft.com/office/powerpoint/2010/main" Requires="p14">
+  <mc:AlternateContent xmlns:mc="http://schemas.openxmlformats.org/markup-compatibility/2006" xmlns:p14="http://schemas.microsoft.com/office/powerpoint/2010/main">
+    <mc:Choice Requires="p14">
       <p:transition spd="slow" p14:dur="1100">
         <p14:doors dir="vert"/>
       </p:transition>
     </mc:Choice>
-    <mc:Fallback>
+    <mc:Fallback xmlns="">
       <p:transition spd="slow">
         <p:fade/>
       </p:transition>
@@ -34750,13 +34755,13 @@
   <p:clrMapOvr>
     <a:masterClrMapping/>
   </p:clrMapOvr>
-  <mc:AlternateContent xmlns:mc="http://schemas.openxmlformats.org/markup-compatibility/2006">
-    <mc:Choice xmlns:p14="http://schemas.microsoft.com/office/powerpoint/2010/main" Requires="p14">
+  <mc:AlternateContent xmlns:mc="http://schemas.openxmlformats.org/markup-compatibility/2006" xmlns:p14="http://schemas.microsoft.com/office/powerpoint/2010/main">
+    <mc:Choice Requires="p14">
       <p:transition spd="slow" p14:dur="1100">
         <p14:doors dir="vert"/>
       </p:transition>
     </mc:Choice>
-    <mc:Fallback>
+    <mc:Fallback xmlns="">
       <p:transition spd="slow">
         <p:fade/>
       </p:transition>
@@ -34861,13 +34866,13 @@
   <p:clrMapOvr>
     <a:masterClrMapping/>
   </p:clrMapOvr>
-  <mc:AlternateContent xmlns:mc="http://schemas.openxmlformats.org/markup-compatibility/2006">
-    <mc:Choice xmlns:p14="http://schemas.microsoft.com/office/powerpoint/2010/main" Requires="p14">
+  <mc:AlternateContent xmlns:mc="http://schemas.openxmlformats.org/markup-compatibility/2006" xmlns:p14="http://schemas.microsoft.com/office/powerpoint/2010/main">
+    <mc:Choice Requires="p14">
       <p:transition spd="slow" p14:dur="1100">
         <p14:doors dir="vert"/>
       </p:transition>
     </mc:Choice>
-    <mc:Fallback>
+    <mc:Fallback xmlns="">
       <p:transition spd="slow">
         <p:fade/>
       </p:transition>
@@ -34984,13 +34989,13 @@
   <p:clrMapOvr>
     <a:masterClrMapping/>
   </p:clrMapOvr>
-  <mc:AlternateContent xmlns:mc="http://schemas.openxmlformats.org/markup-compatibility/2006">
-    <mc:Choice xmlns:p14="http://schemas.microsoft.com/office/powerpoint/2010/main" Requires="p14">
+  <mc:AlternateContent xmlns:mc="http://schemas.openxmlformats.org/markup-compatibility/2006" xmlns:p14="http://schemas.microsoft.com/office/powerpoint/2010/main">
+    <mc:Choice Requires="p14">
       <p:transition spd="slow" p14:dur="1100">
         <p14:doors dir="vert"/>
       </p:transition>
     </mc:Choice>
-    <mc:Fallback>
+    <mc:Fallback xmlns="">
       <p:transition spd="slow">
         <p:fade/>
       </p:transition>
@@ -35099,13 +35104,13 @@
   <p:clrMapOvr>
     <a:masterClrMapping/>
   </p:clrMapOvr>
-  <mc:AlternateContent xmlns:mc="http://schemas.openxmlformats.org/markup-compatibility/2006">
-    <mc:Choice xmlns:p14="http://schemas.microsoft.com/office/powerpoint/2010/main" Requires="p14">
+  <mc:AlternateContent xmlns:mc="http://schemas.openxmlformats.org/markup-compatibility/2006" xmlns:p14="http://schemas.microsoft.com/office/powerpoint/2010/main">
+    <mc:Choice Requires="p14">
       <p:transition spd="slow" p14:dur="1100">
         <p14:doors dir="vert"/>
       </p:transition>
     </mc:Choice>
-    <mc:Fallback>
+    <mc:Fallback xmlns="">
       <p:transition spd="slow">
         <p:fade/>
       </p:transition>
@@ -35235,13 +35240,13 @@
   <p:clrMapOvr>
     <a:masterClrMapping/>
   </p:clrMapOvr>
-  <mc:AlternateContent xmlns:mc="http://schemas.openxmlformats.org/markup-compatibility/2006">
-    <mc:Choice xmlns:p14="http://schemas.microsoft.com/office/powerpoint/2010/main" Requires="p14">
+  <mc:AlternateContent xmlns:mc="http://schemas.openxmlformats.org/markup-compatibility/2006" xmlns:p14="http://schemas.microsoft.com/office/powerpoint/2010/main">
+    <mc:Choice Requires="p14">
       <p:transition spd="slow" p14:dur="1100">
         <p14:doors dir="vert"/>
       </p:transition>
     </mc:Choice>
-    <mc:Fallback>
+    <mc:Fallback xmlns="">
       <p:transition spd="slow">
         <p:fade/>
       </p:transition>
@@ -35336,13 +35341,13 @@
   <p:clrMapOvr>
     <a:masterClrMapping/>
   </p:clrMapOvr>
-  <mc:AlternateContent xmlns:mc="http://schemas.openxmlformats.org/markup-compatibility/2006">
-    <mc:Choice xmlns:p14="http://schemas.microsoft.com/office/powerpoint/2010/main" Requires="p14">
+  <mc:AlternateContent xmlns:mc="http://schemas.openxmlformats.org/markup-compatibility/2006" xmlns:p14="http://schemas.microsoft.com/office/powerpoint/2010/main">
+    <mc:Choice Requires="p14">
       <p:transition spd="slow" p14:dur="1100">
         <p14:doors dir="vert"/>
       </p:transition>
     </mc:Choice>
-    <mc:Fallback>
+    <mc:Fallback xmlns="">
       <p:transition spd="slow">
         <p:fade/>
       </p:transition>
@@ -35437,13 +35442,13 @@
   <p:clrMapOvr>
     <a:masterClrMapping/>
   </p:clrMapOvr>
-  <mc:AlternateContent xmlns:mc="http://schemas.openxmlformats.org/markup-compatibility/2006">
-    <mc:Choice xmlns:p14="http://schemas.microsoft.com/office/powerpoint/2010/main" Requires="p14">
+  <mc:AlternateContent xmlns:mc="http://schemas.openxmlformats.org/markup-compatibility/2006" xmlns:p14="http://schemas.microsoft.com/office/powerpoint/2010/main">
+    <mc:Choice Requires="p14">
       <p:transition spd="slow" p14:dur="1100">
         <p14:doors dir="vert"/>
       </p:transition>
     </mc:Choice>
-    <mc:Fallback>
+    <mc:Fallback xmlns="">
       <p:transition spd="slow">
         <p:fade/>
       </p:transition>
@@ -35567,13 +35572,13 @@
   <p:clrMapOvr>
     <a:masterClrMapping/>
   </p:clrMapOvr>
-  <mc:AlternateContent xmlns:mc="http://schemas.openxmlformats.org/markup-compatibility/2006">
-    <mc:Choice xmlns:p14="http://schemas.microsoft.com/office/powerpoint/2010/main" Requires="p14">
+  <mc:AlternateContent xmlns:mc="http://schemas.openxmlformats.org/markup-compatibility/2006" xmlns:p14="http://schemas.microsoft.com/office/powerpoint/2010/main">
+    <mc:Choice Requires="p14">
       <p:transition spd="slow" p14:dur="1100">
         <p14:doors dir="vert"/>
       </p:transition>
     </mc:Choice>
-    <mc:Fallback>
+    <mc:Fallback xmlns="">
       <p:transition spd="slow">
         <p:fade/>
       </p:transition>
@@ -35668,13 +35673,13 @@
   <p:clrMapOvr>
     <a:masterClrMapping/>
   </p:clrMapOvr>
-  <mc:AlternateContent xmlns:mc="http://schemas.openxmlformats.org/markup-compatibility/2006">
-    <mc:Choice xmlns:p14="http://schemas.microsoft.com/office/powerpoint/2010/main" Requires="p14">
+  <mc:AlternateContent xmlns:mc="http://schemas.openxmlformats.org/markup-compatibility/2006" xmlns:p14="http://schemas.microsoft.com/office/powerpoint/2010/main">
+    <mc:Choice Requires="p14">
       <p:transition spd="slow" p14:dur="1100">
         <p14:doors dir="vert"/>
       </p:transition>
     </mc:Choice>
-    <mc:Fallback>
+    <mc:Fallback xmlns="">
       <p:transition spd="slow">
         <p:fade/>
       </p:transition>
@@ -35769,13 +35774,13 @@
   <p:clrMapOvr>
     <a:masterClrMapping/>
   </p:clrMapOvr>
-  <mc:AlternateContent xmlns:mc="http://schemas.openxmlformats.org/markup-compatibility/2006">
-    <mc:Choice xmlns:p14="http://schemas.microsoft.com/office/powerpoint/2010/main" Requires="p14">
+  <mc:AlternateContent xmlns:mc="http://schemas.openxmlformats.org/markup-compatibility/2006" xmlns:p14="http://schemas.microsoft.com/office/powerpoint/2010/main">
+    <mc:Choice Requires="p14">
       <p:transition spd="slow" p14:dur="1100">
         <p14:doors dir="vert"/>
       </p:transition>
     </mc:Choice>
-    <mc:Fallback>
+    <mc:Fallback xmlns="">
       <p:transition spd="slow">
         <p:fade/>
       </p:transition>
@@ -35963,13 +35968,13 @@
   <p:clrMapOvr>
     <a:masterClrMapping/>
   </p:clrMapOvr>
-  <mc:AlternateContent xmlns:mc="http://schemas.openxmlformats.org/markup-compatibility/2006">
-    <mc:Choice xmlns:p14="http://schemas.microsoft.com/office/powerpoint/2010/main" Requires="p14">
+  <mc:AlternateContent xmlns:mc="http://schemas.openxmlformats.org/markup-compatibility/2006" xmlns:p14="http://schemas.microsoft.com/office/powerpoint/2010/main">
+    <mc:Choice Requires="p14">
       <p:transition spd="slow" p14:dur="1100">
         <p14:doors dir="vert"/>
       </p:transition>
     </mc:Choice>
-    <mc:Fallback>
+    <mc:Fallback xmlns="">
       <p:transition spd="slow">
         <p:fade/>
       </p:transition>
@@ -36107,13 +36112,13 @@
   <p:clrMapOvr>
     <a:masterClrMapping/>
   </p:clrMapOvr>
-  <mc:AlternateContent xmlns:mc="http://schemas.openxmlformats.org/markup-compatibility/2006">
-    <mc:Choice xmlns:p14="http://schemas.microsoft.com/office/powerpoint/2010/main" Requires="p14">
+  <mc:AlternateContent xmlns:mc="http://schemas.openxmlformats.org/markup-compatibility/2006" xmlns:p14="http://schemas.microsoft.com/office/powerpoint/2010/main">
+    <mc:Choice Requires="p14">
       <p:transition spd="slow" p14:dur="1100">
         <p14:doors dir="vert"/>
       </p:transition>
     </mc:Choice>
-    <mc:Fallback>
+    <mc:Fallback xmlns="">
       <p:transition spd="slow">
         <p:fade/>
       </p:transition>
@@ -36208,13 +36213,13 @@
   <p:clrMapOvr>
     <a:masterClrMapping/>
   </p:clrMapOvr>
-  <mc:AlternateContent xmlns:mc="http://schemas.openxmlformats.org/markup-compatibility/2006">
-    <mc:Choice xmlns:p14="http://schemas.microsoft.com/office/powerpoint/2010/main" Requires="p14">
+  <mc:AlternateContent xmlns:mc="http://schemas.openxmlformats.org/markup-compatibility/2006" xmlns:p14="http://schemas.microsoft.com/office/powerpoint/2010/main">
+    <mc:Choice Requires="p14">
       <p:transition spd="slow" p14:dur="1100">
         <p14:doors dir="vert"/>
       </p:transition>
     </mc:Choice>
-    <mc:Fallback>
+    <mc:Fallback xmlns="">
       <p:transition spd="slow">
         <p:fade/>
       </p:transition>
@@ -36309,13 +36314,13 @@
   <p:clrMapOvr>
     <a:masterClrMapping/>
   </p:clrMapOvr>
-  <mc:AlternateContent xmlns:mc="http://schemas.openxmlformats.org/markup-compatibility/2006">
-    <mc:Choice xmlns:p14="http://schemas.microsoft.com/office/powerpoint/2010/main" Requires="p14">
+  <mc:AlternateContent xmlns:mc="http://schemas.openxmlformats.org/markup-compatibility/2006" xmlns:p14="http://schemas.microsoft.com/office/powerpoint/2010/main">
+    <mc:Choice Requires="p14">
       <p:transition spd="slow" p14:dur="1100">
         <p14:doors dir="vert"/>
       </p:transition>
     </mc:Choice>
-    <mc:Fallback>
+    <mc:Fallback xmlns="">
       <p:transition spd="slow">
         <p:fade/>
       </p:transition>

</xml_diff>

<commit_message>
Ajout des corrigés du TD1-2
</commit_message>
<xml_diff>
--- a/downloads/gi-2/s7/projet_biblio/Presentation_1_Computer_Vision.pptx
+++ b/downloads/gi-2/s7/projet_biblio/Presentation_1_Computer_Vision.pptx
@@ -20,6 +20,8 @@
     <p:sldId id="268" r:id="rId14"/>
     <p:sldId id="269" r:id="rId15"/>
     <p:sldId id="271" r:id="rId16"/>
+    <p:sldId id="272" r:id="rId17"/>
+    <p:sldId id="273" r:id="rId18"/>
   </p:sldIdLst>
   <p:sldSz cx="12192000" cy="6858000"/>
   <p:notesSz cx="6858000" cy="9144000"/>
@@ -1621,6 +1623,753 @@
 </file>
 
 <file path=ppt/diagrams/colors11.xml><?xml version="1.0" encoding="utf-8"?>
+<dgm:colorsDef xmlns:dgm="http://schemas.openxmlformats.org/drawingml/2006/diagram" xmlns:a="http://schemas.openxmlformats.org/drawingml/2006/main" uniqueId="urn:microsoft.com/office/officeart/2005/8/colors/accent1_2">
+  <dgm:title val=""/>
+  <dgm:desc val=""/>
+  <dgm:catLst>
+    <dgm:cat type="accent1" pri="11200"/>
+  </dgm:catLst>
+  <dgm:styleLbl name="node0">
+    <dgm:fillClrLst meth="repeat">
+      <a:schemeClr val="accent1"/>
+    </dgm:fillClrLst>
+    <dgm:linClrLst meth="repeat">
+      <a:schemeClr val="lt1"/>
+    </dgm:linClrLst>
+    <dgm:effectClrLst/>
+    <dgm:txLinClrLst/>
+    <dgm:txFillClrLst/>
+    <dgm:txEffectClrLst/>
+  </dgm:styleLbl>
+  <dgm:styleLbl name="alignNode1">
+    <dgm:fillClrLst meth="repeat">
+      <a:schemeClr val="accent1"/>
+    </dgm:fillClrLst>
+    <dgm:linClrLst meth="repeat">
+      <a:schemeClr val="accent1"/>
+    </dgm:linClrLst>
+    <dgm:effectClrLst/>
+    <dgm:txLinClrLst/>
+    <dgm:txFillClrLst/>
+    <dgm:txEffectClrLst/>
+  </dgm:styleLbl>
+  <dgm:styleLbl name="node1">
+    <dgm:fillClrLst meth="repeat">
+      <a:schemeClr val="accent1"/>
+    </dgm:fillClrLst>
+    <dgm:linClrLst meth="repeat">
+      <a:schemeClr val="lt1"/>
+    </dgm:linClrLst>
+    <dgm:effectClrLst/>
+    <dgm:txLinClrLst/>
+    <dgm:txFillClrLst/>
+    <dgm:txEffectClrLst/>
+  </dgm:styleLbl>
+  <dgm:styleLbl name="lnNode1">
+    <dgm:fillClrLst meth="repeat">
+      <a:schemeClr val="accent1"/>
+    </dgm:fillClrLst>
+    <dgm:linClrLst meth="repeat">
+      <a:schemeClr val="lt1"/>
+    </dgm:linClrLst>
+    <dgm:effectClrLst/>
+    <dgm:txLinClrLst/>
+    <dgm:txFillClrLst/>
+    <dgm:txEffectClrLst/>
+  </dgm:styleLbl>
+  <dgm:styleLbl name="vennNode1">
+    <dgm:fillClrLst meth="repeat">
+      <a:schemeClr val="accent1">
+        <a:alpha val="50000"/>
+      </a:schemeClr>
+    </dgm:fillClrLst>
+    <dgm:linClrLst meth="repeat">
+      <a:schemeClr val="lt1"/>
+    </dgm:linClrLst>
+    <dgm:effectClrLst/>
+    <dgm:txLinClrLst/>
+    <dgm:txFillClrLst/>
+    <dgm:txEffectClrLst/>
+  </dgm:styleLbl>
+  <dgm:styleLbl name="node2">
+    <dgm:fillClrLst meth="repeat">
+      <a:schemeClr val="accent1"/>
+    </dgm:fillClrLst>
+    <dgm:linClrLst meth="repeat">
+      <a:schemeClr val="lt1"/>
+    </dgm:linClrLst>
+    <dgm:effectClrLst/>
+    <dgm:txLinClrLst/>
+    <dgm:txFillClrLst/>
+    <dgm:txEffectClrLst/>
+  </dgm:styleLbl>
+  <dgm:styleLbl name="node3">
+    <dgm:fillClrLst meth="repeat">
+      <a:schemeClr val="accent1"/>
+    </dgm:fillClrLst>
+    <dgm:linClrLst meth="repeat">
+      <a:schemeClr val="lt1"/>
+    </dgm:linClrLst>
+    <dgm:effectClrLst/>
+    <dgm:txLinClrLst/>
+    <dgm:txFillClrLst/>
+    <dgm:txEffectClrLst/>
+  </dgm:styleLbl>
+  <dgm:styleLbl name="node4">
+    <dgm:fillClrLst meth="repeat">
+      <a:schemeClr val="accent1"/>
+    </dgm:fillClrLst>
+    <dgm:linClrLst meth="repeat">
+      <a:schemeClr val="lt1"/>
+    </dgm:linClrLst>
+    <dgm:effectClrLst/>
+    <dgm:txLinClrLst/>
+    <dgm:txFillClrLst/>
+    <dgm:txEffectClrLst/>
+  </dgm:styleLbl>
+  <dgm:styleLbl name="fgImgPlace1">
+    <dgm:fillClrLst meth="repeat">
+      <a:schemeClr val="accent1">
+        <a:tint val="50000"/>
+      </a:schemeClr>
+    </dgm:fillClrLst>
+    <dgm:linClrLst meth="repeat">
+      <a:schemeClr val="lt1"/>
+    </dgm:linClrLst>
+    <dgm:effectClrLst/>
+    <dgm:txLinClrLst/>
+    <dgm:txFillClrLst meth="repeat">
+      <a:schemeClr val="lt1"/>
+    </dgm:txFillClrLst>
+    <dgm:txEffectClrLst/>
+  </dgm:styleLbl>
+  <dgm:styleLbl name="alignImgPlace1">
+    <dgm:fillClrLst meth="repeat">
+      <a:schemeClr val="accent1">
+        <a:tint val="50000"/>
+      </a:schemeClr>
+    </dgm:fillClrLst>
+    <dgm:linClrLst meth="repeat">
+      <a:schemeClr val="lt1"/>
+    </dgm:linClrLst>
+    <dgm:effectClrLst/>
+    <dgm:txLinClrLst/>
+    <dgm:txFillClrLst meth="repeat">
+      <a:schemeClr val="lt1"/>
+    </dgm:txFillClrLst>
+    <dgm:txEffectClrLst/>
+  </dgm:styleLbl>
+  <dgm:styleLbl name="bgImgPlace1">
+    <dgm:fillClrLst meth="repeat">
+      <a:schemeClr val="accent1">
+        <a:tint val="50000"/>
+      </a:schemeClr>
+    </dgm:fillClrLst>
+    <dgm:linClrLst meth="repeat">
+      <a:schemeClr val="lt1"/>
+    </dgm:linClrLst>
+    <dgm:effectClrLst/>
+    <dgm:txLinClrLst/>
+    <dgm:txFillClrLst meth="repeat">
+      <a:schemeClr val="lt1"/>
+    </dgm:txFillClrLst>
+    <dgm:txEffectClrLst/>
+  </dgm:styleLbl>
+  <dgm:styleLbl name="sibTrans2D1">
+    <dgm:fillClrLst meth="repeat">
+      <a:schemeClr val="accent1">
+        <a:tint val="60000"/>
+      </a:schemeClr>
+    </dgm:fillClrLst>
+    <dgm:linClrLst meth="repeat">
+      <a:schemeClr val="accent1">
+        <a:tint val="60000"/>
+      </a:schemeClr>
+    </dgm:linClrLst>
+    <dgm:effectClrLst/>
+    <dgm:txLinClrLst/>
+    <dgm:txFillClrLst/>
+    <dgm:txEffectClrLst/>
+  </dgm:styleLbl>
+  <dgm:styleLbl name="fgSibTrans2D1">
+    <dgm:fillClrLst meth="repeat">
+      <a:schemeClr val="accent1">
+        <a:tint val="60000"/>
+      </a:schemeClr>
+    </dgm:fillClrLst>
+    <dgm:linClrLst meth="repeat">
+      <a:schemeClr val="accent1">
+        <a:tint val="60000"/>
+      </a:schemeClr>
+    </dgm:linClrLst>
+    <dgm:effectClrLst/>
+    <dgm:txLinClrLst/>
+    <dgm:txFillClrLst/>
+    <dgm:txEffectClrLst/>
+  </dgm:styleLbl>
+  <dgm:styleLbl name="bgSibTrans2D1">
+    <dgm:fillClrLst meth="repeat">
+      <a:schemeClr val="accent1">
+        <a:tint val="60000"/>
+      </a:schemeClr>
+    </dgm:fillClrLst>
+    <dgm:linClrLst meth="repeat">
+      <a:schemeClr val="accent1">
+        <a:tint val="60000"/>
+      </a:schemeClr>
+    </dgm:linClrLst>
+    <dgm:effectClrLst/>
+    <dgm:txLinClrLst/>
+    <dgm:txFillClrLst/>
+    <dgm:txEffectClrLst/>
+  </dgm:styleLbl>
+  <dgm:styleLbl name="sibTrans1D1">
+    <dgm:fillClrLst meth="repeat">
+      <a:schemeClr val="accent1"/>
+    </dgm:fillClrLst>
+    <dgm:linClrLst meth="repeat">
+      <a:schemeClr val="accent1"/>
+    </dgm:linClrLst>
+    <dgm:effectClrLst/>
+    <dgm:txLinClrLst/>
+    <dgm:txFillClrLst meth="repeat">
+      <a:schemeClr val="tx1"/>
+    </dgm:txFillClrLst>
+    <dgm:txEffectClrLst/>
+  </dgm:styleLbl>
+  <dgm:styleLbl name="callout">
+    <dgm:fillClrLst meth="repeat">
+      <a:schemeClr val="accent1"/>
+    </dgm:fillClrLst>
+    <dgm:linClrLst meth="repeat">
+      <a:schemeClr val="accent1">
+        <a:tint val="50000"/>
+      </a:schemeClr>
+    </dgm:linClrLst>
+    <dgm:effectClrLst/>
+    <dgm:txLinClrLst/>
+    <dgm:txFillClrLst meth="repeat">
+      <a:schemeClr val="tx1"/>
+    </dgm:txFillClrLst>
+    <dgm:txEffectClrLst/>
+  </dgm:styleLbl>
+  <dgm:styleLbl name="asst0">
+    <dgm:fillClrLst meth="repeat">
+      <a:schemeClr val="accent1"/>
+    </dgm:fillClrLst>
+    <dgm:linClrLst meth="repeat">
+      <a:schemeClr val="lt1"/>
+    </dgm:linClrLst>
+    <dgm:effectClrLst/>
+    <dgm:txLinClrLst/>
+    <dgm:txFillClrLst/>
+    <dgm:txEffectClrLst/>
+  </dgm:styleLbl>
+  <dgm:styleLbl name="asst1">
+    <dgm:fillClrLst meth="repeat">
+      <a:schemeClr val="accent1"/>
+    </dgm:fillClrLst>
+    <dgm:linClrLst meth="repeat">
+      <a:schemeClr val="lt1"/>
+    </dgm:linClrLst>
+    <dgm:effectClrLst/>
+    <dgm:txLinClrLst/>
+    <dgm:txFillClrLst/>
+    <dgm:txEffectClrLst/>
+  </dgm:styleLbl>
+  <dgm:styleLbl name="asst2">
+    <dgm:fillClrLst meth="repeat">
+      <a:schemeClr val="accent1"/>
+    </dgm:fillClrLst>
+    <dgm:linClrLst meth="repeat">
+      <a:schemeClr val="lt1"/>
+    </dgm:linClrLst>
+    <dgm:effectClrLst/>
+    <dgm:txLinClrLst/>
+    <dgm:txFillClrLst/>
+    <dgm:txEffectClrLst/>
+  </dgm:styleLbl>
+  <dgm:styleLbl name="asst3">
+    <dgm:fillClrLst meth="repeat">
+      <a:schemeClr val="accent1"/>
+    </dgm:fillClrLst>
+    <dgm:linClrLst meth="repeat">
+      <a:schemeClr val="lt1"/>
+    </dgm:linClrLst>
+    <dgm:effectClrLst/>
+    <dgm:txLinClrLst/>
+    <dgm:txFillClrLst/>
+    <dgm:txEffectClrLst/>
+  </dgm:styleLbl>
+  <dgm:styleLbl name="asst4">
+    <dgm:fillClrLst meth="repeat">
+      <a:schemeClr val="accent1"/>
+    </dgm:fillClrLst>
+    <dgm:linClrLst meth="repeat">
+      <a:schemeClr val="lt1"/>
+    </dgm:linClrLst>
+    <dgm:effectClrLst/>
+    <dgm:txLinClrLst/>
+    <dgm:txFillClrLst/>
+    <dgm:txEffectClrLst/>
+  </dgm:styleLbl>
+  <dgm:styleLbl name="parChTrans2D1">
+    <dgm:fillClrLst meth="repeat">
+      <a:schemeClr val="accent1">
+        <a:tint val="60000"/>
+      </a:schemeClr>
+    </dgm:fillClrLst>
+    <dgm:linClrLst meth="repeat">
+      <a:schemeClr val="accent1">
+        <a:tint val="60000"/>
+      </a:schemeClr>
+    </dgm:linClrLst>
+    <dgm:effectClrLst/>
+    <dgm:txLinClrLst/>
+    <dgm:txFillClrLst meth="repeat">
+      <a:schemeClr val="lt1"/>
+    </dgm:txFillClrLst>
+    <dgm:txEffectClrLst/>
+  </dgm:styleLbl>
+  <dgm:styleLbl name="parChTrans2D2">
+    <dgm:fillClrLst meth="repeat">
+      <a:schemeClr val="accent1"/>
+    </dgm:fillClrLst>
+    <dgm:linClrLst meth="repeat">
+      <a:schemeClr val="accent1"/>
+    </dgm:linClrLst>
+    <dgm:effectClrLst/>
+    <dgm:txLinClrLst/>
+    <dgm:txFillClrLst meth="repeat">
+      <a:schemeClr val="lt1"/>
+    </dgm:txFillClrLst>
+    <dgm:txEffectClrLst/>
+  </dgm:styleLbl>
+  <dgm:styleLbl name="parChTrans2D3">
+    <dgm:fillClrLst meth="repeat">
+      <a:schemeClr val="accent1"/>
+    </dgm:fillClrLst>
+    <dgm:linClrLst meth="repeat">
+      <a:schemeClr val="accent1"/>
+    </dgm:linClrLst>
+    <dgm:effectClrLst/>
+    <dgm:txLinClrLst/>
+    <dgm:txFillClrLst meth="repeat">
+      <a:schemeClr val="lt1"/>
+    </dgm:txFillClrLst>
+    <dgm:txEffectClrLst/>
+  </dgm:styleLbl>
+  <dgm:styleLbl name="parChTrans2D4">
+    <dgm:fillClrLst meth="repeat">
+      <a:schemeClr val="accent1"/>
+    </dgm:fillClrLst>
+    <dgm:linClrLst meth="repeat">
+      <a:schemeClr val="accent1"/>
+    </dgm:linClrLst>
+    <dgm:effectClrLst/>
+    <dgm:txLinClrLst/>
+    <dgm:txFillClrLst meth="repeat">
+      <a:schemeClr val="lt1"/>
+    </dgm:txFillClrLst>
+    <dgm:txEffectClrLst/>
+  </dgm:styleLbl>
+  <dgm:styleLbl name="parChTrans1D1">
+    <dgm:fillClrLst meth="repeat">
+      <a:schemeClr val="accent1"/>
+    </dgm:fillClrLst>
+    <dgm:linClrLst meth="repeat">
+      <a:schemeClr val="accent1">
+        <a:shade val="60000"/>
+      </a:schemeClr>
+    </dgm:linClrLst>
+    <dgm:effectClrLst/>
+    <dgm:txLinClrLst/>
+    <dgm:txFillClrLst meth="repeat">
+      <a:schemeClr val="tx1"/>
+    </dgm:txFillClrLst>
+    <dgm:txEffectClrLst/>
+  </dgm:styleLbl>
+  <dgm:styleLbl name="parChTrans1D2">
+    <dgm:fillClrLst meth="repeat">
+      <a:schemeClr val="accent1"/>
+    </dgm:fillClrLst>
+    <dgm:linClrLst meth="repeat">
+      <a:schemeClr val="accent1">
+        <a:shade val="60000"/>
+      </a:schemeClr>
+    </dgm:linClrLst>
+    <dgm:effectClrLst/>
+    <dgm:txLinClrLst/>
+    <dgm:txFillClrLst meth="repeat">
+      <a:schemeClr val="tx1"/>
+    </dgm:txFillClrLst>
+    <dgm:txEffectClrLst/>
+  </dgm:styleLbl>
+  <dgm:styleLbl name="parChTrans1D3">
+    <dgm:fillClrLst meth="repeat">
+      <a:schemeClr val="accent1"/>
+    </dgm:fillClrLst>
+    <dgm:linClrLst meth="repeat">
+      <a:schemeClr val="accent1">
+        <a:shade val="80000"/>
+      </a:schemeClr>
+    </dgm:linClrLst>
+    <dgm:effectClrLst/>
+    <dgm:txLinClrLst/>
+    <dgm:txFillClrLst meth="repeat">
+      <a:schemeClr val="tx1"/>
+    </dgm:txFillClrLst>
+    <dgm:txEffectClrLst/>
+  </dgm:styleLbl>
+  <dgm:styleLbl name="parChTrans1D4">
+    <dgm:fillClrLst meth="repeat">
+      <a:schemeClr val="accent1"/>
+    </dgm:fillClrLst>
+    <dgm:linClrLst meth="repeat">
+      <a:schemeClr val="accent1">
+        <a:shade val="80000"/>
+      </a:schemeClr>
+    </dgm:linClrLst>
+    <dgm:effectClrLst/>
+    <dgm:txLinClrLst/>
+    <dgm:txFillClrLst meth="repeat">
+      <a:schemeClr val="tx1"/>
+    </dgm:txFillClrLst>
+    <dgm:txEffectClrLst/>
+  </dgm:styleLbl>
+  <dgm:styleLbl name="fgAcc1">
+    <dgm:fillClrLst meth="repeat">
+      <a:schemeClr val="lt1">
+        <a:alpha val="90000"/>
+      </a:schemeClr>
+    </dgm:fillClrLst>
+    <dgm:linClrLst meth="repeat">
+      <a:schemeClr val="accent1"/>
+    </dgm:linClrLst>
+    <dgm:effectClrLst/>
+    <dgm:txLinClrLst/>
+    <dgm:txFillClrLst meth="repeat">
+      <a:schemeClr val="dk1"/>
+    </dgm:txFillClrLst>
+    <dgm:txEffectClrLst/>
+  </dgm:styleLbl>
+  <dgm:styleLbl name="conFgAcc1">
+    <dgm:fillClrLst meth="repeat">
+      <a:schemeClr val="lt1">
+        <a:alpha val="90000"/>
+      </a:schemeClr>
+    </dgm:fillClrLst>
+    <dgm:linClrLst meth="repeat">
+      <a:schemeClr val="accent1"/>
+    </dgm:linClrLst>
+    <dgm:effectClrLst/>
+    <dgm:txLinClrLst/>
+    <dgm:txFillClrLst meth="repeat">
+      <a:schemeClr val="dk1"/>
+    </dgm:txFillClrLst>
+    <dgm:txEffectClrLst/>
+  </dgm:styleLbl>
+  <dgm:styleLbl name="alignAcc1">
+    <dgm:fillClrLst meth="repeat">
+      <a:schemeClr val="lt1">
+        <a:alpha val="90000"/>
+      </a:schemeClr>
+    </dgm:fillClrLst>
+    <dgm:linClrLst meth="repeat">
+      <a:schemeClr val="accent1"/>
+    </dgm:linClrLst>
+    <dgm:effectClrLst/>
+    <dgm:txLinClrLst/>
+    <dgm:txFillClrLst meth="repeat">
+      <a:schemeClr val="dk1"/>
+    </dgm:txFillClrLst>
+    <dgm:txEffectClrLst/>
+  </dgm:styleLbl>
+  <dgm:styleLbl name="trAlignAcc1">
+    <dgm:fillClrLst meth="repeat">
+      <a:schemeClr val="lt1">
+        <a:alpha val="40000"/>
+      </a:schemeClr>
+    </dgm:fillClrLst>
+    <dgm:linClrLst meth="repeat">
+      <a:schemeClr val="accent1"/>
+    </dgm:linClrLst>
+    <dgm:effectClrLst/>
+    <dgm:txLinClrLst/>
+    <dgm:txFillClrLst meth="repeat">
+      <a:schemeClr val="dk1"/>
+    </dgm:txFillClrLst>
+    <dgm:txEffectClrLst/>
+  </dgm:styleLbl>
+  <dgm:styleLbl name="bgAcc1">
+    <dgm:fillClrLst meth="repeat">
+      <a:schemeClr val="lt1">
+        <a:alpha val="90000"/>
+      </a:schemeClr>
+    </dgm:fillClrLst>
+    <dgm:linClrLst meth="repeat">
+      <a:schemeClr val="accent1"/>
+    </dgm:linClrLst>
+    <dgm:effectClrLst/>
+    <dgm:txLinClrLst/>
+    <dgm:txFillClrLst meth="repeat">
+      <a:schemeClr val="dk1"/>
+    </dgm:txFillClrLst>
+    <dgm:txEffectClrLst/>
+  </dgm:styleLbl>
+  <dgm:styleLbl name="solidFgAcc1">
+    <dgm:fillClrLst meth="repeat">
+      <a:schemeClr val="lt1"/>
+    </dgm:fillClrLst>
+    <dgm:linClrLst meth="repeat">
+      <a:schemeClr val="accent1"/>
+    </dgm:linClrLst>
+    <dgm:effectClrLst/>
+    <dgm:txLinClrLst/>
+    <dgm:txFillClrLst meth="repeat">
+      <a:schemeClr val="dk1"/>
+    </dgm:txFillClrLst>
+    <dgm:txEffectClrLst/>
+  </dgm:styleLbl>
+  <dgm:styleLbl name="solidAlignAcc1">
+    <dgm:fillClrLst meth="repeat">
+      <a:schemeClr val="lt1"/>
+    </dgm:fillClrLst>
+    <dgm:linClrLst meth="repeat">
+      <a:schemeClr val="accent1"/>
+    </dgm:linClrLst>
+    <dgm:effectClrLst/>
+    <dgm:txLinClrLst/>
+    <dgm:txFillClrLst meth="repeat">
+      <a:schemeClr val="dk1"/>
+    </dgm:txFillClrLst>
+    <dgm:txEffectClrLst/>
+  </dgm:styleLbl>
+  <dgm:styleLbl name="solidBgAcc1">
+    <dgm:fillClrLst meth="repeat">
+      <a:schemeClr val="lt1"/>
+    </dgm:fillClrLst>
+    <dgm:linClrLst meth="repeat">
+      <a:schemeClr val="accent1"/>
+    </dgm:linClrLst>
+    <dgm:effectClrLst/>
+    <dgm:txLinClrLst/>
+    <dgm:txFillClrLst meth="repeat">
+      <a:schemeClr val="dk1"/>
+    </dgm:txFillClrLst>
+    <dgm:txEffectClrLst/>
+  </dgm:styleLbl>
+  <dgm:styleLbl name="fgAccFollowNode1">
+    <dgm:fillClrLst meth="repeat">
+      <a:schemeClr val="accent1">
+        <a:alpha val="90000"/>
+        <a:tint val="40000"/>
+      </a:schemeClr>
+    </dgm:fillClrLst>
+    <dgm:linClrLst meth="repeat">
+      <a:schemeClr val="accent1">
+        <a:alpha val="90000"/>
+        <a:tint val="40000"/>
+      </a:schemeClr>
+    </dgm:linClrLst>
+    <dgm:effectClrLst/>
+    <dgm:txLinClrLst/>
+    <dgm:txFillClrLst meth="repeat">
+      <a:schemeClr val="dk1"/>
+    </dgm:txFillClrLst>
+    <dgm:txEffectClrLst/>
+  </dgm:styleLbl>
+  <dgm:styleLbl name="alignAccFollowNode1">
+    <dgm:fillClrLst meth="repeat">
+      <a:schemeClr val="accent1">
+        <a:alpha val="90000"/>
+        <a:tint val="40000"/>
+      </a:schemeClr>
+    </dgm:fillClrLst>
+    <dgm:linClrLst meth="repeat">
+      <a:schemeClr val="accent1">
+        <a:alpha val="90000"/>
+        <a:tint val="40000"/>
+      </a:schemeClr>
+    </dgm:linClrLst>
+    <dgm:effectClrLst/>
+    <dgm:txLinClrLst/>
+    <dgm:txFillClrLst meth="repeat">
+      <a:schemeClr val="dk1"/>
+    </dgm:txFillClrLst>
+    <dgm:txEffectClrLst/>
+  </dgm:styleLbl>
+  <dgm:styleLbl name="bgAccFollowNode1">
+    <dgm:fillClrLst meth="repeat">
+      <a:schemeClr val="accent1">
+        <a:alpha val="90000"/>
+        <a:tint val="40000"/>
+      </a:schemeClr>
+    </dgm:fillClrLst>
+    <dgm:linClrLst meth="repeat">
+      <a:schemeClr val="accent1">
+        <a:alpha val="90000"/>
+        <a:tint val="40000"/>
+      </a:schemeClr>
+    </dgm:linClrLst>
+    <dgm:effectClrLst/>
+    <dgm:txLinClrLst/>
+    <dgm:txFillClrLst meth="repeat">
+      <a:schemeClr val="dk1"/>
+    </dgm:txFillClrLst>
+    <dgm:txEffectClrLst/>
+  </dgm:styleLbl>
+  <dgm:styleLbl name="fgAcc0">
+    <dgm:fillClrLst meth="repeat">
+      <a:schemeClr val="lt1">
+        <a:alpha val="90000"/>
+      </a:schemeClr>
+    </dgm:fillClrLst>
+    <dgm:linClrLst meth="repeat">
+      <a:schemeClr val="accent1"/>
+    </dgm:linClrLst>
+    <dgm:effectClrLst/>
+    <dgm:txLinClrLst/>
+    <dgm:txFillClrLst meth="repeat">
+      <a:schemeClr val="dk1"/>
+    </dgm:txFillClrLst>
+    <dgm:txEffectClrLst/>
+  </dgm:styleLbl>
+  <dgm:styleLbl name="fgAcc2">
+    <dgm:fillClrLst meth="repeat">
+      <a:schemeClr val="lt1">
+        <a:alpha val="90000"/>
+      </a:schemeClr>
+    </dgm:fillClrLst>
+    <dgm:linClrLst meth="repeat">
+      <a:schemeClr val="accent1"/>
+    </dgm:linClrLst>
+    <dgm:effectClrLst/>
+    <dgm:txLinClrLst/>
+    <dgm:txFillClrLst meth="repeat">
+      <a:schemeClr val="dk1"/>
+    </dgm:txFillClrLst>
+    <dgm:txEffectClrLst/>
+  </dgm:styleLbl>
+  <dgm:styleLbl name="fgAcc3">
+    <dgm:fillClrLst meth="repeat">
+      <a:schemeClr val="lt1">
+        <a:alpha val="90000"/>
+      </a:schemeClr>
+    </dgm:fillClrLst>
+    <dgm:linClrLst meth="repeat">
+      <a:schemeClr val="accent1"/>
+    </dgm:linClrLst>
+    <dgm:effectClrLst/>
+    <dgm:txLinClrLst/>
+    <dgm:txFillClrLst meth="repeat">
+      <a:schemeClr val="dk1"/>
+    </dgm:txFillClrLst>
+    <dgm:txEffectClrLst/>
+  </dgm:styleLbl>
+  <dgm:styleLbl name="fgAcc4">
+    <dgm:fillClrLst meth="repeat">
+      <a:schemeClr val="lt1">
+        <a:alpha val="90000"/>
+      </a:schemeClr>
+    </dgm:fillClrLst>
+    <dgm:linClrLst meth="repeat">
+      <a:schemeClr val="accent1"/>
+    </dgm:linClrLst>
+    <dgm:effectClrLst/>
+    <dgm:txLinClrLst/>
+    <dgm:txFillClrLst meth="repeat">
+      <a:schemeClr val="dk1"/>
+    </dgm:txFillClrLst>
+    <dgm:txEffectClrLst/>
+  </dgm:styleLbl>
+  <dgm:styleLbl name="bgShp">
+    <dgm:fillClrLst meth="repeat">
+      <a:schemeClr val="accent1">
+        <a:tint val="40000"/>
+      </a:schemeClr>
+    </dgm:fillClrLst>
+    <dgm:linClrLst meth="repeat">
+      <a:schemeClr val="accent1"/>
+    </dgm:linClrLst>
+    <dgm:effectClrLst/>
+    <dgm:txLinClrLst/>
+    <dgm:txFillClrLst meth="repeat">
+      <a:schemeClr val="dk1"/>
+    </dgm:txFillClrLst>
+    <dgm:txEffectClrLst/>
+  </dgm:styleLbl>
+  <dgm:styleLbl name="dkBgShp">
+    <dgm:fillClrLst meth="repeat">
+      <a:schemeClr val="accent1">
+        <a:shade val="80000"/>
+      </a:schemeClr>
+    </dgm:fillClrLst>
+    <dgm:linClrLst meth="repeat">
+      <a:schemeClr val="accent1"/>
+    </dgm:linClrLst>
+    <dgm:effectClrLst/>
+    <dgm:txLinClrLst/>
+    <dgm:txFillClrLst meth="repeat">
+      <a:schemeClr val="lt1"/>
+    </dgm:txFillClrLst>
+    <dgm:txEffectClrLst/>
+  </dgm:styleLbl>
+  <dgm:styleLbl name="trBgShp">
+    <dgm:fillClrLst meth="repeat">
+      <a:schemeClr val="accent1">
+        <a:tint val="50000"/>
+        <a:alpha val="40000"/>
+      </a:schemeClr>
+    </dgm:fillClrLst>
+    <dgm:linClrLst meth="repeat">
+      <a:schemeClr val="accent1"/>
+    </dgm:linClrLst>
+    <dgm:effectClrLst/>
+    <dgm:txLinClrLst/>
+    <dgm:txFillClrLst meth="repeat">
+      <a:schemeClr val="lt1"/>
+    </dgm:txFillClrLst>
+    <dgm:txEffectClrLst/>
+  </dgm:styleLbl>
+  <dgm:styleLbl name="fgShp">
+    <dgm:fillClrLst meth="repeat">
+      <a:schemeClr val="accent1">
+        <a:tint val="60000"/>
+      </a:schemeClr>
+    </dgm:fillClrLst>
+    <dgm:linClrLst meth="repeat">
+      <a:schemeClr val="lt1"/>
+    </dgm:linClrLst>
+    <dgm:effectClrLst/>
+    <dgm:txLinClrLst/>
+    <dgm:txFillClrLst meth="repeat">
+      <a:schemeClr val="dk1"/>
+    </dgm:txFillClrLst>
+    <dgm:txEffectClrLst/>
+  </dgm:styleLbl>
+  <dgm:styleLbl name="revTx">
+    <dgm:fillClrLst meth="repeat">
+      <a:schemeClr val="lt1">
+        <a:alpha val="0"/>
+      </a:schemeClr>
+    </dgm:fillClrLst>
+    <dgm:linClrLst meth="repeat">
+      <a:schemeClr val="dk1">
+        <a:alpha val="0"/>
+      </a:schemeClr>
+    </dgm:linClrLst>
+    <dgm:effectClrLst/>
+    <dgm:txLinClrLst/>
+    <dgm:txFillClrLst meth="repeat">
+      <a:schemeClr val="tx1"/>
+    </dgm:txFillClrLst>
+    <dgm:txEffectClrLst/>
+  </dgm:styleLbl>
+</dgm:colorsDef>
+</file>
+
+<file path=ppt/diagrams/colors12.xml><?xml version="1.0" encoding="utf-8"?>
 <dgm:colorsDef xmlns:dgm="http://schemas.openxmlformats.org/drawingml/2006/diagram" xmlns:a="http://schemas.openxmlformats.org/drawingml/2006/main" uniqueId="urn:microsoft.com/office/officeart/2005/8/colors/accent1_2">
   <dgm:title val=""/>
   <dgm:desc val=""/>
@@ -9551,6 +10300,573 @@
     <dgm:cxn modelId="{19F1452F-1FD4-DB45-9E09-36CCC15ADDAF}" type="presParOf" srcId="{93149191-46A4-0149-AB87-C4F4812539C0}" destId="{BF1014CE-286D-C84E-8CF4-A152AE6B4345}" srcOrd="1" destOrd="0" presId="urn:microsoft.com/office/officeart/2005/8/layout/list1"/>
     <dgm:cxn modelId="{CCC6C310-332B-D04F-9522-CCF0036D572D}" type="presParOf" srcId="{955C99EB-A126-8742-9DBA-B61AC0E68EEE}" destId="{9084E462-3D9C-6E48-81BC-D80CFA62E7C0}" srcOrd="5" destOrd="0" presId="urn:microsoft.com/office/officeart/2005/8/layout/list1"/>
     <dgm:cxn modelId="{46473446-0F84-8B42-92BA-CDD966A569E1}" type="presParOf" srcId="{955C99EB-A126-8742-9DBA-B61AC0E68EEE}" destId="{3AF7772C-B289-1A4C-8F65-A7DA6AA6CB3C}" srcOrd="6" destOrd="0" presId="urn:microsoft.com/office/officeart/2005/8/layout/list1"/>
+  </dgm:cxnLst>
+  <dgm:bg/>
+  <dgm:whole/>
+  <dgm:extLst>
+    <a:ext uri="http://schemas.microsoft.com/office/drawing/2008/diagram">
+      <dsp:dataModelExt xmlns:dsp="http://schemas.microsoft.com/office/drawing/2008/diagram" relId="rId6" minVer="http://schemas.openxmlformats.org/drawingml/2006/diagram"/>
+    </a:ext>
+  </dgm:extLst>
+</dgm:dataModel>
+</file>
+
+<file path=ppt/diagrams/data12.xml><?xml version="1.0" encoding="utf-8"?>
+<dgm:dataModel xmlns:dgm="http://schemas.openxmlformats.org/drawingml/2006/diagram" xmlns:a="http://schemas.openxmlformats.org/drawingml/2006/main">
+  <dgm:ptLst>
+    <dgm:pt modelId="{7FF4C3B1-DB7A-3445-B668-BAE2394730E1}" type="doc">
+      <dgm:prSet loTypeId="urn:microsoft.com/office/officeart/2005/8/layout/chevron2" loCatId="" qsTypeId="urn:microsoft.com/office/officeart/2005/8/quickstyle/simple1" qsCatId="simple" csTypeId="urn:microsoft.com/office/officeart/2005/8/colors/accent1_2" csCatId="accent1" phldr="1"/>
+      <dgm:spPr/>
+      <dgm:t>
+        <a:bodyPr/>
+        <a:lstStyle/>
+        <a:p>
+          <a:endParaRPr lang="en-US"/>
+        </a:p>
+      </dgm:t>
+    </dgm:pt>
+    <dgm:pt modelId="{3C9871F0-A57F-EE4C-8AF6-EDD5343E892B}">
+      <dgm:prSet phldrT="[Text]"/>
+      <dgm:spPr/>
+      <dgm:t>
+        <a:bodyPr/>
+        <a:lstStyle/>
+        <a:p>
+          <a:pPr rtl="0"/>
+          <a:r>
+            <a:rPr lang="fr-FR" dirty="0"/>
+            <a:t>1</a:t>
+          </a:r>
+        </a:p>
+      </dgm:t>
+    </dgm:pt>
+    <dgm:pt modelId="{A870380D-3F3F-8441-A8F7-85E29B5C1DED}" type="parTrans" cxnId="{5E7D90CD-E57D-C14F-ADBA-BBE55A2E4E73}">
+      <dgm:prSet/>
+      <dgm:spPr/>
+      <dgm:t>
+        <a:bodyPr/>
+        <a:lstStyle/>
+        <a:p>
+          <a:endParaRPr lang="en-US"/>
+        </a:p>
+      </dgm:t>
+    </dgm:pt>
+    <dgm:pt modelId="{37A9D8EC-2DEB-8C46-AC35-9E67536EA8FE}" type="sibTrans" cxnId="{5E7D90CD-E57D-C14F-ADBA-BBE55A2E4E73}">
+      <dgm:prSet/>
+      <dgm:spPr/>
+      <dgm:t>
+        <a:bodyPr/>
+        <a:lstStyle/>
+        <a:p>
+          <a:endParaRPr lang="en-US"/>
+        </a:p>
+      </dgm:t>
+    </dgm:pt>
+    <dgm:pt modelId="{3373EFEE-2FE6-6647-BFE5-A9A5555DF940}">
+      <dgm:prSet phldrT="[Text]"/>
+      <dgm:spPr/>
+      <dgm:t>
+        <a:bodyPr/>
+        <a:lstStyle/>
+        <a:p>
+          <a:pPr rtl="0"/>
+          <a:r>
+            <a:rPr lang="fr-FR" noProof="0" dirty="0"/>
+            <a:t>Présentation</a:t>
+          </a:r>
+          <a:r>
+            <a:rPr lang="fr-FR" dirty="0"/>
+            <a:t> du livre</a:t>
+          </a:r>
+        </a:p>
+      </dgm:t>
+    </dgm:pt>
+    <dgm:pt modelId="{08E24A4D-7D2C-2945-B7A3-320EAB3A017D}" type="parTrans" cxnId="{C8F3758C-D95A-454B-9A6E-8EE567691A14}">
+      <dgm:prSet/>
+      <dgm:spPr/>
+      <dgm:t>
+        <a:bodyPr/>
+        <a:lstStyle/>
+        <a:p>
+          <a:endParaRPr lang="en-US"/>
+        </a:p>
+      </dgm:t>
+    </dgm:pt>
+    <dgm:pt modelId="{A6F1F52D-D097-B643-89FA-01BDC5B0BEB0}" type="sibTrans" cxnId="{C8F3758C-D95A-454B-9A6E-8EE567691A14}">
+      <dgm:prSet/>
+      <dgm:spPr/>
+      <dgm:t>
+        <a:bodyPr/>
+        <a:lstStyle/>
+        <a:p>
+          <a:endParaRPr lang="en-US"/>
+        </a:p>
+      </dgm:t>
+    </dgm:pt>
+    <dgm:pt modelId="{C87AAA3D-70C1-6448-BFD6-E799AD115AB9}">
+      <dgm:prSet phldrT="[Text]"/>
+      <dgm:spPr/>
+      <dgm:t>
+        <a:bodyPr/>
+        <a:lstStyle/>
+        <a:p>
+          <a:r>
+            <a:rPr lang="fr-FR" dirty="0"/>
+            <a:t>2</a:t>
+          </a:r>
+        </a:p>
+      </dgm:t>
+    </dgm:pt>
+    <dgm:pt modelId="{DBCB2624-F978-E34B-9A94-5A91E755E519}" type="parTrans" cxnId="{276D4C82-FF2D-7F44-91CD-DA64DD323A79}">
+      <dgm:prSet/>
+      <dgm:spPr/>
+      <dgm:t>
+        <a:bodyPr/>
+        <a:lstStyle/>
+        <a:p>
+          <a:endParaRPr lang="en-US"/>
+        </a:p>
+      </dgm:t>
+    </dgm:pt>
+    <dgm:pt modelId="{B68B94B3-FADA-4946-A7FC-0BB83E5A56F6}" type="sibTrans" cxnId="{276D4C82-FF2D-7F44-91CD-DA64DD323A79}">
+      <dgm:prSet/>
+      <dgm:spPr/>
+      <dgm:t>
+        <a:bodyPr/>
+        <a:lstStyle/>
+        <a:p>
+          <a:endParaRPr lang="en-US"/>
+        </a:p>
+      </dgm:t>
+    </dgm:pt>
+    <dgm:pt modelId="{C40B6AB0-BD1D-514F-9EFC-1D2C2B3C773D}">
+      <dgm:prSet phldrT="[Text]"/>
+      <dgm:spPr/>
+      <dgm:t>
+        <a:bodyPr/>
+        <a:lstStyle/>
+        <a:p>
+          <a:pPr rtl="0"/>
+          <a:r>
+            <a:rPr lang="fr-FR" dirty="0"/>
+            <a:t>Introduction au sujet</a:t>
+          </a:r>
+        </a:p>
+      </dgm:t>
+    </dgm:pt>
+    <dgm:pt modelId="{BABDD381-E04E-F645-96DE-3818103CB92A}" type="parTrans" cxnId="{44A0E90B-C710-EF44-ABA0-E8772E6ABE8B}">
+      <dgm:prSet/>
+      <dgm:spPr/>
+      <dgm:t>
+        <a:bodyPr/>
+        <a:lstStyle/>
+        <a:p>
+          <a:endParaRPr lang="en-US"/>
+        </a:p>
+      </dgm:t>
+    </dgm:pt>
+    <dgm:pt modelId="{38955D93-7914-7A46-B484-D25A40AB325E}" type="sibTrans" cxnId="{44A0E90B-C710-EF44-ABA0-E8772E6ABE8B}">
+      <dgm:prSet/>
+      <dgm:spPr/>
+      <dgm:t>
+        <a:bodyPr/>
+        <a:lstStyle/>
+        <a:p>
+          <a:endParaRPr lang="en-US"/>
+        </a:p>
+      </dgm:t>
+    </dgm:pt>
+    <dgm:pt modelId="{97683A53-CB3E-8640-A945-D454EBD1BD78}">
+      <dgm:prSet phldrT="[Text]"/>
+      <dgm:spPr/>
+      <dgm:t>
+        <a:bodyPr/>
+        <a:lstStyle/>
+        <a:p>
+          <a:r>
+            <a:rPr lang="fr-FR" dirty="0"/>
+            <a:t>3</a:t>
+          </a:r>
+        </a:p>
+      </dgm:t>
+    </dgm:pt>
+    <dgm:pt modelId="{3B539A8C-BD2F-9346-A126-A983044F7FBD}" type="parTrans" cxnId="{06DC145C-9B11-7342-8FAC-66992DDF696D}">
+      <dgm:prSet/>
+      <dgm:spPr/>
+      <dgm:t>
+        <a:bodyPr/>
+        <a:lstStyle/>
+        <a:p>
+          <a:endParaRPr lang="en-US"/>
+        </a:p>
+      </dgm:t>
+    </dgm:pt>
+    <dgm:pt modelId="{E69430B4-7D27-4B42-A4B6-46029951BBF5}" type="sibTrans" cxnId="{06DC145C-9B11-7342-8FAC-66992DDF696D}">
+      <dgm:prSet/>
+      <dgm:spPr/>
+      <dgm:t>
+        <a:bodyPr/>
+        <a:lstStyle/>
+        <a:p>
+          <a:endParaRPr lang="en-US"/>
+        </a:p>
+      </dgm:t>
+    </dgm:pt>
+    <dgm:pt modelId="{7CB91CC7-D265-2146-8097-57604D239201}">
+      <dgm:prSet phldrT="[Text]"/>
+      <dgm:spPr/>
+      <dgm:t>
+        <a:bodyPr/>
+        <a:lstStyle/>
+        <a:p>
+          <a:pPr rtl="0"/>
+          <a:r>
+            <a:rPr lang="fr-FR" dirty="0"/>
+            <a:t>Historique (chapitre 1)</a:t>
+          </a:r>
+        </a:p>
+      </dgm:t>
+    </dgm:pt>
+    <dgm:pt modelId="{BDA4ADAD-4FB2-6344-A399-C409E6917F56}" type="parTrans" cxnId="{D3B51C9A-7701-BB44-9074-9D87E267E960}">
+      <dgm:prSet/>
+      <dgm:spPr/>
+      <dgm:t>
+        <a:bodyPr/>
+        <a:lstStyle/>
+        <a:p>
+          <a:endParaRPr lang="en-US"/>
+        </a:p>
+      </dgm:t>
+    </dgm:pt>
+    <dgm:pt modelId="{ACDEAD32-8616-D64B-A522-E8E1176D5638}" type="sibTrans" cxnId="{D3B51C9A-7701-BB44-9074-9D87E267E960}">
+      <dgm:prSet/>
+      <dgm:spPr/>
+      <dgm:t>
+        <a:bodyPr/>
+        <a:lstStyle/>
+        <a:p>
+          <a:endParaRPr lang="en-US"/>
+        </a:p>
+      </dgm:t>
+    </dgm:pt>
+    <dgm:pt modelId="{ECD6E6A0-8CCA-3A4B-9DA8-2DBB91A69B7D}">
+      <dgm:prSet/>
+      <dgm:spPr/>
+      <dgm:t>
+        <a:bodyPr/>
+        <a:lstStyle/>
+        <a:p>
+          <a:r>
+            <a:rPr lang="fr-FR" dirty="0"/>
+            <a:t>4</a:t>
+          </a:r>
+        </a:p>
+      </dgm:t>
+    </dgm:pt>
+    <dgm:pt modelId="{3AC898B2-A25F-4345-9FF8-A05621D07B6F}" type="parTrans" cxnId="{35B8AB0C-0336-0648-8E3D-2210C26EA048}">
+      <dgm:prSet/>
+      <dgm:spPr/>
+      <dgm:t>
+        <a:bodyPr/>
+        <a:lstStyle/>
+        <a:p>
+          <a:endParaRPr lang="en-US"/>
+        </a:p>
+      </dgm:t>
+    </dgm:pt>
+    <dgm:pt modelId="{56AA454D-CF81-0044-B24E-199AF2B7D101}" type="sibTrans" cxnId="{35B8AB0C-0336-0648-8E3D-2210C26EA048}">
+      <dgm:prSet/>
+      <dgm:spPr/>
+      <dgm:t>
+        <a:bodyPr/>
+        <a:lstStyle/>
+        <a:p>
+          <a:endParaRPr lang="en-US"/>
+        </a:p>
+      </dgm:t>
+    </dgm:pt>
+    <dgm:pt modelId="{5C4FB02E-B5EE-4243-8924-C649277EC2B3}">
+      <dgm:prSet/>
+      <dgm:spPr/>
+      <dgm:t>
+        <a:bodyPr/>
+        <a:lstStyle/>
+        <a:p>
+          <a:pPr rtl="0"/>
+          <a:r>
+            <a:rPr lang="fr-FR" dirty="0"/>
+            <a:t>Formation d'une image (chapitre 2)</a:t>
+          </a:r>
+        </a:p>
+      </dgm:t>
+    </dgm:pt>
+    <dgm:pt modelId="{0B9E9986-DCCD-CB45-A930-125439B8B36F}" type="parTrans" cxnId="{B1928A1E-9B44-ED40-9C98-2F2B21AE30DE}">
+      <dgm:prSet/>
+      <dgm:spPr/>
+      <dgm:t>
+        <a:bodyPr/>
+        <a:lstStyle/>
+        <a:p>
+          <a:endParaRPr lang="en-US"/>
+        </a:p>
+      </dgm:t>
+    </dgm:pt>
+    <dgm:pt modelId="{D7CBC22E-57B2-A244-B81B-07FF4D96E20D}" type="sibTrans" cxnId="{B1928A1E-9B44-ED40-9C98-2F2B21AE30DE}">
+      <dgm:prSet/>
+      <dgm:spPr/>
+      <dgm:t>
+        <a:bodyPr/>
+        <a:lstStyle/>
+        <a:p>
+          <a:endParaRPr lang="en-US"/>
+        </a:p>
+      </dgm:t>
+    </dgm:pt>
+    <dgm:pt modelId="{47DB53E3-232C-2044-AD12-229B74A2661F}">
+      <dgm:prSet/>
+      <dgm:spPr/>
+      <dgm:t>
+        <a:bodyPr/>
+        <a:lstStyle/>
+        <a:p>
+          <a:r>
+            <a:rPr lang="en-US" dirty="0"/>
+            <a:t>5</a:t>
+          </a:r>
+        </a:p>
+      </dgm:t>
+    </dgm:pt>
+    <dgm:pt modelId="{31E1C940-7617-F74E-9409-1CB33F5BD472}" type="parTrans" cxnId="{5811DE86-1E73-1F43-8721-E9F95DF1A6C7}">
+      <dgm:prSet/>
+      <dgm:spPr/>
+      <dgm:t>
+        <a:bodyPr/>
+        <a:lstStyle/>
+        <a:p>
+          <a:endParaRPr lang="en-US"/>
+        </a:p>
+      </dgm:t>
+    </dgm:pt>
+    <dgm:pt modelId="{7F92A9F4-30FF-1846-9BE7-E71A2F6EBA7D}" type="sibTrans" cxnId="{5811DE86-1E73-1F43-8721-E9F95DF1A6C7}">
+      <dgm:prSet/>
+      <dgm:spPr/>
+      <dgm:t>
+        <a:bodyPr/>
+        <a:lstStyle/>
+        <a:p>
+          <a:endParaRPr lang="en-US"/>
+        </a:p>
+      </dgm:t>
+    </dgm:pt>
+    <dgm:pt modelId="{27C81D66-9910-5D4F-AFE0-9A709A9BED34}">
+      <dgm:prSet/>
+      <dgm:spPr/>
+      <dgm:t>
+        <a:bodyPr/>
+        <a:lstStyle/>
+        <a:p>
+          <a:r>
+            <a:rPr lang="en-US" dirty="0"/>
+            <a:t>Perspective</a:t>
+          </a:r>
+        </a:p>
+      </dgm:t>
+    </dgm:pt>
+    <dgm:pt modelId="{C72053C3-0F41-7F43-ACF0-4741E489603C}" type="parTrans" cxnId="{1A900282-4098-0E4A-877C-DB2D34616450}">
+      <dgm:prSet/>
+      <dgm:spPr/>
+      <dgm:t>
+        <a:bodyPr/>
+        <a:lstStyle/>
+        <a:p>
+          <a:endParaRPr lang="en-US"/>
+        </a:p>
+      </dgm:t>
+    </dgm:pt>
+    <dgm:pt modelId="{470F1A13-8BDF-BC4D-882F-5A746E1BE8EB}" type="sibTrans" cxnId="{1A900282-4098-0E4A-877C-DB2D34616450}">
+      <dgm:prSet/>
+      <dgm:spPr/>
+      <dgm:t>
+        <a:bodyPr/>
+        <a:lstStyle/>
+        <a:p>
+          <a:endParaRPr lang="en-US"/>
+        </a:p>
+      </dgm:t>
+    </dgm:pt>
+    <dgm:pt modelId="{612EBEA8-A9F5-3446-BF36-10BC0FFAE7DD}" type="pres">
+      <dgm:prSet presAssocID="{7FF4C3B1-DB7A-3445-B668-BAE2394730E1}" presName="linearFlow" presStyleCnt="0">
+        <dgm:presLayoutVars>
+          <dgm:dir/>
+          <dgm:animLvl val="lvl"/>
+          <dgm:resizeHandles val="exact"/>
+        </dgm:presLayoutVars>
+      </dgm:prSet>
+      <dgm:spPr/>
+    </dgm:pt>
+    <dgm:pt modelId="{D3ACBEA1-3AC3-0B4D-9406-2E0C673ABDC0}" type="pres">
+      <dgm:prSet presAssocID="{3C9871F0-A57F-EE4C-8AF6-EDD5343E892B}" presName="composite" presStyleCnt="0"/>
+      <dgm:spPr/>
+    </dgm:pt>
+    <dgm:pt modelId="{B5E83173-3BA7-F444-822E-AC1D04E035F1}" type="pres">
+      <dgm:prSet presAssocID="{3C9871F0-A57F-EE4C-8AF6-EDD5343E892B}" presName="parentText" presStyleLbl="alignNode1" presStyleIdx="0" presStyleCnt="5">
+        <dgm:presLayoutVars>
+          <dgm:chMax val="1"/>
+          <dgm:bulletEnabled val="1"/>
+        </dgm:presLayoutVars>
+      </dgm:prSet>
+      <dgm:spPr/>
+    </dgm:pt>
+    <dgm:pt modelId="{9630E52D-45EE-D94C-93B6-6BB693BA7F8E}" type="pres">
+      <dgm:prSet presAssocID="{3C9871F0-A57F-EE4C-8AF6-EDD5343E892B}" presName="descendantText" presStyleLbl="alignAcc1" presStyleIdx="0" presStyleCnt="5">
+        <dgm:presLayoutVars>
+          <dgm:bulletEnabled val="1"/>
+        </dgm:presLayoutVars>
+      </dgm:prSet>
+      <dgm:spPr/>
+    </dgm:pt>
+    <dgm:pt modelId="{0355928D-F789-B44B-8CE3-08AA23936831}" type="pres">
+      <dgm:prSet presAssocID="{37A9D8EC-2DEB-8C46-AC35-9E67536EA8FE}" presName="sp" presStyleCnt="0"/>
+      <dgm:spPr/>
+    </dgm:pt>
+    <dgm:pt modelId="{D30F54EA-D287-7642-A0DE-C61F930F106C}" type="pres">
+      <dgm:prSet presAssocID="{C87AAA3D-70C1-6448-BFD6-E799AD115AB9}" presName="composite" presStyleCnt="0"/>
+      <dgm:spPr/>
+    </dgm:pt>
+    <dgm:pt modelId="{B357B8CA-A3FC-3442-94B6-F36D838B49A1}" type="pres">
+      <dgm:prSet presAssocID="{C87AAA3D-70C1-6448-BFD6-E799AD115AB9}" presName="parentText" presStyleLbl="alignNode1" presStyleIdx="1" presStyleCnt="5">
+        <dgm:presLayoutVars>
+          <dgm:chMax val="1"/>
+          <dgm:bulletEnabled val="1"/>
+        </dgm:presLayoutVars>
+      </dgm:prSet>
+      <dgm:spPr/>
+    </dgm:pt>
+    <dgm:pt modelId="{E1B7CFBF-F71A-284D-90E9-D9DB3D3952B2}" type="pres">
+      <dgm:prSet presAssocID="{C87AAA3D-70C1-6448-BFD6-E799AD115AB9}" presName="descendantText" presStyleLbl="alignAcc1" presStyleIdx="1" presStyleCnt="5">
+        <dgm:presLayoutVars>
+          <dgm:bulletEnabled val="1"/>
+        </dgm:presLayoutVars>
+      </dgm:prSet>
+      <dgm:spPr/>
+    </dgm:pt>
+    <dgm:pt modelId="{F72FCF59-D760-3A44-8A91-F4A8910FB907}" type="pres">
+      <dgm:prSet presAssocID="{B68B94B3-FADA-4946-A7FC-0BB83E5A56F6}" presName="sp" presStyleCnt="0"/>
+      <dgm:spPr/>
+    </dgm:pt>
+    <dgm:pt modelId="{67747803-321E-E644-8E2C-3DD049C978F8}" type="pres">
+      <dgm:prSet presAssocID="{97683A53-CB3E-8640-A945-D454EBD1BD78}" presName="composite" presStyleCnt="0"/>
+      <dgm:spPr/>
+    </dgm:pt>
+    <dgm:pt modelId="{9240E98B-5A8E-F140-92FA-5865B1C531D8}" type="pres">
+      <dgm:prSet presAssocID="{97683A53-CB3E-8640-A945-D454EBD1BD78}" presName="parentText" presStyleLbl="alignNode1" presStyleIdx="2" presStyleCnt="5">
+        <dgm:presLayoutVars>
+          <dgm:chMax val="1"/>
+          <dgm:bulletEnabled val="1"/>
+        </dgm:presLayoutVars>
+      </dgm:prSet>
+      <dgm:spPr/>
+    </dgm:pt>
+    <dgm:pt modelId="{BE124A01-9177-BD44-8574-8086AC914778}" type="pres">
+      <dgm:prSet presAssocID="{97683A53-CB3E-8640-A945-D454EBD1BD78}" presName="descendantText" presStyleLbl="alignAcc1" presStyleIdx="2" presStyleCnt="5">
+        <dgm:presLayoutVars>
+          <dgm:bulletEnabled val="1"/>
+        </dgm:presLayoutVars>
+      </dgm:prSet>
+      <dgm:spPr/>
+    </dgm:pt>
+    <dgm:pt modelId="{40D0D866-E6CB-D44C-A16A-E5A1A8C71DC3}" type="pres">
+      <dgm:prSet presAssocID="{E69430B4-7D27-4B42-A4B6-46029951BBF5}" presName="sp" presStyleCnt="0"/>
+      <dgm:spPr/>
+    </dgm:pt>
+    <dgm:pt modelId="{CCB6F7FB-EE03-4D44-8DE5-6CE512F62BCC}" type="pres">
+      <dgm:prSet presAssocID="{ECD6E6A0-8CCA-3A4B-9DA8-2DBB91A69B7D}" presName="composite" presStyleCnt="0"/>
+      <dgm:spPr/>
+    </dgm:pt>
+    <dgm:pt modelId="{15DAE497-84A1-AE48-9314-9434BC987A89}" type="pres">
+      <dgm:prSet presAssocID="{ECD6E6A0-8CCA-3A4B-9DA8-2DBB91A69B7D}" presName="parentText" presStyleLbl="alignNode1" presStyleIdx="3" presStyleCnt="5">
+        <dgm:presLayoutVars>
+          <dgm:chMax val="1"/>
+          <dgm:bulletEnabled val="1"/>
+        </dgm:presLayoutVars>
+      </dgm:prSet>
+      <dgm:spPr/>
+    </dgm:pt>
+    <dgm:pt modelId="{46C1417E-EC79-704A-8037-C3E61EC49353}" type="pres">
+      <dgm:prSet presAssocID="{ECD6E6A0-8CCA-3A4B-9DA8-2DBB91A69B7D}" presName="descendantText" presStyleLbl="alignAcc1" presStyleIdx="3" presStyleCnt="5">
+        <dgm:presLayoutVars>
+          <dgm:bulletEnabled val="1"/>
+        </dgm:presLayoutVars>
+      </dgm:prSet>
+      <dgm:spPr/>
+    </dgm:pt>
+    <dgm:pt modelId="{7C0FF437-05EA-6047-A3CE-77752FF98CF2}" type="pres">
+      <dgm:prSet presAssocID="{56AA454D-CF81-0044-B24E-199AF2B7D101}" presName="sp" presStyleCnt="0"/>
+      <dgm:spPr/>
+    </dgm:pt>
+    <dgm:pt modelId="{F61574E3-552F-DD45-833D-AF051AF8263B}" type="pres">
+      <dgm:prSet presAssocID="{47DB53E3-232C-2044-AD12-229B74A2661F}" presName="composite" presStyleCnt="0"/>
+      <dgm:spPr/>
+    </dgm:pt>
+    <dgm:pt modelId="{6EA3B489-1630-0D43-8F97-042DFC37DABC}" type="pres">
+      <dgm:prSet presAssocID="{47DB53E3-232C-2044-AD12-229B74A2661F}" presName="parentText" presStyleLbl="alignNode1" presStyleIdx="4" presStyleCnt="5">
+        <dgm:presLayoutVars>
+          <dgm:chMax val="1"/>
+          <dgm:bulletEnabled val="1"/>
+        </dgm:presLayoutVars>
+      </dgm:prSet>
+      <dgm:spPr/>
+    </dgm:pt>
+    <dgm:pt modelId="{503BBB3A-922C-C843-9442-A9F83D840E17}" type="pres">
+      <dgm:prSet presAssocID="{47DB53E3-232C-2044-AD12-229B74A2661F}" presName="descendantText" presStyleLbl="alignAcc1" presStyleIdx="4" presStyleCnt="5">
+        <dgm:presLayoutVars>
+          <dgm:bulletEnabled val="1"/>
+        </dgm:presLayoutVars>
+      </dgm:prSet>
+      <dgm:spPr/>
+    </dgm:pt>
+  </dgm:ptLst>
+  <dgm:cxnLst>
+    <dgm:cxn modelId="{2562C503-C0EE-1148-81B0-CB71F4743675}" type="presOf" srcId="{5C4FB02E-B5EE-4243-8924-C649277EC2B3}" destId="{46C1417E-EC79-704A-8037-C3E61EC49353}" srcOrd="0" destOrd="0" presId="urn:microsoft.com/office/officeart/2005/8/layout/chevron2"/>
+    <dgm:cxn modelId="{44A0E90B-C710-EF44-ABA0-E8772E6ABE8B}" srcId="{C87AAA3D-70C1-6448-BFD6-E799AD115AB9}" destId="{C40B6AB0-BD1D-514F-9EFC-1D2C2B3C773D}" srcOrd="0" destOrd="0" parTransId="{BABDD381-E04E-F645-96DE-3818103CB92A}" sibTransId="{38955D93-7914-7A46-B484-D25A40AB325E}"/>
+    <dgm:cxn modelId="{35B8AB0C-0336-0648-8E3D-2210C26EA048}" srcId="{7FF4C3B1-DB7A-3445-B668-BAE2394730E1}" destId="{ECD6E6A0-8CCA-3A4B-9DA8-2DBB91A69B7D}" srcOrd="3" destOrd="0" parTransId="{3AC898B2-A25F-4345-9FF8-A05621D07B6F}" sibTransId="{56AA454D-CF81-0044-B24E-199AF2B7D101}"/>
+    <dgm:cxn modelId="{B1928A1E-9B44-ED40-9C98-2F2B21AE30DE}" srcId="{ECD6E6A0-8CCA-3A4B-9DA8-2DBB91A69B7D}" destId="{5C4FB02E-B5EE-4243-8924-C649277EC2B3}" srcOrd="0" destOrd="0" parTransId="{0B9E9986-DCCD-CB45-A930-125439B8B36F}" sibTransId="{D7CBC22E-57B2-A244-B81B-07FF4D96E20D}"/>
+    <dgm:cxn modelId="{DC40044D-6FFB-1A4F-9017-6C3D81D26618}" type="presOf" srcId="{C40B6AB0-BD1D-514F-9EFC-1D2C2B3C773D}" destId="{E1B7CFBF-F71A-284D-90E9-D9DB3D3952B2}" srcOrd="0" destOrd="0" presId="urn:microsoft.com/office/officeart/2005/8/layout/chevron2"/>
+    <dgm:cxn modelId="{01425155-D53D-3344-832D-9C0EE8A0C302}" type="presOf" srcId="{C87AAA3D-70C1-6448-BFD6-E799AD115AB9}" destId="{B357B8CA-A3FC-3442-94B6-F36D838B49A1}" srcOrd="0" destOrd="0" presId="urn:microsoft.com/office/officeart/2005/8/layout/chevron2"/>
+    <dgm:cxn modelId="{06DC145C-9B11-7342-8FAC-66992DDF696D}" srcId="{7FF4C3B1-DB7A-3445-B668-BAE2394730E1}" destId="{97683A53-CB3E-8640-A945-D454EBD1BD78}" srcOrd="2" destOrd="0" parTransId="{3B539A8C-BD2F-9346-A126-A983044F7FBD}" sibTransId="{E69430B4-7D27-4B42-A4B6-46029951BBF5}"/>
+    <dgm:cxn modelId="{B907F47B-BE7B-A44A-A9DD-09C6C425670D}" type="presOf" srcId="{7FF4C3B1-DB7A-3445-B668-BAE2394730E1}" destId="{612EBEA8-A9F5-3446-BF36-10BC0FFAE7DD}" srcOrd="0" destOrd="0" presId="urn:microsoft.com/office/officeart/2005/8/layout/chevron2"/>
+    <dgm:cxn modelId="{1A900282-4098-0E4A-877C-DB2D34616450}" srcId="{47DB53E3-232C-2044-AD12-229B74A2661F}" destId="{27C81D66-9910-5D4F-AFE0-9A709A9BED34}" srcOrd="0" destOrd="0" parTransId="{C72053C3-0F41-7F43-ACF0-4741E489603C}" sibTransId="{470F1A13-8BDF-BC4D-882F-5A746E1BE8EB}"/>
+    <dgm:cxn modelId="{276D4C82-FF2D-7F44-91CD-DA64DD323A79}" srcId="{7FF4C3B1-DB7A-3445-B668-BAE2394730E1}" destId="{C87AAA3D-70C1-6448-BFD6-E799AD115AB9}" srcOrd="1" destOrd="0" parTransId="{DBCB2624-F978-E34B-9A94-5A91E755E519}" sibTransId="{B68B94B3-FADA-4946-A7FC-0BB83E5A56F6}"/>
+    <dgm:cxn modelId="{5811DE86-1E73-1F43-8721-E9F95DF1A6C7}" srcId="{7FF4C3B1-DB7A-3445-B668-BAE2394730E1}" destId="{47DB53E3-232C-2044-AD12-229B74A2661F}" srcOrd="4" destOrd="0" parTransId="{31E1C940-7617-F74E-9409-1CB33F5BD472}" sibTransId="{7F92A9F4-30FF-1846-9BE7-E71A2F6EBA7D}"/>
+    <dgm:cxn modelId="{37F05689-EFA0-9440-B4E6-BE93649D2C29}" type="presOf" srcId="{27C81D66-9910-5D4F-AFE0-9A709A9BED34}" destId="{503BBB3A-922C-C843-9442-A9F83D840E17}" srcOrd="0" destOrd="0" presId="urn:microsoft.com/office/officeart/2005/8/layout/chevron2"/>
+    <dgm:cxn modelId="{C8F3758C-D95A-454B-9A6E-8EE567691A14}" srcId="{3C9871F0-A57F-EE4C-8AF6-EDD5343E892B}" destId="{3373EFEE-2FE6-6647-BFE5-A9A5555DF940}" srcOrd="0" destOrd="0" parTransId="{08E24A4D-7D2C-2945-B7A3-320EAB3A017D}" sibTransId="{A6F1F52D-D097-B643-89FA-01BDC5B0BEB0}"/>
+    <dgm:cxn modelId="{D3B51C9A-7701-BB44-9074-9D87E267E960}" srcId="{97683A53-CB3E-8640-A945-D454EBD1BD78}" destId="{7CB91CC7-D265-2146-8097-57604D239201}" srcOrd="0" destOrd="0" parTransId="{BDA4ADAD-4FB2-6344-A399-C409E6917F56}" sibTransId="{ACDEAD32-8616-D64B-A522-E8E1176D5638}"/>
+    <dgm:cxn modelId="{693CA99B-500A-5740-90F6-0A2E43A95008}" type="presOf" srcId="{97683A53-CB3E-8640-A945-D454EBD1BD78}" destId="{9240E98B-5A8E-F140-92FA-5865B1C531D8}" srcOrd="0" destOrd="0" presId="urn:microsoft.com/office/officeart/2005/8/layout/chevron2"/>
+    <dgm:cxn modelId="{3375A19D-C04F-0646-9B79-76CFEEA69C84}" type="presOf" srcId="{3373EFEE-2FE6-6647-BFE5-A9A5555DF940}" destId="{9630E52D-45EE-D94C-93B6-6BB693BA7F8E}" srcOrd="0" destOrd="0" presId="urn:microsoft.com/office/officeart/2005/8/layout/chevron2"/>
+    <dgm:cxn modelId="{AB403AAB-3E48-9A42-8AF6-7410CB7E9A81}" type="presOf" srcId="{7CB91CC7-D265-2146-8097-57604D239201}" destId="{BE124A01-9177-BD44-8574-8086AC914778}" srcOrd="0" destOrd="0" presId="urn:microsoft.com/office/officeart/2005/8/layout/chevron2"/>
+    <dgm:cxn modelId="{B316B6B4-3106-3F43-9DCC-6D882B00B461}" type="presOf" srcId="{3C9871F0-A57F-EE4C-8AF6-EDD5343E892B}" destId="{B5E83173-3BA7-F444-822E-AC1D04E035F1}" srcOrd="0" destOrd="0" presId="urn:microsoft.com/office/officeart/2005/8/layout/chevron2"/>
+    <dgm:cxn modelId="{5E7D90CD-E57D-C14F-ADBA-BBE55A2E4E73}" srcId="{7FF4C3B1-DB7A-3445-B668-BAE2394730E1}" destId="{3C9871F0-A57F-EE4C-8AF6-EDD5343E892B}" srcOrd="0" destOrd="0" parTransId="{A870380D-3F3F-8441-A8F7-85E29B5C1DED}" sibTransId="{37A9D8EC-2DEB-8C46-AC35-9E67536EA8FE}"/>
+    <dgm:cxn modelId="{B84658DD-F73D-394E-9E62-DD1029B8DCB6}" type="presOf" srcId="{47DB53E3-232C-2044-AD12-229B74A2661F}" destId="{6EA3B489-1630-0D43-8F97-042DFC37DABC}" srcOrd="0" destOrd="0" presId="urn:microsoft.com/office/officeart/2005/8/layout/chevron2"/>
+    <dgm:cxn modelId="{6D0AE7FA-84E0-5149-9B93-0A622EC7D9D0}" type="presOf" srcId="{ECD6E6A0-8CCA-3A4B-9DA8-2DBB91A69B7D}" destId="{15DAE497-84A1-AE48-9314-9434BC987A89}" srcOrd="0" destOrd="0" presId="urn:microsoft.com/office/officeart/2005/8/layout/chevron2"/>
+    <dgm:cxn modelId="{9F5BF308-D7CC-5E41-92C4-100D45677CBC}" type="presParOf" srcId="{612EBEA8-A9F5-3446-BF36-10BC0FFAE7DD}" destId="{D3ACBEA1-3AC3-0B4D-9406-2E0C673ABDC0}" srcOrd="0" destOrd="0" presId="urn:microsoft.com/office/officeart/2005/8/layout/chevron2"/>
+    <dgm:cxn modelId="{23D76AF5-D065-8F4C-9C0B-108138E11747}" type="presParOf" srcId="{D3ACBEA1-3AC3-0B4D-9406-2E0C673ABDC0}" destId="{B5E83173-3BA7-F444-822E-AC1D04E035F1}" srcOrd="0" destOrd="0" presId="urn:microsoft.com/office/officeart/2005/8/layout/chevron2"/>
+    <dgm:cxn modelId="{7F019C2C-94D0-8E44-9DCD-E5294DB53898}" type="presParOf" srcId="{D3ACBEA1-3AC3-0B4D-9406-2E0C673ABDC0}" destId="{9630E52D-45EE-D94C-93B6-6BB693BA7F8E}" srcOrd="1" destOrd="0" presId="urn:microsoft.com/office/officeart/2005/8/layout/chevron2"/>
+    <dgm:cxn modelId="{090EC26D-BC33-8F4B-A6BC-919284DF96C4}" type="presParOf" srcId="{612EBEA8-A9F5-3446-BF36-10BC0FFAE7DD}" destId="{0355928D-F789-B44B-8CE3-08AA23936831}" srcOrd="1" destOrd="0" presId="urn:microsoft.com/office/officeart/2005/8/layout/chevron2"/>
+    <dgm:cxn modelId="{C263AC8A-6153-1741-A716-A2AA832B108F}" type="presParOf" srcId="{612EBEA8-A9F5-3446-BF36-10BC0FFAE7DD}" destId="{D30F54EA-D287-7642-A0DE-C61F930F106C}" srcOrd="2" destOrd="0" presId="urn:microsoft.com/office/officeart/2005/8/layout/chevron2"/>
+    <dgm:cxn modelId="{6E97A659-FDE9-B24A-8CF2-0F831FA8FF90}" type="presParOf" srcId="{D30F54EA-D287-7642-A0DE-C61F930F106C}" destId="{B357B8CA-A3FC-3442-94B6-F36D838B49A1}" srcOrd="0" destOrd="0" presId="urn:microsoft.com/office/officeart/2005/8/layout/chevron2"/>
+    <dgm:cxn modelId="{7D44C202-A488-7242-9BC1-95D8684EE8DD}" type="presParOf" srcId="{D30F54EA-D287-7642-A0DE-C61F930F106C}" destId="{E1B7CFBF-F71A-284D-90E9-D9DB3D3952B2}" srcOrd="1" destOrd="0" presId="urn:microsoft.com/office/officeart/2005/8/layout/chevron2"/>
+    <dgm:cxn modelId="{2B24AB42-543A-244A-BD15-E07203988BA6}" type="presParOf" srcId="{612EBEA8-A9F5-3446-BF36-10BC0FFAE7DD}" destId="{F72FCF59-D760-3A44-8A91-F4A8910FB907}" srcOrd="3" destOrd="0" presId="urn:microsoft.com/office/officeart/2005/8/layout/chevron2"/>
+    <dgm:cxn modelId="{A7FA329C-D3D0-CC48-AC1C-2E80C1D98EAD}" type="presParOf" srcId="{612EBEA8-A9F5-3446-BF36-10BC0FFAE7DD}" destId="{67747803-321E-E644-8E2C-3DD049C978F8}" srcOrd="4" destOrd="0" presId="urn:microsoft.com/office/officeart/2005/8/layout/chevron2"/>
+    <dgm:cxn modelId="{B05968C8-E60E-3742-80F7-7CB573C18681}" type="presParOf" srcId="{67747803-321E-E644-8E2C-3DD049C978F8}" destId="{9240E98B-5A8E-F140-92FA-5865B1C531D8}" srcOrd="0" destOrd="0" presId="urn:microsoft.com/office/officeart/2005/8/layout/chevron2"/>
+    <dgm:cxn modelId="{63B6AC39-DDBF-854F-A029-FE051A0AB7B3}" type="presParOf" srcId="{67747803-321E-E644-8E2C-3DD049C978F8}" destId="{BE124A01-9177-BD44-8574-8086AC914778}" srcOrd="1" destOrd="0" presId="urn:microsoft.com/office/officeart/2005/8/layout/chevron2"/>
+    <dgm:cxn modelId="{A4976045-22DD-AB43-BDC0-E3963A9599C2}" type="presParOf" srcId="{612EBEA8-A9F5-3446-BF36-10BC0FFAE7DD}" destId="{40D0D866-E6CB-D44C-A16A-E5A1A8C71DC3}" srcOrd="5" destOrd="0" presId="urn:microsoft.com/office/officeart/2005/8/layout/chevron2"/>
+    <dgm:cxn modelId="{6A916D3D-201E-774B-8AB6-0CA32426625C}" type="presParOf" srcId="{612EBEA8-A9F5-3446-BF36-10BC0FFAE7DD}" destId="{CCB6F7FB-EE03-4D44-8DE5-6CE512F62BCC}" srcOrd="6" destOrd="0" presId="urn:microsoft.com/office/officeart/2005/8/layout/chevron2"/>
+    <dgm:cxn modelId="{C47321B5-6618-7D4B-BC4B-0846778829BB}" type="presParOf" srcId="{CCB6F7FB-EE03-4D44-8DE5-6CE512F62BCC}" destId="{15DAE497-84A1-AE48-9314-9434BC987A89}" srcOrd="0" destOrd="0" presId="urn:microsoft.com/office/officeart/2005/8/layout/chevron2"/>
+    <dgm:cxn modelId="{CE6A8F42-6608-6640-8204-87DFA5F3FEAC}" type="presParOf" srcId="{CCB6F7FB-EE03-4D44-8DE5-6CE512F62BCC}" destId="{46C1417E-EC79-704A-8037-C3E61EC49353}" srcOrd="1" destOrd="0" presId="urn:microsoft.com/office/officeart/2005/8/layout/chevron2"/>
+    <dgm:cxn modelId="{30765C6D-D420-EF4B-853D-9A6F357C9A8B}" type="presParOf" srcId="{612EBEA8-A9F5-3446-BF36-10BC0FFAE7DD}" destId="{7C0FF437-05EA-6047-A3CE-77752FF98CF2}" srcOrd="7" destOrd="0" presId="urn:microsoft.com/office/officeart/2005/8/layout/chevron2"/>
+    <dgm:cxn modelId="{68772D42-ACB7-D948-BC2A-F01738F282D8}" type="presParOf" srcId="{612EBEA8-A9F5-3446-BF36-10BC0FFAE7DD}" destId="{F61574E3-552F-DD45-833D-AF051AF8263B}" srcOrd="8" destOrd="0" presId="urn:microsoft.com/office/officeart/2005/8/layout/chevron2"/>
+    <dgm:cxn modelId="{073D8583-8A4D-F04D-9935-A94625ACE4EC}" type="presParOf" srcId="{F61574E3-552F-DD45-833D-AF051AF8263B}" destId="{6EA3B489-1630-0D43-8F97-042DFC37DABC}" srcOrd="0" destOrd="0" presId="urn:microsoft.com/office/officeart/2005/8/layout/chevron2"/>
+    <dgm:cxn modelId="{3D65FFD8-31DC-5249-8EB1-8A7A833136A9}" type="presParOf" srcId="{F61574E3-552F-DD45-833D-AF051AF8263B}" destId="{503BBB3A-922C-C843-9442-A9F83D840E17}" srcOrd="1" destOrd="0" presId="urn:microsoft.com/office/officeart/2005/8/layout/chevron2"/>
   </dgm:cxnLst>
   <dgm:bg/>
   <dgm:whole/>
@@ -13613,6 +14929,787 @@
 </dsp:drawing>
 </file>
 
+<file path=ppt/diagrams/drawing12.xml><?xml version="1.0" encoding="utf-8"?>
+<dsp:drawing xmlns:dgm="http://schemas.openxmlformats.org/drawingml/2006/diagram" xmlns:dsp="http://schemas.microsoft.com/office/drawing/2008/diagram" xmlns:a="http://schemas.openxmlformats.org/drawingml/2006/main">
+  <dsp:spTree>
+    <dsp:nvGrpSpPr>
+      <dsp:cNvPr id="0" name=""/>
+      <dsp:cNvGrpSpPr/>
+    </dsp:nvGrpSpPr>
+    <dsp:grpSpPr/>
+    <dsp:sp modelId="{B5E83173-3BA7-F444-822E-AC1D04E035F1}">
+      <dsp:nvSpPr>
+        <dsp:cNvPr id="0" name=""/>
+        <dsp:cNvSpPr/>
+      </dsp:nvSpPr>
+      <dsp:spPr>
+        <a:xfrm rot="5400000">
+          <a:off x="-143317" y="145105"/>
+          <a:ext cx="955448" cy="668814"/>
+        </a:xfrm>
+        <a:prstGeom prst="chevron">
+          <a:avLst/>
+        </a:prstGeom>
+        <a:solidFill>
+          <a:schemeClr val="accent1">
+            <a:hueOff val="0"/>
+            <a:satOff val="0"/>
+            <a:lumOff val="0"/>
+            <a:alphaOff val="0"/>
+          </a:schemeClr>
+        </a:solidFill>
+        <a:ln w="22225" cap="rnd" cmpd="sng" algn="ctr">
+          <a:solidFill>
+            <a:schemeClr val="accent1">
+              <a:hueOff val="0"/>
+              <a:satOff val="0"/>
+              <a:lumOff val="0"/>
+              <a:alphaOff val="0"/>
+            </a:schemeClr>
+          </a:solidFill>
+          <a:prstDash val="solid"/>
+        </a:ln>
+        <a:effectLst/>
+      </dsp:spPr>
+      <dsp:style>
+        <a:lnRef idx="2">
+          <a:scrgbClr r="0" g="0" b="0"/>
+        </a:lnRef>
+        <a:fillRef idx="1">
+          <a:scrgbClr r="0" g="0" b="0"/>
+        </a:fillRef>
+        <a:effectRef idx="0">
+          <a:scrgbClr r="0" g="0" b="0"/>
+        </a:effectRef>
+        <a:fontRef idx="minor">
+          <a:schemeClr val="lt1"/>
+        </a:fontRef>
+      </dsp:style>
+      <dsp:txBody>
+        <a:bodyPr spcFirstLastPara="0" vert="horz" wrap="square" lIns="12065" tIns="12065" rIns="12065" bIns="12065" numCol="1" spcCol="1270" anchor="ctr" anchorCtr="0">
+          <a:noAutofit/>
+        </a:bodyPr>
+        <a:lstStyle/>
+        <a:p>
+          <a:pPr marL="0" lvl="0" indent="0" algn="ctr" defTabSz="844550" rtl="0">
+            <a:lnSpc>
+              <a:spcPct val="90000"/>
+            </a:lnSpc>
+            <a:spcBef>
+              <a:spcPct val="0"/>
+            </a:spcBef>
+            <a:spcAft>
+              <a:spcPct val="35000"/>
+            </a:spcAft>
+            <a:buNone/>
+          </a:pPr>
+          <a:r>
+            <a:rPr lang="fr-FR" sz="1900" kern="1200" dirty="0"/>
+            <a:t>1</a:t>
+          </a:r>
+        </a:p>
+      </dsp:txBody>
+      <dsp:txXfrm rot="-5400000">
+        <a:off x="0" y="336195"/>
+        <a:ext cx="668814" cy="286634"/>
+      </dsp:txXfrm>
+    </dsp:sp>
+    <dsp:sp modelId="{9630E52D-45EE-D94C-93B6-6BB693BA7F8E}">
+      <dsp:nvSpPr>
+        <dsp:cNvPr id="0" name=""/>
+        <dsp:cNvSpPr/>
+      </dsp:nvSpPr>
+      <dsp:spPr>
+        <a:xfrm rot="5400000">
+          <a:off x="5538861" y="-4868258"/>
+          <a:ext cx="621041" cy="10361135"/>
+        </a:xfrm>
+        <a:prstGeom prst="round2SameRect">
+          <a:avLst/>
+        </a:prstGeom>
+        <a:solidFill>
+          <a:schemeClr val="lt1">
+            <a:alpha val="90000"/>
+            <a:hueOff val="0"/>
+            <a:satOff val="0"/>
+            <a:lumOff val="0"/>
+            <a:alphaOff val="0"/>
+          </a:schemeClr>
+        </a:solidFill>
+        <a:ln w="22225" cap="rnd" cmpd="sng" algn="ctr">
+          <a:solidFill>
+            <a:schemeClr val="accent1">
+              <a:hueOff val="0"/>
+              <a:satOff val="0"/>
+              <a:lumOff val="0"/>
+              <a:alphaOff val="0"/>
+            </a:schemeClr>
+          </a:solidFill>
+          <a:prstDash val="solid"/>
+        </a:ln>
+        <a:effectLst/>
+      </dsp:spPr>
+      <dsp:style>
+        <a:lnRef idx="2">
+          <a:scrgbClr r="0" g="0" b="0"/>
+        </a:lnRef>
+        <a:fillRef idx="1">
+          <a:scrgbClr r="0" g="0" b="0"/>
+        </a:fillRef>
+        <a:effectRef idx="0">
+          <a:scrgbClr r="0" g="0" b="0"/>
+        </a:effectRef>
+        <a:fontRef idx="minor"/>
+      </dsp:style>
+      <dsp:txBody>
+        <a:bodyPr spcFirstLastPara="0" vert="horz" wrap="square" lIns="270256" tIns="24130" rIns="24130" bIns="24130" numCol="1" spcCol="1270" anchor="ctr" anchorCtr="0">
+          <a:noAutofit/>
+        </a:bodyPr>
+        <a:lstStyle/>
+        <a:p>
+          <a:pPr marL="285750" lvl="1" indent="-285750" algn="l" defTabSz="1689100" rtl="0">
+            <a:lnSpc>
+              <a:spcPct val="90000"/>
+            </a:lnSpc>
+            <a:spcBef>
+              <a:spcPct val="0"/>
+            </a:spcBef>
+            <a:spcAft>
+              <a:spcPct val="15000"/>
+            </a:spcAft>
+            <a:buChar char="•"/>
+          </a:pPr>
+          <a:r>
+            <a:rPr lang="fr-FR" sz="3800" kern="1200" noProof="0" dirty="0"/>
+            <a:t>Présentation</a:t>
+          </a:r>
+          <a:r>
+            <a:rPr lang="fr-FR" sz="3800" kern="1200" dirty="0"/>
+            <a:t> du livre</a:t>
+          </a:r>
+        </a:p>
+      </dsp:txBody>
+      <dsp:txXfrm rot="-5400000">
+        <a:off x="668815" y="32105"/>
+        <a:ext cx="10330818" cy="560407"/>
+      </dsp:txXfrm>
+    </dsp:sp>
+    <dsp:sp modelId="{B357B8CA-A3FC-3442-94B6-F36D838B49A1}">
+      <dsp:nvSpPr>
+        <dsp:cNvPr id="0" name=""/>
+        <dsp:cNvSpPr/>
+      </dsp:nvSpPr>
+      <dsp:spPr>
+        <a:xfrm rot="5400000">
+          <a:off x="-143317" y="981674"/>
+          <a:ext cx="955448" cy="668814"/>
+        </a:xfrm>
+        <a:prstGeom prst="chevron">
+          <a:avLst/>
+        </a:prstGeom>
+        <a:solidFill>
+          <a:schemeClr val="accent1">
+            <a:hueOff val="0"/>
+            <a:satOff val="0"/>
+            <a:lumOff val="0"/>
+            <a:alphaOff val="0"/>
+          </a:schemeClr>
+        </a:solidFill>
+        <a:ln w="22225" cap="rnd" cmpd="sng" algn="ctr">
+          <a:solidFill>
+            <a:schemeClr val="accent1">
+              <a:hueOff val="0"/>
+              <a:satOff val="0"/>
+              <a:lumOff val="0"/>
+              <a:alphaOff val="0"/>
+            </a:schemeClr>
+          </a:solidFill>
+          <a:prstDash val="solid"/>
+        </a:ln>
+        <a:effectLst/>
+      </dsp:spPr>
+      <dsp:style>
+        <a:lnRef idx="2">
+          <a:scrgbClr r="0" g="0" b="0"/>
+        </a:lnRef>
+        <a:fillRef idx="1">
+          <a:scrgbClr r="0" g="0" b="0"/>
+        </a:fillRef>
+        <a:effectRef idx="0">
+          <a:scrgbClr r="0" g="0" b="0"/>
+        </a:effectRef>
+        <a:fontRef idx="minor">
+          <a:schemeClr val="lt1"/>
+        </a:fontRef>
+      </dsp:style>
+      <dsp:txBody>
+        <a:bodyPr spcFirstLastPara="0" vert="horz" wrap="square" lIns="12065" tIns="12065" rIns="12065" bIns="12065" numCol="1" spcCol="1270" anchor="ctr" anchorCtr="0">
+          <a:noAutofit/>
+        </a:bodyPr>
+        <a:lstStyle/>
+        <a:p>
+          <a:pPr marL="0" lvl="0" indent="0" algn="ctr" defTabSz="844550">
+            <a:lnSpc>
+              <a:spcPct val="90000"/>
+            </a:lnSpc>
+            <a:spcBef>
+              <a:spcPct val="0"/>
+            </a:spcBef>
+            <a:spcAft>
+              <a:spcPct val="35000"/>
+            </a:spcAft>
+            <a:buNone/>
+          </a:pPr>
+          <a:r>
+            <a:rPr lang="fr-FR" sz="1900" kern="1200" dirty="0"/>
+            <a:t>2</a:t>
+          </a:r>
+        </a:p>
+      </dsp:txBody>
+      <dsp:txXfrm rot="-5400000">
+        <a:off x="0" y="1172764"/>
+        <a:ext cx="668814" cy="286634"/>
+      </dsp:txXfrm>
+    </dsp:sp>
+    <dsp:sp modelId="{E1B7CFBF-F71A-284D-90E9-D9DB3D3952B2}">
+      <dsp:nvSpPr>
+        <dsp:cNvPr id="0" name=""/>
+        <dsp:cNvSpPr/>
+      </dsp:nvSpPr>
+      <dsp:spPr>
+        <a:xfrm rot="5400000">
+          <a:off x="5538861" y="-4031689"/>
+          <a:ext cx="621041" cy="10361135"/>
+        </a:xfrm>
+        <a:prstGeom prst="round2SameRect">
+          <a:avLst/>
+        </a:prstGeom>
+        <a:solidFill>
+          <a:schemeClr val="lt1">
+            <a:alpha val="90000"/>
+            <a:hueOff val="0"/>
+            <a:satOff val="0"/>
+            <a:lumOff val="0"/>
+            <a:alphaOff val="0"/>
+          </a:schemeClr>
+        </a:solidFill>
+        <a:ln w="22225" cap="rnd" cmpd="sng" algn="ctr">
+          <a:solidFill>
+            <a:schemeClr val="accent1">
+              <a:hueOff val="0"/>
+              <a:satOff val="0"/>
+              <a:lumOff val="0"/>
+              <a:alphaOff val="0"/>
+            </a:schemeClr>
+          </a:solidFill>
+          <a:prstDash val="solid"/>
+        </a:ln>
+        <a:effectLst/>
+      </dsp:spPr>
+      <dsp:style>
+        <a:lnRef idx="2">
+          <a:scrgbClr r="0" g="0" b="0"/>
+        </a:lnRef>
+        <a:fillRef idx="1">
+          <a:scrgbClr r="0" g="0" b="0"/>
+        </a:fillRef>
+        <a:effectRef idx="0">
+          <a:scrgbClr r="0" g="0" b="0"/>
+        </a:effectRef>
+        <a:fontRef idx="minor"/>
+      </dsp:style>
+      <dsp:txBody>
+        <a:bodyPr spcFirstLastPara="0" vert="horz" wrap="square" lIns="270256" tIns="24130" rIns="24130" bIns="24130" numCol="1" spcCol="1270" anchor="ctr" anchorCtr="0">
+          <a:noAutofit/>
+        </a:bodyPr>
+        <a:lstStyle/>
+        <a:p>
+          <a:pPr marL="285750" lvl="1" indent="-285750" algn="l" defTabSz="1689100" rtl="0">
+            <a:lnSpc>
+              <a:spcPct val="90000"/>
+            </a:lnSpc>
+            <a:spcBef>
+              <a:spcPct val="0"/>
+            </a:spcBef>
+            <a:spcAft>
+              <a:spcPct val="15000"/>
+            </a:spcAft>
+            <a:buChar char="•"/>
+          </a:pPr>
+          <a:r>
+            <a:rPr lang="fr-FR" sz="3800" kern="1200" dirty="0"/>
+            <a:t>Introduction au sujet</a:t>
+          </a:r>
+        </a:p>
+      </dsp:txBody>
+      <dsp:txXfrm rot="-5400000">
+        <a:off x="668815" y="868674"/>
+        <a:ext cx="10330818" cy="560407"/>
+      </dsp:txXfrm>
+    </dsp:sp>
+    <dsp:sp modelId="{9240E98B-5A8E-F140-92FA-5865B1C531D8}">
+      <dsp:nvSpPr>
+        <dsp:cNvPr id="0" name=""/>
+        <dsp:cNvSpPr/>
+      </dsp:nvSpPr>
+      <dsp:spPr>
+        <a:xfrm rot="5400000">
+          <a:off x="-143317" y="1818242"/>
+          <a:ext cx="955448" cy="668814"/>
+        </a:xfrm>
+        <a:prstGeom prst="chevron">
+          <a:avLst/>
+        </a:prstGeom>
+        <a:solidFill>
+          <a:schemeClr val="accent1">
+            <a:hueOff val="0"/>
+            <a:satOff val="0"/>
+            <a:lumOff val="0"/>
+            <a:alphaOff val="0"/>
+          </a:schemeClr>
+        </a:solidFill>
+        <a:ln w="22225" cap="rnd" cmpd="sng" algn="ctr">
+          <a:solidFill>
+            <a:schemeClr val="accent1">
+              <a:hueOff val="0"/>
+              <a:satOff val="0"/>
+              <a:lumOff val="0"/>
+              <a:alphaOff val="0"/>
+            </a:schemeClr>
+          </a:solidFill>
+          <a:prstDash val="solid"/>
+        </a:ln>
+        <a:effectLst/>
+      </dsp:spPr>
+      <dsp:style>
+        <a:lnRef idx="2">
+          <a:scrgbClr r="0" g="0" b="0"/>
+        </a:lnRef>
+        <a:fillRef idx="1">
+          <a:scrgbClr r="0" g="0" b="0"/>
+        </a:fillRef>
+        <a:effectRef idx="0">
+          <a:scrgbClr r="0" g="0" b="0"/>
+        </a:effectRef>
+        <a:fontRef idx="minor">
+          <a:schemeClr val="lt1"/>
+        </a:fontRef>
+      </dsp:style>
+      <dsp:txBody>
+        <a:bodyPr spcFirstLastPara="0" vert="horz" wrap="square" lIns="12065" tIns="12065" rIns="12065" bIns="12065" numCol="1" spcCol="1270" anchor="ctr" anchorCtr="0">
+          <a:noAutofit/>
+        </a:bodyPr>
+        <a:lstStyle/>
+        <a:p>
+          <a:pPr marL="0" lvl="0" indent="0" algn="ctr" defTabSz="844550">
+            <a:lnSpc>
+              <a:spcPct val="90000"/>
+            </a:lnSpc>
+            <a:spcBef>
+              <a:spcPct val="0"/>
+            </a:spcBef>
+            <a:spcAft>
+              <a:spcPct val="35000"/>
+            </a:spcAft>
+            <a:buNone/>
+          </a:pPr>
+          <a:r>
+            <a:rPr lang="fr-FR" sz="1900" kern="1200" dirty="0"/>
+            <a:t>3</a:t>
+          </a:r>
+        </a:p>
+      </dsp:txBody>
+      <dsp:txXfrm rot="-5400000">
+        <a:off x="0" y="2009332"/>
+        <a:ext cx="668814" cy="286634"/>
+      </dsp:txXfrm>
+    </dsp:sp>
+    <dsp:sp modelId="{BE124A01-9177-BD44-8574-8086AC914778}">
+      <dsp:nvSpPr>
+        <dsp:cNvPr id="0" name=""/>
+        <dsp:cNvSpPr/>
+      </dsp:nvSpPr>
+      <dsp:spPr>
+        <a:xfrm rot="5400000">
+          <a:off x="5538861" y="-3195121"/>
+          <a:ext cx="621041" cy="10361135"/>
+        </a:xfrm>
+        <a:prstGeom prst="round2SameRect">
+          <a:avLst/>
+        </a:prstGeom>
+        <a:solidFill>
+          <a:schemeClr val="lt1">
+            <a:alpha val="90000"/>
+            <a:hueOff val="0"/>
+            <a:satOff val="0"/>
+            <a:lumOff val="0"/>
+            <a:alphaOff val="0"/>
+          </a:schemeClr>
+        </a:solidFill>
+        <a:ln w="22225" cap="rnd" cmpd="sng" algn="ctr">
+          <a:solidFill>
+            <a:schemeClr val="accent1">
+              <a:hueOff val="0"/>
+              <a:satOff val="0"/>
+              <a:lumOff val="0"/>
+              <a:alphaOff val="0"/>
+            </a:schemeClr>
+          </a:solidFill>
+          <a:prstDash val="solid"/>
+        </a:ln>
+        <a:effectLst/>
+      </dsp:spPr>
+      <dsp:style>
+        <a:lnRef idx="2">
+          <a:scrgbClr r="0" g="0" b="0"/>
+        </a:lnRef>
+        <a:fillRef idx="1">
+          <a:scrgbClr r="0" g="0" b="0"/>
+        </a:fillRef>
+        <a:effectRef idx="0">
+          <a:scrgbClr r="0" g="0" b="0"/>
+        </a:effectRef>
+        <a:fontRef idx="minor"/>
+      </dsp:style>
+      <dsp:txBody>
+        <a:bodyPr spcFirstLastPara="0" vert="horz" wrap="square" lIns="270256" tIns="24130" rIns="24130" bIns="24130" numCol="1" spcCol="1270" anchor="ctr" anchorCtr="0">
+          <a:noAutofit/>
+        </a:bodyPr>
+        <a:lstStyle/>
+        <a:p>
+          <a:pPr marL="285750" lvl="1" indent="-285750" algn="l" defTabSz="1689100" rtl="0">
+            <a:lnSpc>
+              <a:spcPct val="90000"/>
+            </a:lnSpc>
+            <a:spcBef>
+              <a:spcPct val="0"/>
+            </a:spcBef>
+            <a:spcAft>
+              <a:spcPct val="15000"/>
+            </a:spcAft>
+            <a:buChar char="•"/>
+          </a:pPr>
+          <a:r>
+            <a:rPr lang="fr-FR" sz="3800" kern="1200" dirty="0"/>
+            <a:t>Historique (chapitre 1)</a:t>
+          </a:r>
+        </a:p>
+      </dsp:txBody>
+      <dsp:txXfrm rot="-5400000">
+        <a:off x="668815" y="1705242"/>
+        <a:ext cx="10330818" cy="560407"/>
+      </dsp:txXfrm>
+    </dsp:sp>
+    <dsp:sp modelId="{15DAE497-84A1-AE48-9314-9434BC987A89}">
+      <dsp:nvSpPr>
+        <dsp:cNvPr id="0" name=""/>
+        <dsp:cNvSpPr/>
+      </dsp:nvSpPr>
+      <dsp:spPr>
+        <a:xfrm rot="5400000">
+          <a:off x="-143317" y="2654811"/>
+          <a:ext cx="955448" cy="668814"/>
+        </a:xfrm>
+        <a:prstGeom prst="chevron">
+          <a:avLst/>
+        </a:prstGeom>
+        <a:solidFill>
+          <a:schemeClr val="accent1">
+            <a:hueOff val="0"/>
+            <a:satOff val="0"/>
+            <a:lumOff val="0"/>
+            <a:alphaOff val="0"/>
+          </a:schemeClr>
+        </a:solidFill>
+        <a:ln w="22225" cap="rnd" cmpd="sng" algn="ctr">
+          <a:solidFill>
+            <a:schemeClr val="accent1">
+              <a:hueOff val="0"/>
+              <a:satOff val="0"/>
+              <a:lumOff val="0"/>
+              <a:alphaOff val="0"/>
+            </a:schemeClr>
+          </a:solidFill>
+          <a:prstDash val="solid"/>
+        </a:ln>
+        <a:effectLst/>
+      </dsp:spPr>
+      <dsp:style>
+        <a:lnRef idx="2">
+          <a:scrgbClr r="0" g="0" b="0"/>
+        </a:lnRef>
+        <a:fillRef idx="1">
+          <a:scrgbClr r="0" g="0" b="0"/>
+        </a:fillRef>
+        <a:effectRef idx="0">
+          <a:scrgbClr r="0" g="0" b="0"/>
+        </a:effectRef>
+        <a:fontRef idx="minor">
+          <a:schemeClr val="lt1"/>
+        </a:fontRef>
+      </dsp:style>
+      <dsp:txBody>
+        <a:bodyPr spcFirstLastPara="0" vert="horz" wrap="square" lIns="12065" tIns="12065" rIns="12065" bIns="12065" numCol="1" spcCol="1270" anchor="ctr" anchorCtr="0">
+          <a:noAutofit/>
+        </a:bodyPr>
+        <a:lstStyle/>
+        <a:p>
+          <a:pPr marL="0" lvl="0" indent="0" algn="ctr" defTabSz="844550">
+            <a:lnSpc>
+              <a:spcPct val="90000"/>
+            </a:lnSpc>
+            <a:spcBef>
+              <a:spcPct val="0"/>
+            </a:spcBef>
+            <a:spcAft>
+              <a:spcPct val="35000"/>
+            </a:spcAft>
+            <a:buNone/>
+          </a:pPr>
+          <a:r>
+            <a:rPr lang="fr-FR" sz="1900" kern="1200" dirty="0"/>
+            <a:t>4</a:t>
+          </a:r>
+        </a:p>
+      </dsp:txBody>
+      <dsp:txXfrm rot="-5400000">
+        <a:off x="0" y="2845901"/>
+        <a:ext cx="668814" cy="286634"/>
+      </dsp:txXfrm>
+    </dsp:sp>
+    <dsp:sp modelId="{46C1417E-EC79-704A-8037-C3E61EC49353}">
+      <dsp:nvSpPr>
+        <dsp:cNvPr id="0" name=""/>
+        <dsp:cNvSpPr/>
+      </dsp:nvSpPr>
+      <dsp:spPr>
+        <a:xfrm rot="5400000">
+          <a:off x="5538861" y="-2358552"/>
+          <a:ext cx="621041" cy="10361135"/>
+        </a:xfrm>
+        <a:prstGeom prst="round2SameRect">
+          <a:avLst/>
+        </a:prstGeom>
+        <a:solidFill>
+          <a:schemeClr val="lt1">
+            <a:alpha val="90000"/>
+            <a:hueOff val="0"/>
+            <a:satOff val="0"/>
+            <a:lumOff val="0"/>
+            <a:alphaOff val="0"/>
+          </a:schemeClr>
+        </a:solidFill>
+        <a:ln w="22225" cap="rnd" cmpd="sng" algn="ctr">
+          <a:solidFill>
+            <a:schemeClr val="accent1">
+              <a:hueOff val="0"/>
+              <a:satOff val="0"/>
+              <a:lumOff val="0"/>
+              <a:alphaOff val="0"/>
+            </a:schemeClr>
+          </a:solidFill>
+          <a:prstDash val="solid"/>
+        </a:ln>
+        <a:effectLst/>
+      </dsp:spPr>
+      <dsp:style>
+        <a:lnRef idx="2">
+          <a:scrgbClr r="0" g="0" b="0"/>
+        </a:lnRef>
+        <a:fillRef idx="1">
+          <a:scrgbClr r="0" g="0" b="0"/>
+        </a:fillRef>
+        <a:effectRef idx="0">
+          <a:scrgbClr r="0" g="0" b="0"/>
+        </a:effectRef>
+        <a:fontRef idx="minor"/>
+      </dsp:style>
+      <dsp:txBody>
+        <a:bodyPr spcFirstLastPara="0" vert="horz" wrap="square" lIns="270256" tIns="24130" rIns="24130" bIns="24130" numCol="1" spcCol="1270" anchor="ctr" anchorCtr="0">
+          <a:noAutofit/>
+        </a:bodyPr>
+        <a:lstStyle/>
+        <a:p>
+          <a:pPr marL="285750" lvl="1" indent="-285750" algn="l" defTabSz="1689100" rtl="0">
+            <a:lnSpc>
+              <a:spcPct val="90000"/>
+            </a:lnSpc>
+            <a:spcBef>
+              <a:spcPct val="0"/>
+            </a:spcBef>
+            <a:spcAft>
+              <a:spcPct val="15000"/>
+            </a:spcAft>
+            <a:buChar char="•"/>
+          </a:pPr>
+          <a:r>
+            <a:rPr lang="fr-FR" sz="3800" kern="1200" dirty="0"/>
+            <a:t>Formation d'une image (chapitre 2)</a:t>
+          </a:r>
+        </a:p>
+      </dsp:txBody>
+      <dsp:txXfrm rot="-5400000">
+        <a:off x="668815" y="2541811"/>
+        <a:ext cx="10330818" cy="560407"/>
+      </dsp:txXfrm>
+    </dsp:sp>
+    <dsp:sp modelId="{6EA3B489-1630-0D43-8F97-042DFC37DABC}">
+      <dsp:nvSpPr>
+        <dsp:cNvPr id="0" name=""/>
+        <dsp:cNvSpPr/>
+      </dsp:nvSpPr>
+      <dsp:spPr>
+        <a:xfrm rot="5400000">
+          <a:off x="-143317" y="3491379"/>
+          <a:ext cx="955448" cy="668814"/>
+        </a:xfrm>
+        <a:prstGeom prst="chevron">
+          <a:avLst/>
+        </a:prstGeom>
+        <a:solidFill>
+          <a:schemeClr val="accent1">
+            <a:hueOff val="0"/>
+            <a:satOff val="0"/>
+            <a:lumOff val="0"/>
+            <a:alphaOff val="0"/>
+          </a:schemeClr>
+        </a:solidFill>
+        <a:ln w="22225" cap="rnd" cmpd="sng" algn="ctr">
+          <a:solidFill>
+            <a:schemeClr val="accent1">
+              <a:hueOff val="0"/>
+              <a:satOff val="0"/>
+              <a:lumOff val="0"/>
+              <a:alphaOff val="0"/>
+            </a:schemeClr>
+          </a:solidFill>
+          <a:prstDash val="solid"/>
+        </a:ln>
+        <a:effectLst/>
+      </dsp:spPr>
+      <dsp:style>
+        <a:lnRef idx="2">
+          <a:scrgbClr r="0" g="0" b="0"/>
+        </a:lnRef>
+        <a:fillRef idx="1">
+          <a:scrgbClr r="0" g="0" b="0"/>
+        </a:fillRef>
+        <a:effectRef idx="0">
+          <a:scrgbClr r="0" g="0" b="0"/>
+        </a:effectRef>
+        <a:fontRef idx="minor">
+          <a:schemeClr val="lt1"/>
+        </a:fontRef>
+      </dsp:style>
+      <dsp:txBody>
+        <a:bodyPr spcFirstLastPara="0" vert="horz" wrap="square" lIns="12065" tIns="12065" rIns="12065" bIns="12065" numCol="1" spcCol="1270" anchor="ctr" anchorCtr="0">
+          <a:noAutofit/>
+        </a:bodyPr>
+        <a:lstStyle/>
+        <a:p>
+          <a:pPr marL="0" lvl="0" indent="0" algn="ctr" defTabSz="844550">
+            <a:lnSpc>
+              <a:spcPct val="90000"/>
+            </a:lnSpc>
+            <a:spcBef>
+              <a:spcPct val="0"/>
+            </a:spcBef>
+            <a:spcAft>
+              <a:spcPct val="35000"/>
+            </a:spcAft>
+            <a:buNone/>
+          </a:pPr>
+          <a:r>
+            <a:rPr lang="en-US" sz="1900" kern="1200" dirty="0"/>
+            <a:t>5</a:t>
+          </a:r>
+        </a:p>
+      </dsp:txBody>
+      <dsp:txXfrm rot="-5400000">
+        <a:off x="0" y="3682469"/>
+        <a:ext cx="668814" cy="286634"/>
+      </dsp:txXfrm>
+    </dsp:sp>
+    <dsp:sp modelId="{503BBB3A-922C-C843-9442-A9F83D840E17}">
+      <dsp:nvSpPr>
+        <dsp:cNvPr id="0" name=""/>
+        <dsp:cNvSpPr/>
+      </dsp:nvSpPr>
+      <dsp:spPr>
+        <a:xfrm rot="5400000">
+          <a:off x="5538861" y="-1521984"/>
+          <a:ext cx="621041" cy="10361135"/>
+        </a:xfrm>
+        <a:prstGeom prst="round2SameRect">
+          <a:avLst/>
+        </a:prstGeom>
+        <a:solidFill>
+          <a:schemeClr val="lt1">
+            <a:alpha val="90000"/>
+            <a:hueOff val="0"/>
+            <a:satOff val="0"/>
+            <a:lumOff val="0"/>
+            <a:alphaOff val="0"/>
+          </a:schemeClr>
+        </a:solidFill>
+        <a:ln w="22225" cap="rnd" cmpd="sng" algn="ctr">
+          <a:solidFill>
+            <a:schemeClr val="accent1">
+              <a:hueOff val="0"/>
+              <a:satOff val="0"/>
+              <a:lumOff val="0"/>
+              <a:alphaOff val="0"/>
+            </a:schemeClr>
+          </a:solidFill>
+          <a:prstDash val="solid"/>
+        </a:ln>
+        <a:effectLst/>
+      </dsp:spPr>
+      <dsp:style>
+        <a:lnRef idx="2">
+          <a:scrgbClr r="0" g="0" b="0"/>
+        </a:lnRef>
+        <a:fillRef idx="1">
+          <a:scrgbClr r="0" g="0" b="0"/>
+        </a:fillRef>
+        <a:effectRef idx="0">
+          <a:scrgbClr r="0" g="0" b="0"/>
+        </a:effectRef>
+        <a:fontRef idx="minor"/>
+      </dsp:style>
+      <dsp:txBody>
+        <a:bodyPr spcFirstLastPara="0" vert="horz" wrap="square" lIns="270256" tIns="24130" rIns="24130" bIns="24130" numCol="1" spcCol="1270" anchor="ctr" anchorCtr="0">
+          <a:noAutofit/>
+        </a:bodyPr>
+        <a:lstStyle/>
+        <a:p>
+          <a:pPr marL="285750" lvl="1" indent="-285750" algn="l" defTabSz="1689100">
+            <a:lnSpc>
+              <a:spcPct val="90000"/>
+            </a:lnSpc>
+            <a:spcBef>
+              <a:spcPct val="0"/>
+            </a:spcBef>
+            <a:spcAft>
+              <a:spcPct val="15000"/>
+            </a:spcAft>
+            <a:buChar char="•"/>
+          </a:pPr>
+          <a:r>
+            <a:rPr lang="en-US" sz="3800" kern="1200" dirty="0"/>
+            <a:t>Perspective</a:t>
+          </a:r>
+        </a:p>
+      </dsp:txBody>
+      <dsp:txXfrm rot="-5400000">
+        <a:off x="668815" y="3378379"/>
+        <a:ext cx="10330818" cy="560407"/>
+      </dsp:txXfrm>
+    </dsp:sp>
+  </dsp:spTree>
+</dsp:drawing>
+</file>
+
 <file path=ppt/diagrams/drawing2.xml><?xml version="1.0" encoding="utf-8"?>
 <dsp:drawing xmlns:dgm="http://schemas.openxmlformats.org/drawingml/2006/diagram" xmlns:dsp="http://schemas.microsoft.com/office/drawing/2008/diagram" xmlns:a="http://schemas.openxmlformats.org/drawingml/2006/main">
   <dsp:spTree>
@@ -17490,6 +19587,262 @@
 </dgm:layoutDef>
 </file>
 
+<file path=ppt/diagrams/layout12.xml><?xml version="1.0" encoding="utf-8"?>
+<dgm:layoutDef xmlns:dgm="http://schemas.openxmlformats.org/drawingml/2006/diagram" xmlns:a="http://schemas.openxmlformats.org/drawingml/2006/main" uniqueId="urn:microsoft.com/office/officeart/2005/8/layout/chevron2">
+  <dgm:title val=""/>
+  <dgm:desc val=""/>
+  <dgm:catLst>
+    <dgm:cat type="process" pri="12000"/>
+    <dgm:cat type="list" pri="16000"/>
+    <dgm:cat type="convert" pri="11000"/>
+  </dgm:catLst>
+  <dgm:sampData>
+    <dgm:dataModel>
+      <dgm:ptLst>
+        <dgm:pt modelId="0" type="doc"/>
+        <dgm:pt modelId="1">
+          <dgm:prSet phldr="1"/>
+        </dgm:pt>
+        <dgm:pt modelId="11">
+          <dgm:prSet phldr="1"/>
+        </dgm:pt>
+        <dgm:pt modelId="12">
+          <dgm:prSet phldr="1"/>
+        </dgm:pt>
+        <dgm:pt modelId="2">
+          <dgm:prSet phldr="1"/>
+        </dgm:pt>
+        <dgm:pt modelId="21">
+          <dgm:prSet phldr="1"/>
+        </dgm:pt>
+        <dgm:pt modelId="22">
+          <dgm:prSet phldr="1"/>
+        </dgm:pt>
+        <dgm:pt modelId="3">
+          <dgm:prSet phldr="1"/>
+        </dgm:pt>
+        <dgm:pt modelId="31">
+          <dgm:prSet phldr="1"/>
+        </dgm:pt>
+        <dgm:pt modelId="32">
+          <dgm:prSet phldr="1"/>
+        </dgm:pt>
+      </dgm:ptLst>
+      <dgm:cxnLst>
+        <dgm:cxn modelId="4" srcId="0" destId="1" srcOrd="0" destOrd="0"/>
+        <dgm:cxn modelId="5" srcId="0" destId="2" srcOrd="1" destOrd="0"/>
+        <dgm:cxn modelId="6" srcId="0" destId="3" srcOrd="2" destOrd="0"/>
+        <dgm:cxn modelId="13" srcId="1" destId="11" srcOrd="0" destOrd="0"/>
+        <dgm:cxn modelId="14" srcId="1" destId="12" srcOrd="1" destOrd="0"/>
+        <dgm:cxn modelId="23" srcId="2" destId="21" srcOrd="0" destOrd="0"/>
+        <dgm:cxn modelId="24" srcId="2" destId="22" srcOrd="1" destOrd="0"/>
+        <dgm:cxn modelId="33" srcId="3" destId="31" srcOrd="0" destOrd="0"/>
+        <dgm:cxn modelId="34" srcId="3" destId="32" srcOrd="1" destOrd="0"/>
+      </dgm:cxnLst>
+      <dgm:bg/>
+      <dgm:whole/>
+    </dgm:dataModel>
+  </dgm:sampData>
+  <dgm:styleData>
+    <dgm:dataModel>
+      <dgm:ptLst>
+        <dgm:pt modelId="0" type="doc"/>
+        <dgm:pt modelId="1"/>
+      </dgm:ptLst>
+      <dgm:cxnLst>
+        <dgm:cxn modelId="4" srcId="0" destId="1" srcOrd="0" destOrd="0"/>
+      </dgm:cxnLst>
+      <dgm:bg/>
+      <dgm:whole/>
+    </dgm:dataModel>
+  </dgm:styleData>
+  <dgm:clrData>
+    <dgm:dataModel>
+      <dgm:ptLst>
+        <dgm:pt modelId="0" type="doc"/>
+        <dgm:pt modelId="1"/>
+        <dgm:pt modelId="11"/>
+        <dgm:pt modelId="2"/>
+        <dgm:pt modelId="21"/>
+        <dgm:pt modelId="3"/>
+        <dgm:pt modelId="31"/>
+        <dgm:pt modelId="4"/>
+        <dgm:pt modelId="41"/>
+      </dgm:ptLst>
+      <dgm:cxnLst>
+        <dgm:cxn modelId="5" srcId="0" destId="1" srcOrd="0" destOrd="0"/>
+        <dgm:cxn modelId="6" srcId="0" destId="2" srcOrd="1" destOrd="0"/>
+        <dgm:cxn modelId="7" srcId="0" destId="3" srcOrd="2" destOrd="0"/>
+        <dgm:cxn modelId="8" srcId="0" destId="4" srcOrd="3" destOrd="0"/>
+        <dgm:cxn modelId="13" srcId="1" destId="11" srcOrd="0" destOrd="0"/>
+        <dgm:cxn modelId="23" srcId="2" destId="21" srcOrd="0" destOrd="0"/>
+        <dgm:cxn modelId="33" srcId="3" destId="31" srcOrd="0" destOrd="0"/>
+        <dgm:cxn modelId="43" srcId="4" destId="41" srcOrd="0" destOrd="0"/>
+      </dgm:cxnLst>
+      <dgm:bg/>
+      <dgm:whole/>
+    </dgm:dataModel>
+  </dgm:clrData>
+  <dgm:layoutNode name="linearFlow">
+    <dgm:varLst>
+      <dgm:dir/>
+      <dgm:animLvl val="lvl"/>
+      <dgm:resizeHandles val="exact"/>
+    </dgm:varLst>
+    <dgm:alg type="lin">
+      <dgm:param type="linDir" val="fromT"/>
+      <dgm:param type="nodeHorzAlign" val="l"/>
+    </dgm:alg>
+    <dgm:shape xmlns:r="http://schemas.openxmlformats.org/officeDocument/2006/relationships" r:blip="">
+      <dgm:adjLst/>
+    </dgm:shape>
+    <dgm:presOf/>
+    <dgm:constrLst>
+      <dgm:constr type="h" for="ch" forName="composite" refType="h"/>
+      <dgm:constr type="w" for="ch" forName="composite" refType="w"/>
+      <dgm:constr type="h" for="des" forName="parentText" op="equ"/>
+      <dgm:constr type="h" for="ch" forName="sp" val="-14.88"/>
+      <dgm:constr type="h" for="ch" forName="sp" refType="w" refFor="des" refForName="parentText" op="gte" fact="-0.3"/>
+      <dgm:constr type="primFontSz" for="des" forName="parentText" op="equ" val="65"/>
+      <dgm:constr type="primFontSz" for="des" forName="descendantText" op="equ" val="65"/>
+    </dgm:constrLst>
+    <dgm:ruleLst/>
+    <dgm:forEach name="Name0" axis="ch" ptType="node">
+      <dgm:layoutNode name="composite">
+        <dgm:alg type="composite"/>
+        <dgm:shape xmlns:r="http://schemas.openxmlformats.org/officeDocument/2006/relationships" r:blip="">
+          <dgm:adjLst/>
+        </dgm:shape>
+        <dgm:presOf/>
+        <dgm:choose name="Name1">
+          <dgm:if name="Name2" func="var" arg="dir" op="equ" val="norm">
+            <dgm:constrLst>
+              <dgm:constr type="t" for="ch" forName="parentText"/>
+              <dgm:constr type="l" for="ch" forName="parentText"/>
+              <dgm:constr type="w" for="ch" forName="parentText" refType="w" fact="0.4"/>
+              <dgm:constr type="h" for="ch" forName="parentText" refType="h"/>
+              <dgm:constr type="w" for="ch" forName="parentText" refType="w" op="lte" fact="0.5"/>
+              <dgm:constr type="w" for="ch" forName="parentText" refType="h" refFor="ch" refForName="parentText" op="lte" fact="0.7"/>
+              <dgm:constr type="h" for="ch" forName="parentText" refType="w" refFor="ch" refForName="parentText" op="lte" fact="3"/>
+              <dgm:constr type="l" for="ch" forName="descendantText" refType="w" refFor="ch" refForName="parentText"/>
+              <dgm:constr type="w" for="ch" forName="descendantText" refType="w"/>
+              <dgm:constr type="wOff" for="ch" forName="descendantText" refType="w" refFor="ch" refForName="parentText" fact="-1"/>
+              <dgm:constr type="t" for="ch" forName="descendantText"/>
+              <dgm:constr type="b" for="ch" forName="descendantText" refType="h" refFor="ch" refForName="parentText"/>
+              <dgm:constr type="bOff" for="ch" forName="descendantText" refType="w" refFor="ch" refForName="parentText" fact="-0.5"/>
+            </dgm:constrLst>
+          </dgm:if>
+          <dgm:else name="Name3">
+            <dgm:constrLst>
+              <dgm:constr type="t" for="ch" forName="parentText"/>
+              <dgm:constr type="r" for="ch" forName="parentText" refType="w"/>
+              <dgm:constr type="w" for="ch" forName="parentText" refType="w" fact="0.4"/>
+              <dgm:constr type="h" for="ch" forName="parentText" refType="h"/>
+              <dgm:constr type="w" for="ch" forName="parentText" refType="w" op="lte" fact="0.5"/>
+              <dgm:constr type="w" for="ch" forName="parentText" refType="h" refFor="ch" refForName="parentText" op="lte" fact="0.7"/>
+              <dgm:constr type="h" for="ch" forName="parentText" refType="w" refFor="ch" refForName="parentText" op="lte" fact="3"/>
+              <dgm:constr type="l" for="ch" forName="descendantText"/>
+              <dgm:constr type="w" for="ch" forName="descendantText" refType="w"/>
+              <dgm:constr type="wOff" for="ch" forName="descendantText" refType="w" refFor="ch" refForName="parentText" fact="-1"/>
+              <dgm:constr type="t" for="ch" forName="descendantText"/>
+              <dgm:constr type="b" for="ch" forName="descendantText" refType="h" refFor="ch" refForName="parentText"/>
+              <dgm:constr type="bOff" for="ch" forName="descendantText" refType="w" refFor="ch" refForName="parentText" fact="-0.5"/>
+            </dgm:constrLst>
+          </dgm:else>
+        </dgm:choose>
+        <dgm:ruleLst/>
+        <dgm:layoutNode name="parentText" styleLbl="alignNode1">
+          <dgm:varLst>
+            <dgm:chMax val="1"/>
+            <dgm:bulletEnabled val="1"/>
+          </dgm:varLst>
+          <dgm:alg type="tx"/>
+          <dgm:shape xmlns:r="http://schemas.openxmlformats.org/officeDocument/2006/relationships" rot="90" type="chevron" r:blip="">
+            <dgm:adjLst/>
+          </dgm:shape>
+          <dgm:presOf axis="self" ptType="node"/>
+          <dgm:constrLst>
+            <dgm:constr type="lMarg" refType="primFontSz" fact="0.05"/>
+            <dgm:constr type="rMarg" refType="primFontSz" fact="0.05"/>
+            <dgm:constr type="tMarg" refType="primFontSz" fact="0.05"/>
+            <dgm:constr type="bMarg" refType="primFontSz" fact="0.05"/>
+          </dgm:constrLst>
+          <dgm:ruleLst>
+            <dgm:rule type="h" val="100" fact="NaN" max="NaN"/>
+            <dgm:rule type="primFontSz" val="24" fact="NaN" max="NaN"/>
+            <dgm:rule type="h" val="110" fact="NaN" max="NaN"/>
+            <dgm:rule type="primFontSz" val="18" fact="NaN" max="NaN"/>
+            <dgm:rule type="h" val="INF" fact="NaN" max="NaN"/>
+            <dgm:rule type="primFontSz" val="5" fact="NaN" max="NaN"/>
+          </dgm:ruleLst>
+        </dgm:layoutNode>
+        <dgm:layoutNode name="descendantText" styleLbl="alignAcc1">
+          <dgm:varLst>
+            <dgm:bulletEnabled val="1"/>
+          </dgm:varLst>
+          <dgm:choose name="Name4">
+            <dgm:if name="Name5" func="var" arg="dir" op="equ" val="norm">
+              <dgm:alg type="tx">
+                <dgm:param type="stBulletLvl" val="1"/>
+                <dgm:param type="txAnchorVertCh" val="mid"/>
+              </dgm:alg>
+              <dgm:shape xmlns:r="http://schemas.openxmlformats.org/officeDocument/2006/relationships" rot="90" type="round2SameRect" r:blip="">
+                <dgm:adjLst/>
+              </dgm:shape>
+            </dgm:if>
+            <dgm:else name="Name6">
+              <dgm:alg type="tx">
+                <dgm:param type="stBulletLvl" val="1"/>
+                <dgm:param type="txAnchorVertCh" val="mid"/>
+              </dgm:alg>
+              <dgm:shape xmlns:r="http://schemas.openxmlformats.org/officeDocument/2006/relationships" rot="-90" type="round2SameRect" r:blip="">
+                <dgm:adjLst/>
+              </dgm:shape>
+            </dgm:else>
+          </dgm:choose>
+          <dgm:presOf axis="des" ptType="node"/>
+          <dgm:choose name="Name7">
+            <dgm:if name="Name8" func="var" arg="dir" op="equ" val="norm">
+              <dgm:constrLst>
+                <dgm:constr type="secFontSz" refType="primFontSz"/>
+                <dgm:constr type="tMarg" refType="primFontSz" fact="0.05"/>
+                <dgm:constr type="bMarg" refType="primFontSz" fact="0.05"/>
+                <dgm:constr type="rMarg" refType="primFontSz" fact="0.05"/>
+              </dgm:constrLst>
+            </dgm:if>
+            <dgm:else name="Name9">
+              <dgm:constrLst>
+                <dgm:constr type="secFontSz" refType="primFontSz"/>
+                <dgm:constr type="tMarg" refType="primFontSz" fact="0.05"/>
+                <dgm:constr type="bMarg" refType="primFontSz" fact="0.05"/>
+                <dgm:constr type="lMarg" refType="primFontSz" fact="0.05"/>
+              </dgm:constrLst>
+            </dgm:else>
+          </dgm:choose>
+          <dgm:ruleLst>
+            <dgm:rule type="primFontSz" val="5" fact="NaN" max="NaN"/>
+          </dgm:ruleLst>
+        </dgm:layoutNode>
+      </dgm:layoutNode>
+      <dgm:forEach name="Name10" axis="followSib" ptType="sibTrans" cnt="1">
+        <dgm:layoutNode name="sp">
+          <dgm:alg type="sp"/>
+          <dgm:shape xmlns:r="http://schemas.openxmlformats.org/officeDocument/2006/relationships" r:blip="">
+            <dgm:adjLst/>
+          </dgm:shape>
+          <dgm:presOf axis="self"/>
+          <dgm:constrLst>
+            <dgm:constr type="w" val="1"/>
+            <dgm:constr type="h" val="37.5"/>
+          </dgm:constrLst>
+          <dgm:ruleLst/>
+        </dgm:layoutNode>
+      </dgm:forEach>
+    </dgm:forEach>
+  </dgm:layoutNode>
+</dgm:layoutDef>
+</file>
+
 <file path=ppt/diagrams/layout2.xml><?xml version="1.0" encoding="utf-8"?>
 <dgm:layoutDef xmlns:dgm="http://schemas.openxmlformats.org/drawingml/2006/diagram" xmlns:a="http://schemas.openxmlformats.org/drawingml/2006/main" uniqueId="urn:microsoft.com/office/officeart/2008/layout/AccentedPicture">
   <dgm:title val=""/>
@@ -22200,6 +24553,1040 @@
 </dgm:styleDef>
 </file>
 
+<file path=ppt/diagrams/quickStyle12.xml><?xml version="1.0" encoding="utf-8"?>
+<dgm:styleDef xmlns:dgm="http://schemas.openxmlformats.org/drawingml/2006/diagram" xmlns:a="http://schemas.openxmlformats.org/drawingml/2006/main" uniqueId="urn:microsoft.com/office/officeart/2005/8/quickstyle/simple1">
+  <dgm:title val=""/>
+  <dgm:desc val=""/>
+  <dgm:catLst>
+    <dgm:cat type="simple" pri="10100"/>
+  </dgm:catLst>
+  <dgm:scene3d>
+    <a:camera prst="orthographicFront"/>
+    <a:lightRig rig="threePt" dir="t"/>
+  </dgm:scene3d>
+  <dgm:styleLbl name="node0">
+    <dgm:scene3d>
+      <a:camera prst="orthographicFront"/>
+      <a:lightRig rig="threePt" dir="t"/>
+    </dgm:scene3d>
+    <dgm:sp3d/>
+    <dgm:txPr/>
+    <dgm:style>
+      <a:lnRef idx="2">
+        <a:scrgbClr r="0" g="0" b="0"/>
+      </a:lnRef>
+      <a:fillRef idx="1">
+        <a:scrgbClr r="0" g="0" b="0"/>
+      </a:fillRef>
+      <a:effectRef idx="0">
+        <a:scrgbClr r="0" g="0" b="0"/>
+      </a:effectRef>
+      <a:fontRef idx="minor">
+        <a:schemeClr val="lt1"/>
+      </a:fontRef>
+    </dgm:style>
+  </dgm:styleLbl>
+  <dgm:styleLbl name="lnNode1">
+    <dgm:scene3d>
+      <a:camera prst="orthographicFront"/>
+      <a:lightRig rig="threePt" dir="t"/>
+    </dgm:scene3d>
+    <dgm:sp3d/>
+    <dgm:txPr/>
+    <dgm:style>
+      <a:lnRef idx="2">
+        <a:scrgbClr r="0" g="0" b="0"/>
+      </a:lnRef>
+      <a:fillRef idx="1">
+        <a:scrgbClr r="0" g="0" b="0"/>
+      </a:fillRef>
+      <a:effectRef idx="0">
+        <a:scrgbClr r="0" g="0" b="0"/>
+      </a:effectRef>
+      <a:fontRef idx="minor">
+        <a:schemeClr val="lt1"/>
+      </a:fontRef>
+    </dgm:style>
+  </dgm:styleLbl>
+  <dgm:styleLbl name="vennNode1">
+    <dgm:scene3d>
+      <a:camera prst="orthographicFront"/>
+      <a:lightRig rig="threePt" dir="t"/>
+    </dgm:scene3d>
+    <dgm:sp3d/>
+    <dgm:txPr/>
+    <dgm:style>
+      <a:lnRef idx="2">
+        <a:scrgbClr r="0" g="0" b="0"/>
+      </a:lnRef>
+      <a:fillRef idx="1">
+        <a:scrgbClr r="0" g="0" b="0"/>
+      </a:fillRef>
+      <a:effectRef idx="0">
+        <a:scrgbClr r="0" g="0" b="0"/>
+      </a:effectRef>
+      <a:fontRef idx="minor">
+        <a:schemeClr val="tx1"/>
+      </a:fontRef>
+    </dgm:style>
+  </dgm:styleLbl>
+  <dgm:styleLbl name="alignNode1">
+    <dgm:scene3d>
+      <a:camera prst="orthographicFront"/>
+      <a:lightRig rig="threePt" dir="t"/>
+    </dgm:scene3d>
+    <dgm:sp3d/>
+    <dgm:txPr/>
+    <dgm:style>
+      <a:lnRef idx="2">
+        <a:scrgbClr r="0" g="0" b="0"/>
+      </a:lnRef>
+      <a:fillRef idx="1">
+        <a:scrgbClr r="0" g="0" b="0"/>
+      </a:fillRef>
+      <a:effectRef idx="0">
+        <a:scrgbClr r="0" g="0" b="0"/>
+      </a:effectRef>
+      <a:fontRef idx="minor">
+        <a:schemeClr val="lt1"/>
+      </a:fontRef>
+    </dgm:style>
+  </dgm:styleLbl>
+  <dgm:styleLbl name="node1">
+    <dgm:scene3d>
+      <a:camera prst="orthographicFront"/>
+      <a:lightRig rig="threePt" dir="t"/>
+    </dgm:scene3d>
+    <dgm:sp3d/>
+    <dgm:txPr/>
+    <dgm:style>
+      <a:lnRef idx="2">
+        <a:scrgbClr r="0" g="0" b="0"/>
+      </a:lnRef>
+      <a:fillRef idx="1">
+        <a:scrgbClr r="0" g="0" b="0"/>
+      </a:fillRef>
+      <a:effectRef idx="0">
+        <a:scrgbClr r="0" g="0" b="0"/>
+      </a:effectRef>
+      <a:fontRef idx="minor">
+        <a:schemeClr val="lt1"/>
+      </a:fontRef>
+    </dgm:style>
+  </dgm:styleLbl>
+  <dgm:styleLbl name="node2">
+    <dgm:scene3d>
+      <a:camera prst="orthographicFront"/>
+      <a:lightRig rig="threePt" dir="t"/>
+    </dgm:scene3d>
+    <dgm:sp3d/>
+    <dgm:txPr/>
+    <dgm:style>
+      <a:lnRef idx="2">
+        <a:scrgbClr r="0" g="0" b="0"/>
+      </a:lnRef>
+      <a:fillRef idx="1">
+        <a:scrgbClr r="0" g="0" b="0"/>
+      </a:fillRef>
+      <a:effectRef idx="0">
+        <a:scrgbClr r="0" g="0" b="0"/>
+      </a:effectRef>
+      <a:fontRef idx="minor">
+        <a:schemeClr val="lt1"/>
+      </a:fontRef>
+    </dgm:style>
+  </dgm:styleLbl>
+  <dgm:styleLbl name="node3">
+    <dgm:scene3d>
+      <a:camera prst="orthographicFront"/>
+      <a:lightRig rig="threePt" dir="t"/>
+    </dgm:scene3d>
+    <dgm:sp3d/>
+    <dgm:txPr/>
+    <dgm:style>
+      <a:lnRef idx="2">
+        <a:scrgbClr r="0" g="0" b="0"/>
+      </a:lnRef>
+      <a:fillRef idx="1">
+        <a:scrgbClr r="0" g="0" b="0"/>
+      </a:fillRef>
+      <a:effectRef idx="0">
+        <a:scrgbClr r="0" g="0" b="0"/>
+      </a:effectRef>
+      <a:fontRef idx="minor">
+        <a:schemeClr val="lt1"/>
+      </a:fontRef>
+    </dgm:style>
+  </dgm:styleLbl>
+  <dgm:styleLbl name="node4">
+    <dgm:scene3d>
+      <a:camera prst="orthographicFront"/>
+      <a:lightRig rig="threePt" dir="t"/>
+    </dgm:scene3d>
+    <dgm:sp3d/>
+    <dgm:txPr/>
+    <dgm:style>
+      <a:lnRef idx="2">
+        <a:scrgbClr r="0" g="0" b="0"/>
+      </a:lnRef>
+      <a:fillRef idx="1">
+        <a:scrgbClr r="0" g="0" b="0"/>
+      </a:fillRef>
+      <a:effectRef idx="0">
+        <a:scrgbClr r="0" g="0" b="0"/>
+      </a:effectRef>
+      <a:fontRef idx="minor">
+        <a:schemeClr val="lt1"/>
+      </a:fontRef>
+    </dgm:style>
+  </dgm:styleLbl>
+  <dgm:styleLbl name="fgImgPlace1">
+    <dgm:scene3d>
+      <a:camera prst="orthographicFront"/>
+      <a:lightRig rig="threePt" dir="t"/>
+    </dgm:scene3d>
+    <dgm:sp3d/>
+    <dgm:txPr/>
+    <dgm:style>
+      <a:lnRef idx="2">
+        <a:scrgbClr r="0" g="0" b="0"/>
+      </a:lnRef>
+      <a:fillRef idx="1">
+        <a:scrgbClr r="0" g="0" b="0"/>
+      </a:fillRef>
+      <a:effectRef idx="0">
+        <a:scrgbClr r="0" g="0" b="0"/>
+      </a:effectRef>
+      <a:fontRef idx="minor"/>
+    </dgm:style>
+  </dgm:styleLbl>
+  <dgm:styleLbl name="alignImgPlace1">
+    <dgm:scene3d>
+      <a:camera prst="orthographicFront"/>
+      <a:lightRig rig="threePt" dir="t"/>
+    </dgm:scene3d>
+    <dgm:sp3d/>
+    <dgm:txPr/>
+    <dgm:style>
+      <a:lnRef idx="2">
+        <a:scrgbClr r="0" g="0" b="0"/>
+      </a:lnRef>
+      <a:fillRef idx="1">
+        <a:scrgbClr r="0" g="0" b="0"/>
+      </a:fillRef>
+      <a:effectRef idx="0">
+        <a:scrgbClr r="0" g="0" b="0"/>
+      </a:effectRef>
+      <a:fontRef idx="minor"/>
+    </dgm:style>
+  </dgm:styleLbl>
+  <dgm:styleLbl name="bgImgPlace1">
+    <dgm:scene3d>
+      <a:camera prst="orthographicFront"/>
+      <a:lightRig rig="threePt" dir="t"/>
+    </dgm:scene3d>
+    <dgm:sp3d/>
+    <dgm:txPr/>
+    <dgm:style>
+      <a:lnRef idx="2">
+        <a:scrgbClr r="0" g="0" b="0"/>
+      </a:lnRef>
+      <a:fillRef idx="1">
+        <a:scrgbClr r="0" g="0" b="0"/>
+      </a:fillRef>
+      <a:effectRef idx="0">
+        <a:scrgbClr r="0" g="0" b="0"/>
+      </a:effectRef>
+      <a:fontRef idx="minor"/>
+    </dgm:style>
+  </dgm:styleLbl>
+  <dgm:styleLbl name="sibTrans2D1">
+    <dgm:scene3d>
+      <a:camera prst="orthographicFront"/>
+      <a:lightRig rig="threePt" dir="t"/>
+    </dgm:scene3d>
+    <dgm:sp3d/>
+    <dgm:txPr/>
+    <dgm:style>
+      <a:lnRef idx="0">
+        <a:scrgbClr r="0" g="0" b="0"/>
+      </a:lnRef>
+      <a:fillRef idx="1">
+        <a:scrgbClr r="0" g="0" b="0"/>
+      </a:fillRef>
+      <a:effectRef idx="0">
+        <a:scrgbClr r="0" g="0" b="0"/>
+      </a:effectRef>
+      <a:fontRef idx="minor">
+        <a:schemeClr val="lt1"/>
+      </a:fontRef>
+    </dgm:style>
+  </dgm:styleLbl>
+  <dgm:styleLbl name="fgSibTrans2D1">
+    <dgm:scene3d>
+      <a:camera prst="orthographicFront"/>
+      <a:lightRig rig="threePt" dir="t"/>
+    </dgm:scene3d>
+    <dgm:sp3d/>
+    <dgm:txPr/>
+    <dgm:style>
+      <a:lnRef idx="0">
+        <a:scrgbClr r="0" g="0" b="0"/>
+      </a:lnRef>
+      <a:fillRef idx="1">
+        <a:scrgbClr r="0" g="0" b="0"/>
+      </a:fillRef>
+      <a:effectRef idx="0">
+        <a:scrgbClr r="0" g="0" b="0"/>
+      </a:effectRef>
+      <a:fontRef idx="minor">
+        <a:schemeClr val="lt1"/>
+      </a:fontRef>
+    </dgm:style>
+  </dgm:styleLbl>
+  <dgm:styleLbl name="bgSibTrans2D1">
+    <dgm:scene3d>
+      <a:camera prst="orthographicFront"/>
+      <a:lightRig rig="threePt" dir="t"/>
+    </dgm:scene3d>
+    <dgm:sp3d/>
+    <dgm:txPr/>
+    <dgm:style>
+      <a:lnRef idx="0">
+        <a:scrgbClr r="0" g="0" b="0"/>
+      </a:lnRef>
+      <a:fillRef idx="1">
+        <a:scrgbClr r="0" g="0" b="0"/>
+      </a:fillRef>
+      <a:effectRef idx="0">
+        <a:scrgbClr r="0" g="0" b="0"/>
+      </a:effectRef>
+      <a:fontRef idx="minor">
+        <a:schemeClr val="lt1"/>
+      </a:fontRef>
+    </dgm:style>
+  </dgm:styleLbl>
+  <dgm:styleLbl name="sibTrans1D1">
+    <dgm:scene3d>
+      <a:camera prst="orthographicFront"/>
+      <a:lightRig rig="threePt" dir="t"/>
+    </dgm:scene3d>
+    <dgm:sp3d/>
+    <dgm:txPr/>
+    <dgm:style>
+      <a:lnRef idx="1">
+        <a:scrgbClr r="0" g="0" b="0"/>
+      </a:lnRef>
+      <a:fillRef idx="0">
+        <a:scrgbClr r="0" g="0" b="0"/>
+      </a:fillRef>
+      <a:effectRef idx="0">
+        <a:scrgbClr r="0" g="0" b="0"/>
+      </a:effectRef>
+      <a:fontRef idx="minor"/>
+    </dgm:style>
+  </dgm:styleLbl>
+  <dgm:styleLbl name="callout">
+    <dgm:scene3d>
+      <a:camera prst="orthographicFront"/>
+      <a:lightRig rig="threePt" dir="t"/>
+    </dgm:scene3d>
+    <dgm:sp3d/>
+    <dgm:txPr/>
+    <dgm:style>
+      <a:lnRef idx="2">
+        <a:scrgbClr r="0" g="0" b="0"/>
+      </a:lnRef>
+      <a:fillRef idx="1">
+        <a:scrgbClr r="0" g="0" b="0"/>
+      </a:fillRef>
+      <a:effectRef idx="0">
+        <a:scrgbClr r="0" g="0" b="0"/>
+      </a:effectRef>
+      <a:fontRef idx="minor"/>
+    </dgm:style>
+  </dgm:styleLbl>
+  <dgm:styleLbl name="asst0">
+    <dgm:scene3d>
+      <a:camera prst="orthographicFront"/>
+      <a:lightRig rig="threePt" dir="t"/>
+    </dgm:scene3d>
+    <dgm:sp3d/>
+    <dgm:txPr/>
+    <dgm:style>
+      <a:lnRef idx="2">
+        <a:scrgbClr r="0" g="0" b="0"/>
+      </a:lnRef>
+      <a:fillRef idx="1">
+        <a:scrgbClr r="0" g="0" b="0"/>
+      </a:fillRef>
+      <a:effectRef idx="0">
+        <a:scrgbClr r="0" g="0" b="0"/>
+      </a:effectRef>
+      <a:fontRef idx="minor">
+        <a:schemeClr val="lt1"/>
+      </a:fontRef>
+    </dgm:style>
+  </dgm:styleLbl>
+  <dgm:styleLbl name="asst1">
+    <dgm:scene3d>
+      <a:camera prst="orthographicFront"/>
+      <a:lightRig rig="threePt" dir="t"/>
+    </dgm:scene3d>
+    <dgm:sp3d/>
+    <dgm:txPr/>
+    <dgm:style>
+      <a:lnRef idx="2">
+        <a:scrgbClr r="0" g="0" b="0"/>
+      </a:lnRef>
+      <a:fillRef idx="1">
+        <a:scrgbClr r="0" g="0" b="0"/>
+      </a:fillRef>
+      <a:effectRef idx="0">
+        <a:scrgbClr r="0" g="0" b="0"/>
+      </a:effectRef>
+      <a:fontRef idx="minor">
+        <a:schemeClr val="lt1"/>
+      </a:fontRef>
+    </dgm:style>
+  </dgm:styleLbl>
+  <dgm:styleLbl name="asst2">
+    <dgm:scene3d>
+      <a:camera prst="orthographicFront"/>
+      <a:lightRig rig="threePt" dir="t"/>
+    </dgm:scene3d>
+    <dgm:sp3d/>
+    <dgm:txPr/>
+    <dgm:style>
+      <a:lnRef idx="2">
+        <a:scrgbClr r="0" g="0" b="0"/>
+      </a:lnRef>
+      <a:fillRef idx="1">
+        <a:scrgbClr r="0" g="0" b="0"/>
+      </a:fillRef>
+      <a:effectRef idx="0">
+        <a:scrgbClr r="0" g="0" b="0"/>
+      </a:effectRef>
+      <a:fontRef idx="minor">
+        <a:schemeClr val="lt1"/>
+      </a:fontRef>
+    </dgm:style>
+  </dgm:styleLbl>
+  <dgm:styleLbl name="asst3">
+    <dgm:scene3d>
+      <a:camera prst="orthographicFront"/>
+      <a:lightRig rig="threePt" dir="t"/>
+    </dgm:scene3d>
+    <dgm:sp3d/>
+    <dgm:txPr/>
+    <dgm:style>
+      <a:lnRef idx="2">
+        <a:scrgbClr r="0" g="0" b="0"/>
+      </a:lnRef>
+      <a:fillRef idx="1">
+        <a:scrgbClr r="0" g="0" b="0"/>
+      </a:fillRef>
+      <a:effectRef idx="0">
+        <a:scrgbClr r="0" g="0" b="0"/>
+      </a:effectRef>
+      <a:fontRef idx="minor">
+        <a:schemeClr val="lt1"/>
+      </a:fontRef>
+    </dgm:style>
+  </dgm:styleLbl>
+  <dgm:styleLbl name="asst4">
+    <dgm:scene3d>
+      <a:camera prst="orthographicFront"/>
+      <a:lightRig rig="threePt" dir="t"/>
+    </dgm:scene3d>
+    <dgm:sp3d/>
+    <dgm:txPr/>
+    <dgm:style>
+      <a:lnRef idx="2">
+        <a:scrgbClr r="0" g="0" b="0"/>
+      </a:lnRef>
+      <a:fillRef idx="1">
+        <a:scrgbClr r="0" g="0" b="0"/>
+      </a:fillRef>
+      <a:effectRef idx="0">
+        <a:scrgbClr r="0" g="0" b="0"/>
+      </a:effectRef>
+      <a:fontRef idx="minor">
+        <a:schemeClr val="lt1"/>
+      </a:fontRef>
+    </dgm:style>
+  </dgm:styleLbl>
+  <dgm:styleLbl name="parChTrans2D1">
+    <dgm:scene3d>
+      <a:camera prst="orthographicFront"/>
+      <a:lightRig rig="threePt" dir="t"/>
+    </dgm:scene3d>
+    <dgm:sp3d/>
+    <dgm:txPr/>
+    <dgm:style>
+      <a:lnRef idx="2">
+        <a:scrgbClr r="0" g="0" b="0"/>
+      </a:lnRef>
+      <a:fillRef idx="1">
+        <a:scrgbClr r="0" g="0" b="0"/>
+      </a:fillRef>
+      <a:effectRef idx="0">
+        <a:scrgbClr r="0" g="0" b="0"/>
+      </a:effectRef>
+      <a:fontRef idx="minor">
+        <a:schemeClr val="lt1"/>
+      </a:fontRef>
+    </dgm:style>
+  </dgm:styleLbl>
+  <dgm:styleLbl name="parChTrans2D2">
+    <dgm:scene3d>
+      <a:camera prst="orthographicFront"/>
+      <a:lightRig rig="threePt" dir="t"/>
+    </dgm:scene3d>
+    <dgm:sp3d/>
+    <dgm:txPr/>
+    <dgm:style>
+      <a:lnRef idx="2">
+        <a:scrgbClr r="0" g="0" b="0"/>
+      </a:lnRef>
+      <a:fillRef idx="1">
+        <a:scrgbClr r="0" g="0" b="0"/>
+      </a:fillRef>
+      <a:effectRef idx="0">
+        <a:scrgbClr r="0" g="0" b="0"/>
+      </a:effectRef>
+      <a:fontRef idx="minor">
+        <a:schemeClr val="lt1"/>
+      </a:fontRef>
+    </dgm:style>
+  </dgm:styleLbl>
+  <dgm:styleLbl name="parChTrans2D3">
+    <dgm:scene3d>
+      <a:camera prst="orthographicFront"/>
+      <a:lightRig rig="threePt" dir="t"/>
+    </dgm:scene3d>
+    <dgm:sp3d/>
+    <dgm:txPr/>
+    <dgm:style>
+      <a:lnRef idx="2">
+        <a:scrgbClr r="0" g="0" b="0"/>
+      </a:lnRef>
+      <a:fillRef idx="1">
+        <a:scrgbClr r="0" g="0" b="0"/>
+      </a:fillRef>
+      <a:effectRef idx="0">
+        <a:scrgbClr r="0" g="0" b="0"/>
+      </a:effectRef>
+      <a:fontRef idx="minor">
+        <a:schemeClr val="lt1"/>
+      </a:fontRef>
+    </dgm:style>
+  </dgm:styleLbl>
+  <dgm:styleLbl name="parChTrans2D4">
+    <dgm:scene3d>
+      <a:camera prst="orthographicFront"/>
+      <a:lightRig rig="threePt" dir="t"/>
+    </dgm:scene3d>
+    <dgm:sp3d/>
+    <dgm:txPr/>
+    <dgm:style>
+      <a:lnRef idx="2">
+        <a:scrgbClr r="0" g="0" b="0"/>
+      </a:lnRef>
+      <a:fillRef idx="1">
+        <a:scrgbClr r="0" g="0" b="0"/>
+      </a:fillRef>
+      <a:effectRef idx="0">
+        <a:scrgbClr r="0" g="0" b="0"/>
+      </a:effectRef>
+      <a:fontRef idx="minor">
+        <a:schemeClr val="lt1"/>
+      </a:fontRef>
+    </dgm:style>
+  </dgm:styleLbl>
+  <dgm:styleLbl name="parChTrans1D1">
+    <dgm:scene3d>
+      <a:camera prst="orthographicFront"/>
+      <a:lightRig rig="threePt" dir="t"/>
+    </dgm:scene3d>
+    <dgm:sp3d/>
+    <dgm:txPr/>
+    <dgm:style>
+      <a:lnRef idx="2">
+        <a:scrgbClr r="0" g="0" b="0"/>
+      </a:lnRef>
+      <a:fillRef idx="0">
+        <a:scrgbClr r="0" g="0" b="0"/>
+      </a:fillRef>
+      <a:effectRef idx="0">
+        <a:scrgbClr r="0" g="0" b="0"/>
+      </a:effectRef>
+      <a:fontRef idx="minor"/>
+    </dgm:style>
+  </dgm:styleLbl>
+  <dgm:styleLbl name="parChTrans1D2">
+    <dgm:scene3d>
+      <a:camera prst="orthographicFront"/>
+      <a:lightRig rig="threePt" dir="t"/>
+    </dgm:scene3d>
+    <dgm:sp3d/>
+    <dgm:txPr/>
+    <dgm:style>
+      <a:lnRef idx="2">
+        <a:scrgbClr r="0" g="0" b="0"/>
+      </a:lnRef>
+      <a:fillRef idx="0">
+        <a:scrgbClr r="0" g="0" b="0"/>
+      </a:fillRef>
+      <a:effectRef idx="0">
+        <a:scrgbClr r="0" g="0" b="0"/>
+      </a:effectRef>
+      <a:fontRef idx="minor"/>
+    </dgm:style>
+  </dgm:styleLbl>
+  <dgm:styleLbl name="parChTrans1D3">
+    <dgm:scene3d>
+      <a:camera prst="orthographicFront"/>
+      <a:lightRig rig="threePt" dir="t"/>
+    </dgm:scene3d>
+    <dgm:sp3d/>
+    <dgm:txPr/>
+    <dgm:style>
+      <a:lnRef idx="2">
+        <a:scrgbClr r="0" g="0" b="0"/>
+      </a:lnRef>
+      <a:fillRef idx="0">
+        <a:scrgbClr r="0" g="0" b="0"/>
+      </a:fillRef>
+      <a:effectRef idx="0">
+        <a:scrgbClr r="0" g="0" b="0"/>
+      </a:effectRef>
+      <a:fontRef idx="minor"/>
+    </dgm:style>
+  </dgm:styleLbl>
+  <dgm:styleLbl name="parChTrans1D4">
+    <dgm:scene3d>
+      <a:camera prst="orthographicFront"/>
+      <a:lightRig rig="threePt" dir="t"/>
+    </dgm:scene3d>
+    <dgm:sp3d/>
+    <dgm:txPr/>
+    <dgm:style>
+      <a:lnRef idx="2">
+        <a:scrgbClr r="0" g="0" b="0"/>
+      </a:lnRef>
+      <a:fillRef idx="0">
+        <a:scrgbClr r="0" g="0" b="0"/>
+      </a:fillRef>
+      <a:effectRef idx="0">
+        <a:scrgbClr r="0" g="0" b="0"/>
+      </a:effectRef>
+      <a:fontRef idx="minor"/>
+    </dgm:style>
+  </dgm:styleLbl>
+  <dgm:styleLbl name="fgAcc1">
+    <dgm:scene3d>
+      <a:camera prst="orthographicFront"/>
+      <a:lightRig rig="threePt" dir="t"/>
+    </dgm:scene3d>
+    <dgm:sp3d/>
+    <dgm:txPr/>
+    <dgm:style>
+      <a:lnRef idx="2">
+        <a:scrgbClr r="0" g="0" b="0"/>
+      </a:lnRef>
+      <a:fillRef idx="1">
+        <a:scrgbClr r="0" g="0" b="0"/>
+      </a:fillRef>
+      <a:effectRef idx="0">
+        <a:scrgbClr r="0" g="0" b="0"/>
+      </a:effectRef>
+      <a:fontRef idx="minor"/>
+    </dgm:style>
+  </dgm:styleLbl>
+  <dgm:styleLbl name="conFgAcc1">
+    <dgm:scene3d>
+      <a:camera prst="orthographicFront"/>
+      <a:lightRig rig="threePt" dir="t"/>
+    </dgm:scene3d>
+    <dgm:sp3d/>
+    <dgm:txPr/>
+    <dgm:style>
+      <a:lnRef idx="2">
+        <a:scrgbClr r="0" g="0" b="0"/>
+      </a:lnRef>
+      <a:fillRef idx="1">
+        <a:scrgbClr r="0" g="0" b="0"/>
+      </a:fillRef>
+      <a:effectRef idx="0">
+        <a:scrgbClr r="0" g="0" b="0"/>
+      </a:effectRef>
+      <a:fontRef idx="minor"/>
+    </dgm:style>
+  </dgm:styleLbl>
+  <dgm:styleLbl name="alignAcc1">
+    <dgm:scene3d>
+      <a:camera prst="orthographicFront"/>
+      <a:lightRig rig="threePt" dir="t"/>
+    </dgm:scene3d>
+    <dgm:sp3d/>
+    <dgm:txPr/>
+    <dgm:style>
+      <a:lnRef idx="2">
+        <a:scrgbClr r="0" g="0" b="0"/>
+      </a:lnRef>
+      <a:fillRef idx="1">
+        <a:scrgbClr r="0" g="0" b="0"/>
+      </a:fillRef>
+      <a:effectRef idx="0">
+        <a:scrgbClr r="0" g="0" b="0"/>
+      </a:effectRef>
+      <a:fontRef idx="minor"/>
+    </dgm:style>
+  </dgm:styleLbl>
+  <dgm:styleLbl name="trAlignAcc1">
+    <dgm:scene3d>
+      <a:camera prst="orthographicFront"/>
+      <a:lightRig rig="threePt" dir="t"/>
+    </dgm:scene3d>
+    <dgm:sp3d/>
+    <dgm:txPr/>
+    <dgm:style>
+      <a:lnRef idx="1">
+        <a:scrgbClr r="0" g="0" b="0"/>
+      </a:lnRef>
+      <a:fillRef idx="1">
+        <a:scrgbClr r="0" g="0" b="0"/>
+      </a:fillRef>
+      <a:effectRef idx="0">
+        <a:scrgbClr r="0" g="0" b="0"/>
+      </a:effectRef>
+      <a:fontRef idx="minor"/>
+    </dgm:style>
+  </dgm:styleLbl>
+  <dgm:styleLbl name="bgAcc1">
+    <dgm:scene3d>
+      <a:camera prst="orthographicFront"/>
+      <a:lightRig rig="threePt" dir="t"/>
+    </dgm:scene3d>
+    <dgm:sp3d/>
+    <dgm:txPr/>
+    <dgm:style>
+      <a:lnRef idx="2">
+        <a:scrgbClr r="0" g="0" b="0"/>
+      </a:lnRef>
+      <a:fillRef idx="1">
+        <a:scrgbClr r="0" g="0" b="0"/>
+      </a:fillRef>
+      <a:effectRef idx="0">
+        <a:scrgbClr r="0" g="0" b="0"/>
+      </a:effectRef>
+      <a:fontRef idx="minor"/>
+    </dgm:style>
+  </dgm:styleLbl>
+  <dgm:styleLbl name="solidFgAcc1">
+    <dgm:scene3d>
+      <a:camera prst="orthographicFront"/>
+      <a:lightRig rig="threePt" dir="t"/>
+    </dgm:scene3d>
+    <dgm:sp3d/>
+    <dgm:txPr/>
+    <dgm:style>
+      <a:lnRef idx="2">
+        <a:scrgbClr r="0" g="0" b="0"/>
+      </a:lnRef>
+      <a:fillRef idx="1">
+        <a:scrgbClr r="0" g="0" b="0"/>
+      </a:fillRef>
+      <a:effectRef idx="0">
+        <a:scrgbClr r="0" g="0" b="0"/>
+      </a:effectRef>
+      <a:fontRef idx="minor"/>
+    </dgm:style>
+  </dgm:styleLbl>
+  <dgm:styleLbl name="solidAlignAcc1">
+    <dgm:scene3d>
+      <a:camera prst="orthographicFront"/>
+      <a:lightRig rig="threePt" dir="t"/>
+    </dgm:scene3d>
+    <dgm:sp3d/>
+    <dgm:txPr/>
+    <dgm:style>
+      <a:lnRef idx="2">
+        <a:scrgbClr r="0" g="0" b="0"/>
+      </a:lnRef>
+      <a:fillRef idx="1">
+        <a:scrgbClr r="0" g="0" b="0"/>
+      </a:fillRef>
+      <a:effectRef idx="0">
+        <a:scrgbClr r="0" g="0" b="0"/>
+      </a:effectRef>
+      <a:fontRef idx="minor"/>
+    </dgm:style>
+  </dgm:styleLbl>
+  <dgm:styleLbl name="solidBgAcc1">
+    <dgm:scene3d>
+      <a:camera prst="orthographicFront"/>
+      <a:lightRig rig="threePt" dir="t"/>
+    </dgm:scene3d>
+    <dgm:sp3d/>
+    <dgm:txPr/>
+    <dgm:style>
+      <a:lnRef idx="2">
+        <a:scrgbClr r="0" g="0" b="0"/>
+      </a:lnRef>
+      <a:fillRef idx="1">
+        <a:scrgbClr r="0" g="0" b="0"/>
+      </a:fillRef>
+      <a:effectRef idx="0">
+        <a:scrgbClr r="0" g="0" b="0"/>
+      </a:effectRef>
+      <a:fontRef idx="minor"/>
+    </dgm:style>
+  </dgm:styleLbl>
+  <dgm:styleLbl name="fgAccFollowNode1">
+    <dgm:scene3d>
+      <a:camera prst="orthographicFront"/>
+      <a:lightRig rig="threePt" dir="t"/>
+    </dgm:scene3d>
+    <dgm:sp3d/>
+    <dgm:txPr/>
+    <dgm:style>
+      <a:lnRef idx="2">
+        <a:scrgbClr r="0" g="0" b="0"/>
+      </a:lnRef>
+      <a:fillRef idx="1">
+        <a:scrgbClr r="0" g="0" b="0"/>
+      </a:fillRef>
+      <a:effectRef idx="0">
+        <a:scrgbClr r="0" g="0" b="0"/>
+      </a:effectRef>
+      <a:fontRef idx="minor"/>
+    </dgm:style>
+  </dgm:styleLbl>
+  <dgm:styleLbl name="alignAccFollowNode1">
+    <dgm:scene3d>
+      <a:camera prst="orthographicFront"/>
+      <a:lightRig rig="threePt" dir="t"/>
+    </dgm:scene3d>
+    <dgm:sp3d/>
+    <dgm:txPr/>
+    <dgm:style>
+      <a:lnRef idx="2">
+        <a:scrgbClr r="0" g="0" b="0"/>
+      </a:lnRef>
+      <a:fillRef idx="1">
+        <a:scrgbClr r="0" g="0" b="0"/>
+      </a:fillRef>
+      <a:effectRef idx="0">
+        <a:scrgbClr r="0" g="0" b="0"/>
+      </a:effectRef>
+      <a:fontRef idx="minor"/>
+    </dgm:style>
+  </dgm:styleLbl>
+  <dgm:styleLbl name="bgAccFollowNode1">
+    <dgm:scene3d>
+      <a:camera prst="orthographicFront"/>
+      <a:lightRig rig="threePt" dir="t"/>
+    </dgm:scene3d>
+    <dgm:sp3d/>
+    <dgm:txPr/>
+    <dgm:style>
+      <a:lnRef idx="2">
+        <a:scrgbClr r="0" g="0" b="0"/>
+      </a:lnRef>
+      <a:fillRef idx="1">
+        <a:scrgbClr r="0" g="0" b="0"/>
+      </a:fillRef>
+      <a:effectRef idx="0">
+        <a:scrgbClr r="0" g="0" b="0"/>
+      </a:effectRef>
+      <a:fontRef idx="minor"/>
+    </dgm:style>
+  </dgm:styleLbl>
+  <dgm:styleLbl name="fgAcc0">
+    <dgm:scene3d>
+      <a:camera prst="orthographicFront"/>
+      <a:lightRig rig="threePt" dir="t"/>
+    </dgm:scene3d>
+    <dgm:sp3d/>
+    <dgm:txPr/>
+    <dgm:style>
+      <a:lnRef idx="2">
+        <a:scrgbClr r="0" g="0" b="0"/>
+      </a:lnRef>
+      <a:fillRef idx="1">
+        <a:scrgbClr r="0" g="0" b="0"/>
+      </a:fillRef>
+      <a:effectRef idx="0">
+        <a:scrgbClr r="0" g="0" b="0"/>
+      </a:effectRef>
+      <a:fontRef idx="minor"/>
+    </dgm:style>
+  </dgm:styleLbl>
+  <dgm:styleLbl name="fgAcc2">
+    <dgm:scene3d>
+      <a:camera prst="orthographicFront"/>
+      <a:lightRig rig="threePt" dir="t"/>
+    </dgm:scene3d>
+    <dgm:sp3d/>
+    <dgm:txPr/>
+    <dgm:style>
+      <a:lnRef idx="2">
+        <a:scrgbClr r="0" g="0" b="0"/>
+      </a:lnRef>
+      <a:fillRef idx="1">
+        <a:scrgbClr r="0" g="0" b="0"/>
+      </a:fillRef>
+      <a:effectRef idx="0">
+        <a:scrgbClr r="0" g="0" b="0"/>
+      </a:effectRef>
+      <a:fontRef idx="minor"/>
+    </dgm:style>
+  </dgm:styleLbl>
+  <dgm:styleLbl name="fgAcc3">
+    <dgm:scene3d>
+      <a:camera prst="orthographicFront"/>
+      <a:lightRig rig="threePt" dir="t"/>
+    </dgm:scene3d>
+    <dgm:sp3d/>
+    <dgm:txPr/>
+    <dgm:style>
+      <a:lnRef idx="2">
+        <a:scrgbClr r="0" g="0" b="0"/>
+      </a:lnRef>
+      <a:fillRef idx="1">
+        <a:scrgbClr r="0" g="0" b="0"/>
+      </a:fillRef>
+      <a:effectRef idx="0">
+        <a:scrgbClr r="0" g="0" b="0"/>
+      </a:effectRef>
+      <a:fontRef idx="minor"/>
+    </dgm:style>
+  </dgm:styleLbl>
+  <dgm:styleLbl name="fgAcc4">
+    <dgm:scene3d>
+      <a:camera prst="orthographicFront"/>
+      <a:lightRig rig="threePt" dir="t"/>
+    </dgm:scene3d>
+    <dgm:sp3d/>
+    <dgm:txPr/>
+    <dgm:style>
+      <a:lnRef idx="2">
+        <a:scrgbClr r="0" g="0" b="0"/>
+      </a:lnRef>
+      <a:fillRef idx="1">
+        <a:scrgbClr r="0" g="0" b="0"/>
+      </a:fillRef>
+      <a:effectRef idx="0">
+        <a:scrgbClr r="0" g="0" b="0"/>
+      </a:effectRef>
+      <a:fontRef idx="minor"/>
+    </dgm:style>
+  </dgm:styleLbl>
+  <dgm:styleLbl name="bgShp">
+    <dgm:scene3d>
+      <a:camera prst="orthographicFront"/>
+      <a:lightRig rig="threePt" dir="t"/>
+    </dgm:scene3d>
+    <dgm:sp3d/>
+    <dgm:txPr/>
+    <dgm:style>
+      <a:lnRef idx="0">
+        <a:scrgbClr r="0" g="0" b="0"/>
+      </a:lnRef>
+      <a:fillRef idx="1">
+        <a:scrgbClr r="0" g="0" b="0"/>
+      </a:fillRef>
+      <a:effectRef idx="0">
+        <a:scrgbClr r="0" g="0" b="0"/>
+      </a:effectRef>
+      <a:fontRef idx="minor"/>
+    </dgm:style>
+  </dgm:styleLbl>
+  <dgm:styleLbl name="dkBgShp">
+    <dgm:scene3d>
+      <a:camera prst="orthographicFront"/>
+      <a:lightRig rig="threePt" dir="t"/>
+    </dgm:scene3d>
+    <dgm:sp3d/>
+    <dgm:txPr/>
+    <dgm:style>
+      <a:lnRef idx="0">
+        <a:scrgbClr r="0" g="0" b="0"/>
+      </a:lnRef>
+      <a:fillRef idx="1">
+        <a:scrgbClr r="0" g="0" b="0"/>
+      </a:fillRef>
+      <a:effectRef idx="0">
+        <a:scrgbClr r="0" g="0" b="0"/>
+      </a:effectRef>
+      <a:fontRef idx="minor"/>
+    </dgm:style>
+  </dgm:styleLbl>
+  <dgm:styleLbl name="trBgShp">
+    <dgm:scene3d>
+      <a:camera prst="orthographicFront"/>
+      <a:lightRig rig="threePt" dir="t"/>
+    </dgm:scene3d>
+    <dgm:sp3d/>
+    <dgm:txPr/>
+    <dgm:style>
+      <a:lnRef idx="0">
+        <a:scrgbClr r="0" g="0" b="0"/>
+      </a:lnRef>
+      <a:fillRef idx="1">
+        <a:scrgbClr r="0" g="0" b="0"/>
+      </a:fillRef>
+      <a:effectRef idx="0">
+        <a:scrgbClr r="0" g="0" b="0"/>
+      </a:effectRef>
+      <a:fontRef idx="minor"/>
+    </dgm:style>
+  </dgm:styleLbl>
+  <dgm:styleLbl name="fgShp">
+    <dgm:scene3d>
+      <a:camera prst="orthographicFront"/>
+      <a:lightRig rig="threePt" dir="t"/>
+    </dgm:scene3d>
+    <dgm:sp3d/>
+    <dgm:txPr/>
+    <dgm:style>
+      <a:lnRef idx="2">
+        <a:scrgbClr r="0" g="0" b="0"/>
+      </a:lnRef>
+      <a:fillRef idx="1">
+        <a:scrgbClr r="0" g="0" b="0"/>
+      </a:fillRef>
+      <a:effectRef idx="0">
+        <a:scrgbClr r="0" g="0" b="0"/>
+      </a:effectRef>
+      <a:fontRef idx="minor"/>
+    </dgm:style>
+  </dgm:styleLbl>
+  <dgm:styleLbl name="revTx">
+    <dgm:scene3d>
+      <a:camera prst="orthographicFront"/>
+      <a:lightRig rig="threePt" dir="t"/>
+    </dgm:scene3d>
+    <dgm:sp3d/>
+    <dgm:txPr/>
+    <dgm:style>
+      <a:lnRef idx="0">
+        <a:scrgbClr r="0" g="0" b="0"/>
+      </a:lnRef>
+      <a:fillRef idx="0">
+        <a:scrgbClr r="0" g="0" b="0"/>
+      </a:fillRef>
+      <a:effectRef idx="0">
+        <a:scrgbClr r="0" g="0" b="0"/>
+      </a:effectRef>
+      <a:fontRef idx="minor"/>
+    </dgm:style>
+  </dgm:styleLbl>
+</dgm:styleDef>
+</file>
+
 <file path=ppt/diagrams/quickStyle2.xml><?xml version="1.0" encoding="utf-8"?>
 <dgm:styleDef xmlns:dgm="http://schemas.openxmlformats.org/drawingml/2006/diagram" xmlns:a="http://schemas.openxmlformats.org/drawingml/2006/main" uniqueId="urn:microsoft.com/office/officeart/2005/8/quickstyle/simple1">
   <dgm:title val=""/>
@@ -30718,7 +34105,7 @@
             <a:fld id="{B61BEF0D-F0BB-DE4B-95CE-6DB70DBA9567}" type="datetimeFigureOut">
               <a:rPr lang="en-US" dirty="0"/>
               <a:pPr/>
-              <a:t>11/15/18</a:t>
+              <a:t>12/19/18</a:t>
             </a:fld>
             <a:endParaRPr lang="en-US" dirty="0"/>
           </a:p>
@@ -30989,7 +34376,7 @@
             <a:fld id="{B61BEF0D-F0BB-DE4B-95CE-6DB70DBA9567}" type="datetimeFigureOut">
               <a:rPr lang="en-US" dirty="0"/>
               <a:pPr/>
-              <a:t>11/15/18</a:t>
+              <a:t>12/19/18</a:t>
             </a:fld>
             <a:endParaRPr lang="en-US" dirty="0"/>
           </a:p>
@@ -31233,7 +34620,7 @@
             <a:fld id="{B61BEF0D-F0BB-DE4B-95CE-6DB70DBA9567}" type="datetimeFigureOut">
               <a:rPr lang="en-US" dirty="0"/>
               <a:pPr/>
-              <a:t>11/15/18</a:t>
+              <a:t>12/19/18</a:t>
             </a:fld>
             <a:endParaRPr lang="en-US" dirty="0"/>
           </a:p>
@@ -31482,7 +34869,7 @@
             <a:fld id="{B61BEF0D-F0BB-DE4B-95CE-6DB70DBA9567}" type="datetimeFigureOut">
               <a:rPr lang="en-US" dirty="0"/>
               <a:pPr/>
-              <a:t>11/15/18</a:t>
+              <a:t>12/19/18</a:t>
             </a:fld>
             <a:endParaRPr lang="en-US" dirty="0"/>
           </a:p>
@@ -31798,7 +35185,7 @@
             <a:fld id="{B61BEF0D-F0BB-DE4B-95CE-6DB70DBA9567}" type="datetimeFigureOut">
               <a:rPr lang="en-US" dirty="0"/>
               <a:pPr/>
-              <a:t>11/15/18</a:t>
+              <a:t>12/19/18</a:t>
             </a:fld>
             <a:endParaRPr lang="en-US" dirty="0"/>
           </a:p>
@@ -32109,7 +35496,7 @@
             <a:fld id="{B61BEF0D-F0BB-DE4B-95CE-6DB70DBA9567}" type="datetimeFigureOut">
               <a:rPr lang="en-US" dirty="0"/>
               <a:pPr/>
-              <a:t>11/15/18</a:t>
+              <a:t>12/19/18</a:t>
             </a:fld>
             <a:endParaRPr lang="en-US" dirty="0"/>
           </a:p>
@@ -32540,7 +35927,7 @@
             <a:fld id="{B61BEF0D-F0BB-DE4B-95CE-6DB70DBA9567}" type="datetimeFigureOut">
               <a:rPr lang="en-US" dirty="0"/>
               <a:pPr/>
-              <a:t>11/15/18</a:t>
+              <a:t>12/19/18</a:t>
             </a:fld>
             <a:endParaRPr lang="en-US" dirty="0"/>
           </a:p>
@@ -32711,7 +36098,7 @@
             <a:fld id="{B61BEF0D-F0BB-DE4B-95CE-6DB70DBA9567}" type="datetimeFigureOut">
               <a:rPr lang="en-US" dirty="0"/>
               <a:pPr/>
-              <a:t>11/15/18</a:t>
+              <a:t>12/19/18</a:t>
             </a:fld>
             <a:endParaRPr lang="en-US" dirty="0"/>
           </a:p>
@@ -32815,7 +36202,7 @@
             <a:fld id="{B61BEF0D-F0BB-DE4B-95CE-6DB70DBA9567}" type="datetimeFigureOut">
               <a:rPr lang="en-US" dirty="0"/>
               <a:pPr/>
-              <a:t>11/15/18</a:t>
+              <a:t>12/19/18</a:t>
             </a:fld>
             <a:endParaRPr lang="en-US" dirty="0"/>
           </a:p>
@@ -33202,7 +36589,7 @@
             <a:fld id="{B61BEF0D-F0BB-DE4B-95CE-6DB70DBA9567}" type="datetimeFigureOut">
               <a:rPr lang="en-US" dirty="0"/>
               <a:pPr/>
-              <a:t>11/15/18</a:t>
+              <a:t>12/19/18</a:t>
             </a:fld>
             <a:endParaRPr lang="en-US" dirty="0"/>
           </a:p>
@@ -33500,7 +36887,7 @@
             <a:fld id="{B61BEF0D-F0BB-DE4B-95CE-6DB70DBA9567}" type="datetimeFigureOut">
               <a:rPr lang="en-US" dirty="0"/>
               <a:pPr/>
-              <a:t>11/15/18</a:t>
+              <a:t>12/19/18</a:t>
             </a:fld>
             <a:endParaRPr lang="en-US" dirty="0"/>
           </a:p>
@@ -33720,7 +37107,7 @@
             <a:fld id="{B61BEF0D-F0BB-DE4B-95CE-6DB70DBA9567}" type="datetimeFigureOut">
               <a:rPr lang="en-US" dirty="0"/>
               <a:pPr/>
-              <a:t>11/15/18</a:t>
+              <a:t>12/19/18</a:t>
             </a:fld>
             <a:endParaRPr lang="en-US" dirty="0"/>
           </a:p>
@@ -34384,7 +37771,7 @@
             </a:r>
             <a:r>
               <a:rPr lang="fr-FR" dirty="0"/>
-              <a:t> and application</a:t>
+              <a:t> and application – Chapitre 1 et 2</a:t>
             </a:r>
           </a:p>
         </p:txBody>
@@ -35335,6 +38722,465 @@
     <p:extLst>
       <p:ext uri="{BB962C8B-B14F-4D97-AF65-F5344CB8AC3E}">
         <p14:creationId xmlns:p14="http://schemas.microsoft.com/office/powerpoint/2010/main" val="4052472378"/>
+      </p:ext>
+    </p:extLst>
+  </p:cSld>
+  <p:clrMapOvr>
+    <a:masterClrMapping/>
+  </p:clrMapOvr>
+  <mc:AlternateContent xmlns:mc="http://schemas.openxmlformats.org/markup-compatibility/2006" xmlns:p14="http://schemas.microsoft.com/office/powerpoint/2010/main">
+    <mc:Choice Requires="p14">
+      <p:transition spd="slow" p14:dur="1100">
+        <p14:doors dir="vert"/>
+      </p:transition>
+    </mc:Choice>
+    <mc:Fallback xmlns="">
+      <p:transition spd="slow">
+        <p:fade/>
+      </p:transition>
+    </mc:Fallback>
+  </mc:AlternateContent>
+</p:sld>
+</file>
+
+<file path=ppt/slides/slide16.xml><?xml version="1.0" encoding="utf-8"?>
+<p:sld xmlns:a="http://schemas.openxmlformats.org/drawingml/2006/main" xmlns:r="http://schemas.openxmlformats.org/officeDocument/2006/relationships" xmlns:p="http://schemas.openxmlformats.org/presentationml/2006/main">
+  <p:cSld>
+    <p:spTree>
+      <p:nvGrpSpPr>
+        <p:cNvPr id="1" name=""/>
+        <p:cNvGrpSpPr/>
+        <p:nvPr/>
+      </p:nvGrpSpPr>
+      <p:grpSpPr>
+        <a:xfrm>
+          <a:off x="0" y="0"/>
+          <a:ext cx="0" cy="0"/>
+          <a:chOff x="0" y="0"/>
+          <a:chExt cx="0" cy="0"/>
+        </a:xfrm>
+      </p:grpSpPr>
+      <p:sp>
+        <p:nvSpPr>
+          <p:cNvPr id="2" name="Title 1">
+            <a:extLst>
+              <a:ext uri="{FF2B5EF4-FFF2-40B4-BE49-F238E27FC236}">
+                <a16:creationId xmlns:a16="http://schemas.microsoft.com/office/drawing/2014/main" id="{98A7C7A3-3569-5C42-BDE0-9D1DBDF23AD9}"/>
+              </a:ext>
+            </a:extLst>
+          </p:cNvPr>
+          <p:cNvSpPr>
+            <a:spLocks noGrp="1"/>
+          </p:cNvSpPr>
+          <p:nvPr>
+            <p:ph type="ctrTitle"/>
+          </p:nvPr>
+        </p:nvSpPr>
+        <p:spPr/>
+        <p:txBody>
+          <a:bodyPr/>
+          <a:lstStyle/>
+          <a:p>
+            <a:r>
+              <a:rPr lang="fr-FR" dirty="0"/>
+              <a:t>Computer vision</a:t>
+            </a:r>
+          </a:p>
+        </p:txBody>
+      </p:sp>
+      <p:sp>
+        <p:nvSpPr>
+          <p:cNvPr id="3" name="Subtitle 2">
+            <a:extLst>
+              <a:ext uri="{FF2B5EF4-FFF2-40B4-BE49-F238E27FC236}">
+                <a16:creationId xmlns:a16="http://schemas.microsoft.com/office/drawing/2014/main" id="{8A309CFD-0B0F-484D-8549-A9AAB88A3B22}"/>
+              </a:ext>
+            </a:extLst>
+          </p:cNvPr>
+          <p:cNvSpPr>
+            <a:spLocks noGrp="1"/>
+          </p:cNvSpPr>
+          <p:nvPr>
+            <p:ph type="subTitle" idx="1"/>
+          </p:nvPr>
+        </p:nvSpPr>
+        <p:spPr/>
+        <p:txBody>
+          <a:bodyPr/>
+          <a:lstStyle/>
+          <a:p>
+            <a:r>
+              <a:rPr lang="fr-FR" dirty="0" err="1"/>
+              <a:t>Algorithms</a:t>
+            </a:r>
+            <a:r>
+              <a:rPr lang="fr-FR" dirty="0"/>
+              <a:t> and application – </a:t>
+            </a:r>
+            <a:r>
+              <a:rPr lang="fr-FR"/>
+              <a:t>Chapitre 3 et 4</a:t>
+            </a:r>
+            <a:endParaRPr lang="fr-FR" dirty="0"/>
+          </a:p>
+        </p:txBody>
+      </p:sp>
+      <p:sp>
+        <p:nvSpPr>
+          <p:cNvPr id="4" name="Subtitle 2">
+            <a:extLst>
+              <a:ext uri="{FF2B5EF4-FFF2-40B4-BE49-F238E27FC236}">
+                <a16:creationId xmlns:a16="http://schemas.microsoft.com/office/drawing/2014/main" id="{64118D0F-F58F-4744-A691-A4F3C5DA9587}"/>
+              </a:ext>
+            </a:extLst>
+          </p:cNvPr>
+          <p:cNvSpPr txBox="1">
+            <a:spLocks/>
+          </p:cNvSpPr>
+          <p:nvPr/>
+        </p:nvSpPr>
+        <p:spPr>
+          <a:xfrm>
+            <a:off x="581194" y="5719658"/>
+            <a:ext cx="10993546" cy="590321"/>
+          </a:xfrm>
+          <a:prstGeom prst="rect">
+            <a:avLst/>
+          </a:prstGeom>
+        </p:spPr>
+        <p:txBody>
+          <a:bodyPr vert="horz" lIns="91440" tIns="45720" rIns="91440" bIns="45720" rtlCol="0" anchor="t">
+            <a:normAutofit/>
+          </a:bodyPr>
+          <a:lstStyle>
+            <a:lvl1pPr marL="0" indent="0" algn="l" defTabSz="457200" rtl="0" eaLnBrk="1" latinLnBrk="0" hangingPunct="1">
+              <a:spcBef>
+                <a:spcPct val="20000"/>
+              </a:spcBef>
+              <a:spcAft>
+                <a:spcPts val="600"/>
+              </a:spcAft>
+              <a:buClr>
+                <a:schemeClr val="accent2"/>
+              </a:buClr>
+              <a:buSzPct val="92000"/>
+              <a:buFont typeface="Wingdings 2" panose="05020102010507070707" pitchFamily="18" charset="2"/>
+              <a:buNone/>
+              <a:defRPr sz="1600" kern="1200" cap="all">
+                <a:solidFill>
+                  <a:schemeClr val="accent2"/>
+                </a:solidFill>
+                <a:latin typeface="+mn-lt"/>
+                <a:ea typeface="+mn-ea"/>
+                <a:cs typeface="+mn-cs"/>
+              </a:defRPr>
+            </a:lvl1pPr>
+            <a:lvl2pPr marL="457200" indent="0" algn="ctr" defTabSz="457200" rtl="0" eaLnBrk="1" latinLnBrk="0" hangingPunct="1">
+              <a:spcBef>
+                <a:spcPct val="20000"/>
+              </a:spcBef>
+              <a:spcAft>
+                <a:spcPts val="600"/>
+              </a:spcAft>
+              <a:buClr>
+                <a:schemeClr val="accent2"/>
+              </a:buClr>
+              <a:buSzPct val="92000"/>
+              <a:buFont typeface="Wingdings 2" panose="05020102010507070707" pitchFamily="18" charset="2"/>
+              <a:buNone/>
+              <a:defRPr sz="1600" kern="1200">
+                <a:solidFill>
+                  <a:schemeClr val="tx1">
+                    <a:tint val="75000"/>
+                  </a:schemeClr>
+                </a:solidFill>
+                <a:latin typeface="+mn-lt"/>
+                <a:ea typeface="+mn-ea"/>
+                <a:cs typeface="+mn-cs"/>
+              </a:defRPr>
+            </a:lvl2pPr>
+            <a:lvl3pPr marL="914400" indent="0" algn="ctr" defTabSz="457200" rtl="0" eaLnBrk="1" latinLnBrk="0" hangingPunct="1">
+              <a:spcBef>
+                <a:spcPct val="20000"/>
+              </a:spcBef>
+              <a:spcAft>
+                <a:spcPts val="600"/>
+              </a:spcAft>
+              <a:buClr>
+                <a:schemeClr val="accent2"/>
+              </a:buClr>
+              <a:buSzPct val="92000"/>
+              <a:buFont typeface="Wingdings 2" panose="05020102010507070707" pitchFamily="18" charset="2"/>
+              <a:buNone/>
+              <a:defRPr sz="1400" kern="1200">
+                <a:solidFill>
+                  <a:schemeClr val="tx1">
+                    <a:tint val="75000"/>
+                  </a:schemeClr>
+                </a:solidFill>
+                <a:latin typeface="+mn-lt"/>
+                <a:ea typeface="+mn-ea"/>
+                <a:cs typeface="+mn-cs"/>
+              </a:defRPr>
+            </a:lvl3pPr>
+            <a:lvl4pPr marL="1371600" indent="0" algn="ctr" defTabSz="457200" rtl="0" eaLnBrk="1" latinLnBrk="0" hangingPunct="1">
+              <a:spcBef>
+                <a:spcPct val="20000"/>
+              </a:spcBef>
+              <a:spcAft>
+                <a:spcPts val="600"/>
+              </a:spcAft>
+              <a:buClr>
+                <a:schemeClr val="accent2"/>
+              </a:buClr>
+              <a:buSzPct val="92000"/>
+              <a:buFont typeface="Wingdings 2" panose="05020102010507070707" pitchFamily="18" charset="2"/>
+              <a:buNone/>
+              <a:defRPr sz="1200" kern="1200">
+                <a:solidFill>
+                  <a:schemeClr val="tx1">
+                    <a:tint val="75000"/>
+                  </a:schemeClr>
+                </a:solidFill>
+                <a:latin typeface="+mn-lt"/>
+                <a:ea typeface="+mn-ea"/>
+                <a:cs typeface="+mn-cs"/>
+              </a:defRPr>
+            </a:lvl4pPr>
+            <a:lvl5pPr marL="1828800" indent="0" algn="ctr" defTabSz="457200" rtl="0" eaLnBrk="1" latinLnBrk="0" hangingPunct="1">
+              <a:spcBef>
+                <a:spcPct val="20000"/>
+              </a:spcBef>
+              <a:spcAft>
+                <a:spcPts val="600"/>
+              </a:spcAft>
+              <a:buClr>
+                <a:schemeClr val="accent2"/>
+              </a:buClr>
+              <a:buSzPct val="92000"/>
+              <a:buFont typeface="Wingdings 2" panose="05020102010507070707" pitchFamily="18" charset="2"/>
+              <a:buNone/>
+              <a:defRPr sz="1200" kern="1200">
+                <a:solidFill>
+                  <a:schemeClr val="tx1">
+                    <a:tint val="75000"/>
+                  </a:schemeClr>
+                </a:solidFill>
+                <a:latin typeface="+mn-lt"/>
+                <a:ea typeface="+mn-ea"/>
+                <a:cs typeface="+mn-cs"/>
+              </a:defRPr>
+            </a:lvl5pPr>
+            <a:lvl6pPr marL="2286000" indent="0" algn="ctr" defTabSz="457200" rtl="0" eaLnBrk="1" latinLnBrk="0" hangingPunct="1">
+              <a:spcBef>
+                <a:spcPct val="20000"/>
+              </a:spcBef>
+              <a:spcAft>
+                <a:spcPts val="600"/>
+              </a:spcAft>
+              <a:buClr>
+                <a:schemeClr val="accent2"/>
+              </a:buClr>
+              <a:buSzPct val="92000"/>
+              <a:buFont typeface="Wingdings 2" panose="05020102010507070707" pitchFamily="18" charset="2"/>
+              <a:buNone/>
+              <a:defRPr sz="1200" kern="1200">
+                <a:solidFill>
+                  <a:schemeClr val="tx1">
+                    <a:tint val="75000"/>
+                  </a:schemeClr>
+                </a:solidFill>
+                <a:latin typeface="+mn-lt"/>
+                <a:ea typeface="+mn-ea"/>
+                <a:cs typeface="+mn-cs"/>
+              </a:defRPr>
+            </a:lvl6pPr>
+            <a:lvl7pPr marL="2743200" indent="0" algn="ctr" defTabSz="457200" rtl="0" eaLnBrk="1" latinLnBrk="0" hangingPunct="1">
+              <a:spcBef>
+                <a:spcPct val="20000"/>
+              </a:spcBef>
+              <a:spcAft>
+                <a:spcPts val="600"/>
+              </a:spcAft>
+              <a:buClr>
+                <a:schemeClr val="accent2"/>
+              </a:buClr>
+              <a:buSzPct val="92000"/>
+              <a:buFont typeface="Wingdings 2" panose="05020102010507070707" pitchFamily="18" charset="2"/>
+              <a:buNone/>
+              <a:defRPr sz="1200" kern="1200">
+                <a:solidFill>
+                  <a:schemeClr val="tx1">
+                    <a:tint val="75000"/>
+                  </a:schemeClr>
+                </a:solidFill>
+                <a:latin typeface="+mn-lt"/>
+                <a:ea typeface="+mn-ea"/>
+                <a:cs typeface="+mn-cs"/>
+              </a:defRPr>
+            </a:lvl7pPr>
+            <a:lvl8pPr marL="3200400" indent="0" algn="ctr" defTabSz="457200" rtl="0" eaLnBrk="1" latinLnBrk="0" hangingPunct="1">
+              <a:spcBef>
+                <a:spcPct val="20000"/>
+              </a:spcBef>
+              <a:spcAft>
+                <a:spcPts val="600"/>
+              </a:spcAft>
+              <a:buClr>
+                <a:schemeClr val="accent2"/>
+              </a:buClr>
+              <a:buSzPct val="92000"/>
+              <a:buFont typeface="Wingdings 2" panose="05020102010507070707" pitchFamily="18" charset="2"/>
+              <a:buNone/>
+              <a:defRPr sz="1200" kern="1200">
+                <a:solidFill>
+                  <a:schemeClr val="tx1">
+                    <a:tint val="75000"/>
+                  </a:schemeClr>
+                </a:solidFill>
+                <a:latin typeface="+mn-lt"/>
+                <a:ea typeface="+mn-ea"/>
+                <a:cs typeface="+mn-cs"/>
+              </a:defRPr>
+            </a:lvl8pPr>
+            <a:lvl9pPr marL="3657600" indent="0" algn="ctr" defTabSz="457200" rtl="0" eaLnBrk="1" latinLnBrk="0" hangingPunct="1">
+              <a:spcBef>
+                <a:spcPct val="20000"/>
+              </a:spcBef>
+              <a:spcAft>
+                <a:spcPts val="600"/>
+              </a:spcAft>
+              <a:buClr>
+                <a:schemeClr val="accent2"/>
+              </a:buClr>
+              <a:buSzPct val="92000"/>
+              <a:buFont typeface="Wingdings 2" panose="05020102010507070707" pitchFamily="18" charset="2"/>
+              <a:buNone/>
+              <a:defRPr sz="1200" kern="1200">
+                <a:solidFill>
+                  <a:schemeClr val="tx1">
+                    <a:tint val="75000"/>
+                  </a:schemeClr>
+                </a:solidFill>
+                <a:latin typeface="+mn-lt"/>
+                <a:ea typeface="+mn-ea"/>
+                <a:cs typeface="+mn-cs"/>
+              </a:defRPr>
+            </a:lvl9pPr>
+          </a:lstStyle>
+          <a:p>
+            <a:r>
+              <a:rPr lang="fr-FR" dirty="0">
+                <a:solidFill>
+                  <a:schemeClr val="bg1"/>
+                </a:solidFill>
+              </a:rPr>
+              <a:t>Omar MHAIMDAT – Projet Bibliographique</a:t>
+            </a:r>
+          </a:p>
+        </p:txBody>
+      </p:sp>
+    </p:spTree>
+    <p:extLst>
+      <p:ext uri="{BB962C8B-B14F-4D97-AF65-F5344CB8AC3E}">
+        <p14:creationId xmlns:p14="http://schemas.microsoft.com/office/powerpoint/2010/main" val="1367265375"/>
+      </p:ext>
+    </p:extLst>
+  </p:cSld>
+  <p:clrMapOvr>
+    <a:masterClrMapping/>
+  </p:clrMapOvr>
+  <mc:AlternateContent xmlns:mc="http://schemas.openxmlformats.org/markup-compatibility/2006" xmlns:p14="http://schemas.microsoft.com/office/powerpoint/2010/main">
+    <mc:Choice Requires="p14">
+      <p:transition spd="slow" p14:dur="1100">
+        <p14:doors dir="vert"/>
+      </p:transition>
+    </mc:Choice>
+    <mc:Fallback xmlns="">
+      <p:transition spd="slow">
+        <p:fade/>
+      </p:transition>
+    </mc:Fallback>
+  </mc:AlternateContent>
+</p:sld>
+</file>
+
+<file path=ppt/slides/slide17.xml><?xml version="1.0" encoding="utf-8"?>
+<p:sld xmlns:a="http://schemas.openxmlformats.org/drawingml/2006/main" xmlns:r="http://schemas.openxmlformats.org/officeDocument/2006/relationships" xmlns:p="http://schemas.openxmlformats.org/presentationml/2006/main">
+  <p:cSld>
+    <p:spTree>
+      <p:nvGrpSpPr>
+        <p:cNvPr id="1" name=""/>
+        <p:cNvGrpSpPr/>
+        <p:nvPr/>
+      </p:nvGrpSpPr>
+      <p:grpSpPr>
+        <a:xfrm>
+          <a:off x="0" y="0"/>
+          <a:ext cx="0" cy="0"/>
+          <a:chOff x="0" y="0"/>
+          <a:chExt cx="0" cy="0"/>
+        </a:xfrm>
+      </p:grpSpPr>
+      <p:sp>
+        <p:nvSpPr>
+          <p:cNvPr id="2" name="Title 1">
+            <a:extLst>
+              <a:ext uri="{FF2B5EF4-FFF2-40B4-BE49-F238E27FC236}">
+                <a16:creationId xmlns:a16="http://schemas.microsoft.com/office/drawing/2014/main" id="{86844EC3-2999-4A4E-913C-4C0EEC2158B1}"/>
+              </a:ext>
+            </a:extLst>
+          </p:cNvPr>
+          <p:cNvSpPr>
+            <a:spLocks noGrp="1"/>
+          </p:cNvSpPr>
+          <p:nvPr>
+            <p:ph type="title"/>
+          </p:nvPr>
+        </p:nvSpPr>
+        <p:spPr/>
+        <p:txBody>
+          <a:bodyPr/>
+          <a:lstStyle/>
+          <a:p>
+            <a:r>
+              <a:rPr lang="fr-FR" dirty="0"/>
+              <a:t>Plan de la présentation</a:t>
+            </a:r>
+          </a:p>
+        </p:txBody>
+      </p:sp>
+      <p:graphicFrame>
+        <p:nvGraphicFramePr>
+          <p:cNvPr id="4" name="Content Placeholder 3">
+            <a:extLst>
+              <a:ext uri="{FF2B5EF4-FFF2-40B4-BE49-F238E27FC236}">
+                <a16:creationId xmlns:a16="http://schemas.microsoft.com/office/drawing/2014/main" id="{8D64BF28-FC1F-3246-8656-3854FC00D636}"/>
+              </a:ext>
+            </a:extLst>
+          </p:cNvPr>
+          <p:cNvGraphicFramePr>
+            <a:graphicFrameLocks noGrp="1"/>
+          </p:cNvGraphicFramePr>
+          <p:nvPr>
+            <p:ph idx="1"/>
+            <p:extLst/>
+          </p:nvPr>
+        </p:nvGraphicFramePr>
+        <p:xfrm>
+          <a:off x="581025" y="2181225"/>
+          <a:ext cx="11029950" cy="4305300"/>
+        </p:xfrm>
+        <a:graphic>
+          <a:graphicData uri="http://schemas.openxmlformats.org/drawingml/2006/diagram">
+            <dgm:relIds xmlns:dgm="http://schemas.openxmlformats.org/drawingml/2006/diagram" xmlns:r="http://schemas.openxmlformats.org/officeDocument/2006/relationships" r:dm="rId2" r:lo="rId3" r:qs="rId4" r:cs="rId5"/>
+          </a:graphicData>
+        </a:graphic>
+      </p:graphicFrame>
+    </p:spTree>
+    <p:extLst>
+      <p:ext uri="{BB962C8B-B14F-4D97-AF65-F5344CB8AC3E}">
+        <p14:creationId xmlns:p14="http://schemas.microsoft.com/office/powerpoint/2010/main" val="1548684671"/>
       </p:ext>
     </p:extLst>
   </p:cSld>

</xml_diff>